<commit_message>
Initial check-in, post security wipe.
</commit_message>
<xml_diff>
--- a/data/work/diagrams.pptx
+++ b/data/work/diagrams.pptx
@@ -5,12 +5,11 @@
     <p:sldMasterId id="2147483648" r:id="rId1"/>
   </p:sldMasterIdLst>
   <p:sldIdLst>
-    <p:sldId id="259" r:id="rId2"/>
-    <p:sldId id="256" r:id="rId3"/>
-    <p:sldId id="258" r:id="rId4"/>
-    <p:sldId id="262" r:id="rId5"/>
-    <p:sldId id="260" r:id="rId6"/>
-    <p:sldId id="261" r:id="rId7"/>
+    <p:sldId id="256" r:id="rId2"/>
+    <p:sldId id="258" r:id="rId3"/>
+    <p:sldId id="259" r:id="rId4"/>
+    <p:sldId id="260" r:id="rId5"/>
+    <p:sldId id="261" r:id="rId6"/>
   </p:sldIdLst>
   <p:sldSz cx="9144000" cy="6858000" type="screen4x3"/>
   <p:notesSz cx="6858000" cy="9144000"/>
@@ -293,7 +292,7 @@
           <a:p>
             <a:fld id="{8136B1A2-BD48-40D0-8ACE-0BC0EB70CE80}" type="datetimeFigureOut">
               <a:rPr lang="en-US" smtClean="0"/>
-              <a:t>3/5/2016</a:t>
+              <a:t>3/1/2016</a:t>
             </a:fld>
             <a:endParaRPr lang="en-US"/>
           </a:p>
@@ -463,7 +462,7 @@
           <a:p>
             <a:fld id="{8136B1A2-BD48-40D0-8ACE-0BC0EB70CE80}" type="datetimeFigureOut">
               <a:rPr lang="en-US" smtClean="0"/>
-              <a:t>3/5/2016</a:t>
+              <a:t>3/1/2016</a:t>
             </a:fld>
             <a:endParaRPr lang="en-US"/>
           </a:p>
@@ -643,7 +642,7 @@
           <a:p>
             <a:fld id="{8136B1A2-BD48-40D0-8ACE-0BC0EB70CE80}" type="datetimeFigureOut">
               <a:rPr lang="en-US" smtClean="0"/>
-              <a:t>3/5/2016</a:t>
+              <a:t>3/1/2016</a:t>
             </a:fld>
             <a:endParaRPr lang="en-US"/>
           </a:p>
@@ -813,7 +812,7 @@
           <a:p>
             <a:fld id="{8136B1A2-BD48-40D0-8ACE-0BC0EB70CE80}" type="datetimeFigureOut">
               <a:rPr lang="en-US" smtClean="0"/>
-              <a:t>3/5/2016</a:t>
+              <a:t>3/1/2016</a:t>
             </a:fld>
             <a:endParaRPr lang="en-US"/>
           </a:p>
@@ -1059,7 +1058,7 @@
           <a:p>
             <a:fld id="{8136B1A2-BD48-40D0-8ACE-0BC0EB70CE80}" type="datetimeFigureOut">
               <a:rPr lang="en-US" smtClean="0"/>
-              <a:t>3/5/2016</a:t>
+              <a:t>3/1/2016</a:t>
             </a:fld>
             <a:endParaRPr lang="en-US"/>
           </a:p>
@@ -1347,7 +1346,7 @@
           <a:p>
             <a:fld id="{8136B1A2-BD48-40D0-8ACE-0BC0EB70CE80}" type="datetimeFigureOut">
               <a:rPr lang="en-US" smtClean="0"/>
-              <a:t>3/5/2016</a:t>
+              <a:t>3/1/2016</a:t>
             </a:fld>
             <a:endParaRPr lang="en-US"/>
           </a:p>
@@ -1769,7 +1768,7 @@
           <a:p>
             <a:fld id="{8136B1A2-BD48-40D0-8ACE-0BC0EB70CE80}" type="datetimeFigureOut">
               <a:rPr lang="en-US" smtClean="0"/>
-              <a:t>3/5/2016</a:t>
+              <a:t>3/1/2016</a:t>
             </a:fld>
             <a:endParaRPr lang="en-US"/>
           </a:p>
@@ -1887,7 +1886,7 @@
           <a:p>
             <a:fld id="{8136B1A2-BD48-40D0-8ACE-0BC0EB70CE80}" type="datetimeFigureOut">
               <a:rPr lang="en-US" smtClean="0"/>
-              <a:t>3/5/2016</a:t>
+              <a:t>3/1/2016</a:t>
             </a:fld>
             <a:endParaRPr lang="en-US"/>
           </a:p>
@@ -1982,7 +1981,7 @@
           <a:p>
             <a:fld id="{8136B1A2-BD48-40D0-8ACE-0BC0EB70CE80}" type="datetimeFigureOut">
               <a:rPr lang="en-US" smtClean="0"/>
-              <a:t>3/5/2016</a:t>
+              <a:t>3/1/2016</a:t>
             </a:fld>
             <a:endParaRPr lang="en-US"/>
           </a:p>
@@ -2259,7 +2258,7 @@
           <a:p>
             <a:fld id="{8136B1A2-BD48-40D0-8ACE-0BC0EB70CE80}" type="datetimeFigureOut">
               <a:rPr lang="en-US" smtClean="0"/>
-              <a:t>3/5/2016</a:t>
+              <a:t>3/1/2016</a:t>
             </a:fld>
             <a:endParaRPr lang="en-US"/>
           </a:p>
@@ -2512,7 +2511,7 @@
           <a:p>
             <a:fld id="{8136B1A2-BD48-40D0-8ACE-0BC0EB70CE80}" type="datetimeFigureOut">
               <a:rPr lang="en-US" smtClean="0"/>
-              <a:t>3/5/2016</a:t>
+              <a:t>3/1/2016</a:t>
             </a:fld>
             <a:endParaRPr lang="en-US"/>
           </a:p>
@@ -2725,7 +2724,7 @@
           <a:p>
             <a:fld id="{8136B1A2-BD48-40D0-8ACE-0BC0EB70CE80}" type="datetimeFigureOut">
               <a:rPr lang="en-US" smtClean="0"/>
-              <a:t>3/5/2016</a:t>
+              <a:t>3/1/2016</a:t>
             </a:fld>
             <a:endParaRPr lang="en-US"/>
           </a:p>
@@ -3102,45 +3101,14 @@
       </p:grpSpPr>
       <p:sp>
         <p:nvSpPr>
-          <p:cNvPr id="5" name="TextBox 4"/>
-          <p:cNvSpPr txBox="1"/>
-          <p:nvPr/>
-        </p:nvSpPr>
-        <p:spPr>
-          <a:xfrm>
-            <a:off x="6934200" y="6400800"/>
-            <a:ext cx="1620957" cy="369332"/>
-          </a:xfrm>
-          <a:prstGeom prst="rect">
-            <a:avLst/>
-          </a:prstGeom>
-          <a:noFill/>
-        </p:spPr>
-        <p:txBody>
-          <a:bodyPr wrap="none" rtlCol="0">
-            <a:spAutoFit/>
-          </a:bodyPr>
-          <a:lstStyle/>
-          <a:p>
-            <a:r>
-              <a:rPr lang="en-US" smtClean="0">
-                <a:latin typeface="Helvetica" panose="020B0604020202030204" pitchFamily="34" charset="0"/>
-              </a:rPr>
-              <a:t>spark-nutshell</a:t>
-            </a:r>
-          </a:p>
-        </p:txBody>
-      </p:sp>
-      <p:sp>
-        <p:nvSpPr>
-          <p:cNvPr id="7" name="Flowchart: Process 6"/>
+          <p:cNvPr id="4" name="Flowchart: Process 3"/>
           <p:cNvSpPr/>
           <p:nvPr/>
         </p:nvSpPr>
         <p:spPr>
           <a:xfrm>
-            <a:off x="914400" y="1600201"/>
-            <a:ext cx="5689600" cy="533399"/>
+            <a:off x="3124200" y="838200"/>
+            <a:ext cx="5486400" cy="2590800"/>
           </a:xfrm>
           <a:prstGeom prst="flowChartProcess">
             <a:avLst/>
@@ -3161,7 +3129,7 @@
           </a:fontRef>
         </p:style>
         <p:txBody>
-          <a:bodyPr rtlCol="0" anchor="ctr"/>
+          <a:bodyPr rtlCol="0" anchor="b"/>
           <a:lstStyle/>
           <a:p>
             <a:pPr algn="ctr"/>
@@ -3169,7 +3137,7 @@
               <a:rPr lang="en-US" smtClean="0">
                 <a:latin typeface="Helvetica" panose="020B0604020202030204" pitchFamily="34" charset="0"/>
               </a:rPr>
-              <a:t>Spark Core</a:t>
+              <a:t>Spark Cluster</a:t>
             </a:r>
             <a:endParaRPr lang="en-US">
               <a:latin typeface="Helvetica" panose="020B0604020202030204" pitchFamily="34" charset="0"/>
@@ -3179,13 +3147,13 @@
       </p:sp>
       <p:sp>
         <p:nvSpPr>
-          <p:cNvPr id="8" name="Flowchart: Process 7"/>
+          <p:cNvPr id="7" name="Flowchart: Process 6"/>
           <p:cNvSpPr/>
           <p:nvPr/>
         </p:nvSpPr>
         <p:spPr>
           <a:xfrm>
-            <a:off x="917679" y="857650"/>
+            <a:off x="3124200" y="1676400"/>
             <a:ext cx="1295400" cy="762000"/>
           </a:xfrm>
           <a:prstGeom prst="flowChartProcess">
@@ -3220,21 +3188,21 @@
               <a:rPr lang="en-US" smtClean="0">
                 <a:latin typeface="Helvetica" panose="020B0604020202030204" pitchFamily="34" charset="0"/>
               </a:rPr>
-              <a:t>Spark Streaming</a:t>
-            </a:r>
-          </a:p>
-        </p:txBody>
-      </p:sp>
-      <p:sp>
-        <p:nvSpPr>
-          <p:cNvPr id="9" name="Flowchart: Process 8"/>
+              <a:t>Cluster Manager</a:t>
+            </a:r>
+          </a:p>
+        </p:txBody>
+      </p:sp>
+      <p:sp>
+        <p:nvSpPr>
+          <p:cNvPr id="8" name="Flowchart: Process 7"/>
           <p:cNvSpPr/>
           <p:nvPr/>
         </p:nvSpPr>
         <p:spPr>
           <a:xfrm>
-            <a:off x="2377502" y="857650"/>
-            <a:ext cx="1295400" cy="762000"/>
+            <a:off x="5715000" y="1066800"/>
+            <a:ext cx="2743200" cy="762000"/>
           </a:xfrm>
           <a:prstGeom prst="flowChartProcess">
             <a:avLst/>
@@ -3263,26 +3231,26 @@
           </a:bodyPr>
           <a:lstStyle/>
           <a:p>
-            <a:pPr algn="ctr"/>
+            <a:pPr algn="r"/>
             <a:r>
               <a:rPr lang="en-US" smtClean="0">
                 <a:latin typeface="Helvetica" panose="020B0604020202030204" pitchFamily="34" charset="0"/>
               </a:rPr>
-              <a:t>Spark SQL</a:t>
-            </a:r>
-          </a:p>
-        </p:txBody>
-      </p:sp>
-      <p:sp>
-        <p:nvSpPr>
-          <p:cNvPr id="12" name="Flowchart: Process 11"/>
+              <a:t>Worker 1</a:t>
+            </a:r>
+          </a:p>
+        </p:txBody>
+      </p:sp>
+      <p:sp>
+        <p:nvSpPr>
+          <p:cNvPr id="9" name="Flowchart: Process 8"/>
           <p:cNvSpPr/>
           <p:nvPr/>
         </p:nvSpPr>
         <p:spPr>
           <a:xfrm>
-            <a:off x="3848777" y="857650"/>
-            <a:ext cx="1295400" cy="762000"/>
+            <a:off x="5715000" y="2286000"/>
+            <a:ext cx="2743200" cy="762000"/>
           </a:xfrm>
           <a:prstGeom prst="flowChartProcess">
             <a:avLst/>
@@ -3311,39 +3279,40 @@
           </a:bodyPr>
           <a:lstStyle/>
           <a:p>
-            <a:pPr algn="ctr"/>
+            <a:pPr algn="r"/>
             <a:r>
               <a:rPr lang="en-US" smtClean="0">
                 <a:latin typeface="Helvetica" panose="020B0604020202030204" pitchFamily="34" charset="0"/>
               </a:rPr>
-              <a:t>MLib</a:t>
-            </a:r>
-          </a:p>
-        </p:txBody>
-      </p:sp>
-      <p:sp>
-        <p:nvSpPr>
-          <p:cNvPr id="13" name="Flowchart: Process 12"/>
+              <a:t>Worker n</a:t>
+            </a:r>
+          </a:p>
+        </p:txBody>
+      </p:sp>
+      <p:sp>
+        <p:nvSpPr>
+          <p:cNvPr id="10" name="Flowchart: Process 9"/>
           <p:cNvSpPr/>
           <p:nvPr/>
         </p:nvSpPr>
         <p:spPr>
           <a:xfrm>
-            <a:off x="5308600" y="857650"/>
-            <a:ext cx="1295400" cy="762000"/>
+            <a:off x="5791200" y="1295400"/>
+            <a:ext cx="1295400" cy="457200"/>
           </a:xfrm>
           <a:prstGeom prst="flowChartProcess">
             <a:avLst/>
           </a:prstGeom>
+          <a:ln w="9525"/>
         </p:spPr>
         <p:style>
-          <a:lnRef idx="1">
+          <a:lnRef idx="2">
             <a:schemeClr val="dk1"/>
           </a:lnRef>
-          <a:fillRef idx="2">
-            <a:schemeClr val="dk1"/>
+          <a:fillRef idx="1">
+            <a:schemeClr val="lt1"/>
           </a:fillRef>
-          <a:effectRef idx="1">
+          <a:effectRef idx="0">
             <a:schemeClr val="dk1"/>
           </a:effectRef>
           <a:fontRef idx="minor">
@@ -3361,18 +3330,707 @@
           <a:p>
             <a:pPr algn="ctr"/>
             <a:r>
+              <a:rPr lang="en-US" sz="1400" smtClean="0">
+                <a:latin typeface="Helvetica" panose="020B0604020202030204" pitchFamily="34" charset="0"/>
+              </a:rPr>
+              <a:t>Executor</a:t>
+            </a:r>
+          </a:p>
+        </p:txBody>
+      </p:sp>
+      <p:sp>
+        <p:nvSpPr>
+          <p:cNvPr id="11" name="Flowchart: Process 10"/>
+          <p:cNvSpPr/>
+          <p:nvPr/>
+        </p:nvSpPr>
+        <p:spPr>
+          <a:xfrm>
+            <a:off x="5791200" y="2362200"/>
+            <a:ext cx="1295400" cy="457200"/>
+          </a:xfrm>
+          <a:prstGeom prst="flowChartProcess">
+            <a:avLst/>
+          </a:prstGeom>
+          <a:ln w="9525"/>
+        </p:spPr>
+        <p:style>
+          <a:lnRef idx="2">
+            <a:schemeClr val="dk1"/>
+          </a:lnRef>
+          <a:fillRef idx="1">
+            <a:schemeClr val="lt1"/>
+          </a:fillRef>
+          <a:effectRef idx="0">
+            <a:schemeClr val="dk1"/>
+          </a:effectRef>
+          <a:fontRef idx="minor">
+            <a:schemeClr val="dk1"/>
+          </a:fontRef>
+        </p:style>
+        <p:txBody>
+          <a:bodyPr rot="0" spcFirstLastPara="0" vertOverflow="overflow" horzOverflow="overflow" vert="horz" wrap="square" lIns="91440" tIns="45720" rIns="91440" bIns="45720" numCol="1" spcCol="0" rtlCol="0" fromWordArt="0" anchor="ctr" anchorCtr="0" forceAA="0" compatLnSpc="1">
+            <a:prstTxWarp prst="textNoShape">
+              <a:avLst/>
+            </a:prstTxWarp>
+            <a:noAutofit/>
+          </a:bodyPr>
+          <a:lstStyle/>
+          <a:p>
+            <a:pPr algn="ctr"/>
+            <a:r>
+              <a:rPr lang="en-US" sz="1400" smtClean="0">
+                <a:latin typeface="Helvetica" panose="020B0604020202030204" pitchFamily="34" charset="0"/>
+              </a:rPr>
+              <a:t>Executor</a:t>
+            </a:r>
+          </a:p>
+        </p:txBody>
+      </p:sp>
+      <p:cxnSp>
+        <p:nvCxnSpPr>
+          <p:cNvPr id="13" name="Straight Arrow Connector 12"/>
+          <p:cNvCxnSpPr/>
+          <p:nvPr/>
+        </p:nvCxnSpPr>
+        <p:spPr>
+          <a:xfrm>
+            <a:off x="4419600" y="1752600"/>
+            <a:ext cx="1295400" cy="0"/>
+          </a:xfrm>
+          <a:prstGeom prst="straightConnector1">
+            <a:avLst/>
+          </a:prstGeom>
+          <a:ln w="12700">
+            <a:tailEnd type="arrow"/>
+          </a:ln>
+        </p:spPr>
+        <p:style>
+          <a:lnRef idx="2">
+            <a:schemeClr val="dk1"/>
+          </a:lnRef>
+          <a:fillRef idx="0">
+            <a:schemeClr val="dk1"/>
+          </a:fillRef>
+          <a:effectRef idx="1">
+            <a:schemeClr val="dk1"/>
+          </a:effectRef>
+          <a:fontRef idx="minor">
+            <a:schemeClr val="tx1"/>
+          </a:fontRef>
+        </p:style>
+      </p:cxnSp>
+      <p:cxnSp>
+        <p:nvCxnSpPr>
+          <p:cNvPr id="15" name="Straight Arrow Connector 14"/>
+          <p:cNvCxnSpPr/>
+          <p:nvPr/>
+        </p:nvCxnSpPr>
+        <p:spPr>
+          <a:xfrm>
+            <a:off x="4419600" y="2362200"/>
+            <a:ext cx="1295400" cy="0"/>
+          </a:xfrm>
+          <a:prstGeom prst="straightConnector1">
+            <a:avLst/>
+          </a:prstGeom>
+          <a:ln w="12700">
+            <a:tailEnd type="arrow"/>
+          </a:ln>
+        </p:spPr>
+        <p:style>
+          <a:lnRef idx="2">
+            <a:schemeClr val="dk1"/>
+          </a:lnRef>
+          <a:fillRef idx="0">
+            <a:schemeClr val="dk1"/>
+          </a:fillRef>
+          <a:effectRef idx="1">
+            <a:schemeClr val="dk1"/>
+          </a:effectRef>
+          <a:fontRef idx="minor">
+            <a:schemeClr val="tx1"/>
+          </a:fontRef>
+        </p:style>
+      </p:cxnSp>
+      <p:cxnSp>
+        <p:nvCxnSpPr>
+          <p:cNvPr id="17" name="Straight Arrow Connector 16"/>
+          <p:cNvCxnSpPr>
+            <a:stCxn id="28" idx="3"/>
+            <a:endCxn id="7" idx="1"/>
+          </p:cNvCxnSpPr>
+          <p:nvPr/>
+        </p:nvCxnSpPr>
+        <p:spPr>
+          <a:xfrm>
+            <a:off x="2438400" y="2057400"/>
+            <a:ext cx="685800" cy="0"/>
+          </a:xfrm>
+          <a:prstGeom prst="straightConnector1">
+            <a:avLst/>
+          </a:prstGeom>
+          <a:ln w="12700">
+            <a:tailEnd type="arrow"/>
+          </a:ln>
+        </p:spPr>
+        <p:style>
+          <a:lnRef idx="2">
+            <a:schemeClr val="dk1"/>
+          </a:lnRef>
+          <a:fillRef idx="0">
+            <a:schemeClr val="dk1"/>
+          </a:fillRef>
+          <a:effectRef idx="1">
+            <a:schemeClr val="dk1"/>
+          </a:effectRef>
+          <a:fontRef idx="minor">
+            <a:schemeClr val="tx1"/>
+          </a:fontRef>
+        </p:style>
+      </p:cxnSp>
+      <p:sp>
+        <p:nvSpPr>
+          <p:cNvPr id="23" name="TextBox 22"/>
+          <p:cNvSpPr txBox="1"/>
+          <p:nvPr/>
+        </p:nvSpPr>
+        <p:spPr>
+          <a:xfrm>
+            <a:off x="2362200" y="1828800"/>
+            <a:ext cx="431528" cy="276999"/>
+          </a:xfrm>
+          <a:prstGeom prst="rect">
+            <a:avLst/>
+          </a:prstGeom>
+          <a:noFill/>
+        </p:spPr>
+        <p:txBody>
+          <a:bodyPr wrap="none" rtlCol="0">
+            <a:spAutoFit/>
+          </a:bodyPr>
+          <a:lstStyle/>
+          <a:p>
+            <a:r>
+              <a:rPr lang="en-US" sz="1200" smtClean="0">
+                <a:latin typeface="Helvetica" panose="020B0604020202030204" pitchFamily="34" charset="0"/>
+              </a:rPr>
+              <a:t>Job</a:t>
+            </a:r>
+            <a:endParaRPr lang="en-US" sz="1200">
+              <a:latin typeface="Helvetica" panose="020B0604020202030204" pitchFamily="34" charset="0"/>
+            </a:endParaRPr>
+          </a:p>
+        </p:txBody>
+      </p:sp>
+      <p:sp>
+        <p:nvSpPr>
+          <p:cNvPr id="24" name="TextBox 23"/>
+          <p:cNvSpPr txBox="1"/>
+          <p:nvPr/>
+        </p:nvSpPr>
+        <p:spPr>
+          <a:xfrm>
+            <a:off x="4343400" y="1524000"/>
+            <a:ext cx="595035" cy="276999"/>
+          </a:xfrm>
+          <a:prstGeom prst="rect">
+            <a:avLst/>
+          </a:prstGeom>
+          <a:noFill/>
+        </p:spPr>
+        <p:txBody>
+          <a:bodyPr wrap="none" rtlCol="0">
+            <a:spAutoFit/>
+          </a:bodyPr>
+          <a:lstStyle/>
+          <a:p>
+            <a:r>
+              <a:rPr lang="en-US" sz="1200" smtClean="0">
+                <a:latin typeface="Helvetica" panose="020B0604020202030204" pitchFamily="34" charset="0"/>
+              </a:rPr>
+              <a:t>Tasks</a:t>
+            </a:r>
+            <a:endParaRPr lang="en-US" sz="1200">
+              <a:latin typeface="Helvetica" panose="020B0604020202030204" pitchFamily="34" charset="0"/>
+            </a:endParaRPr>
+          </a:p>
+        </p:txBody>
+      </p:sp>
+      <p:sp>
+        <p:nvSpPr>
+          <p:cNvPr id="25" name="TextBox 24"/>
+          <p:cNvSpPr txBox="1"/>
+          <p:nvPr/>
+        </p:nvSpPr>
+        <p:spPr>
+          <a:xfrm>
+            <a:off x="4343400" y="2085201"/>
+            <a:ext cx="595035" cy="276999"/>
+          </a:xfrm>
+          <a:prstGeom prst="rect">
+            <a:avLst/>
+          </a:prstGeom>
+          <a:noFill/>
+        </p:spPr>
+        <p:txBody>
+          <a:bodyPr wrap="none" rtlCol="0">
+            <a:spAutoFit/>
+          </a:bodyPr>
+          <a:lstStyle/>
+          <a:p>
+            <a:r>
+              <a:rPr lang="en-US" sz="1200" smtClean="0">
+                <a:latin typeface="Helvetica" panose="020B0604020202030204" pitchFamily="34" charset="0"/>
+              </a:rPr>
+              <a:t>Tasks</a:t>
+            </a:r>
+            <a:endParaRPr lang="en-US" sz="1200">
+              <a:latin typeface="Helvetica" panose="020B0604020202030204" pitchFamily="34" charset="0"/>
+            </a:endParaRPr>
+          </a:p>
+        </p:txBody>
+      </p:sp>
+      <p:cxnSp>
+        <p:nvCxnSpPr>
+          <p:cNvPr id="27" name="Elbow Connector 26"/>
+          <p:cNvCxnSpPr>
+            <a:stCxn id="8" idx="1"/>
+            <a:endCxn id="7" idx="0"/>
+          </p:cNvCxnSpPr>
+          <p:nvPr/>
+        </p:nvCxnSpPr>
+        <p:spPr>
+          <a:xfrm rot="10800000" flipV="1">
+            <a:off x="3771900" y="1447800"/>
+            <a:ext cx="1943100" cy="228600"/>
+          </a:xfrm>
+          <a:prstGeom prst="bentConnector2">
+            <a:avLst/>
+          </a:prstGeom>
+          <a:ln w="12700">
+            <a:tailEnd type="arrow"/>
+          </a:ln>
+        </p:spPr>
+        <p:style>
+          <a:lnRef idx="2">
+            <a:schemeClr val="dk1"/>
+          </a:lnRef>
+          <a:fillRef idx="0">
+            <a:schemeClr val="dk1"/>
+          </a:fillRef>
+          <a:effectRef idx="1">
+            <a:schemeClr val="dk1"/>
+          </a:effectRef>
+          <a:fontRef idx="minor">
+            <a:schemeClr val="tx1"/>
+          </a:fontRef>
+        </p:style>
+      </p:cxnSp>
+      <p:cxnSp>
+        <p:nvCxnSpPr>
+          <p:cNvPr id="29" name="Elbow Connector 28"/>
+          <p:cNvCxnSpPr>
+            <a:stCxn id="9" idx="1"/>
+            <a:endCxn id="7" idx="2"/>
+          </p:cNvCxnSpPr>
+          <p:nvPr/>
+        </p:nvCxnSpPr>
+        <p:spPr>
+          <a:xfrm rot="10800000">
+            <a:off x="3771900" y="2438400"/>
+            <a:ext cx="1943100" cy="228600"/>
+          </a:xfrm>
+          <a:prstGeom prst="bentConnector2">
+            <a:avLst/>
+          </a:prstGeom>
+          <a:ln w="12700">
+            <a:tailEnd type="arrow"/>
+          </a:ln>
+        </p:spPr>
+        <p:style>
+          <a:lnRef idx="2">
+            <a:schemeClr val="dk1"/>
+          </a:lnRef>
+          <a:fillRef idx="0">
+            <a:schemeClr val="dk1"/>
+          </a:fillRef>
+          <a:effectRef idx="1">
+            <a:schemeClr val="dk1"/>
+          </a:effectRef>
+          <a:fontRef idx="minor">
+            <a:schemeClr val="tx1"/>
+          </a:fontRef>
+        </p:style>
+      </p:cxnSp>
+      <p:sp>
+        <p:nvSpPr>
+          <p:cNvPr id="31" name="TextBox 30"/>
+          <p:cNvSpPr txBox="1"/>
+          <p:nvPr/>
+        </p:nvSpPr>
+        <p:spPr>
+          <a:xfrm>
+            <a:off x="5105400" y="1219200"/>
+            <a:ext cx="620683" cy="276999"/>
+          </a:xfrm>
+          <a:prstGeom prst="rect">
+            <a:avLst/>
+          </a:prstGeom>
+          <a:noFill/>
+        </p:spPr>
+        <p:txBody>
+          <a:bodyPr wrap="none" rtlCol="0">
+            <a:spAutoFit/>
+          </a:bodyPr>
+          <a:lstStyle/>
+          <a:p>
+            <a:r>
+              <a:rPr lang="en-US" sz="1200" smtClean="0">
+                <a:latin typeface="Helvetica" panose="020B0604020202030204" pitchFamily="34" charset="0"/>
+              </a:rPr>
+              <a:t>Status</a:t>
+            </a:r>
+            <a:endParaRPr lang="en-US" sz="1200">
+              <a:latin typeface="Helvetica" panose="020B0604020202030204" pitchFamily="34" charset="0"/>
+            </a:endParaRPr>
+          </a:p>
+        </p:txBody>
+      </p:sp>
+      <p:sp>
+        <p:nvSpPr>
+          <p:cNvPr id="32" name="TextBox 31"/>
+          <p:cNvSpPr txBox="1"/>
+          <p:nvPr/>
+        </p:nvSpPr>
+        <p:spPr>
+          <a:xfrm>
+            <a:off x="5105400" y="2438400"/>
+            <a:ext cx="620683" cy="276999"/>
+          </a:xfrm>
+          <a:prstGeom prst="rect">
+            <a:avLst/>
+          </a:prstGeom>
+          <a:noFill/>
+        </p:spPr>
+        <p:txBody>
+          <a:bodyPr wrap="none" rtlCol="0">
+            <a:spAutoFit/>
+          </a:bodyPr>
+          <a:lstStyle/>
+          <a:p>
+            <a:r>
+              <a:rPr lang="en-US" sz="1200" smtClean="0">
+                <a:latin typeface="Helvetica" panose="020B0604020202030204" pitchFamily="34" charset="0"/>
+              </a:rPr>
+              <a:t>Status</a:t>
+            </a:r>
+            <a:endParaRPr lang="en-US" sz="1200">
+              <a:latin typeface="Helvetica" panose="020B0604020202030204" pitchFamily="34" charset="0"/>
+            </a:endParaRPr>
+          </a:p>
+        </p:txBody>
+      </p:sp>
+      <p:sp>
+        <p:nvSpPr>
+          <p:cNvPr id="36" name="TextBox 35"/>
+          <p:cNvSpPr txBox="1"/>
+          <p:nvPr/>
+        </p:nvSpPr>
+        <p:spPr>
+          <a:xfrm>
+            <a:off x="5095920" y="2743200"/>
+            <a:ext cx="619080" cy="276999"/>
+          </a:xfrm>
+          <a:prstGeom prst="rect">
+            <a:avLst/>
+          </a:prstGeom>
+          <a:noFill/>
+        </p:spPr>
+        <p:txBody>
+          <a:bodyPr wrap="none" rtlCol="0">
+            <a:spAutoFit/>
+          </a:bodyPr>
+          <a:lstStyle/>
+          <a:p>
+            <a:r>
+              <a:rPr lang="en-US" sz="1200" smtClean="0">
+                <a:latin typeface="Helvetica" panose="020B0604020202030204" pitchFamily="34" charset="0"/>
+              </a:rPr>
+              <a:t>Result</a:t>
+            </a:r>
+            <a:endParaRPr lang="en-US" sz="1200">
+              <a:latin typeface="Helvetica" panose="020B0604020202030204" pitchFamily="34" charset="0"/>
+            </a:endParaRPr>
+          </a:p>
+        </p:txBody>
+      </p:sp>
+      <p:sp>
+        <p:nvSpPr>
+          <p:cNvPr id="37" name="TextBox 36"/>
+          <p:cNvSpPr txBox="1"/>
+          <p:nvPr/>
+        </p:nvSpPr>
+        <p:spPr>
+          <a:xfrm>
+            <a:off x="5095920" y="914400"/>
+            <a:ext cx="619080" cy="276999"/>
+          </a:xfrm>
+          <a:prstGeom prst="rect">
+            <a:avLst/>
+          </a:prstGeom>
+          <a:noFill/>
+        </p:spPr>
+        <p:txBody>
+          <a:bodyPr wrap="none" rtlCol="0">
+            <a:spAutoFit/>
+          </a:bodyPr>
+          <a:lstStyle/>
+          <a:p>
+            <a:r>
+              <a:rPr lang="en-US" sz="1200" smtClean="0">
+                <a:latin typeface="Helvetica" panose="020B0604020202030204" pitchFamily="34" charset="0"/>
+              </a:rPr>
+              <a:t>Result</a:t>
+            </a:r>
+            <a:endParaRPr lang="en-US" sz="1200">
+              <a:latin typeface="Helvetica" panose="020B0604020202030204" pitchFamily="34" charset="0"/>
+            </a:endParaRPr>
+          </a:p>
+        </p:txBody>
+      </p:sp>
+      <p:sp>
+        <p:nvSpPr>
+          <p:cNvPr id="38" name="TextBox 37"/>
+          <p:cNvSpPr txBox="1"/>
+          <p:nvPr/>
+        </p:nvSpPr>
+        <p:spPr>
+          <a:xfrm>
+            <a:off x="6934200" y="6400800"/>
+            <a:ext cx="2069797" cy="369332"/>
+          </a:xfrm>
+          <a:prstGeom prst="rect">
+            <a:avLst/>
+          </a:prstGeom>
+          <a:noFill/>
+        </p:spPr>
+        <p:txBody>
+          <a:bodyPr wrap="none" rtlCol="0">
+            <a:spAutoFit/>
+          </a:bodyPr>
+          <a:lstStyle/>
+          <a:p>
+            <a:r>
               <a:rPr lang="en-US" smtClean="0">
                 <a:latin typeface="Helvetica" panose="020B0604020202030204" pitchFamily="34" charset="0"/>
               </a:rPr>
-              <a:t>GraphX</a:t>
-            </a:r>
-          </a:p>
-        </p:txBody>
-      </p:sp>
+              <a:t>managing-clusters</a:t>
+            </a:r>
+          </a:p>
+        </p:txBody>
+      </p:sp>
+      <p:sp>
+        <p:nvSpPr>
+          <p:cNvPr id="39" name="TextBox 38"/>
+          <p:cNvSpPr txBox="1"/>
+          <p:nvPr/>
+        </p:nvSpPr>
+        <p:spPr>
+          <a:xfrm>
+            <a:off x="7844135" y="1925107"/>
+            <a:ext cx="461665" cy="284693"/>
+          </a:xfrm>
+          <a:prstGeom prst="rect">
+            <a:avLst/>
+          </a:prstGeom>
+          <a:noFill/>
+        </p:spPr>
+        <p:txBody>
+          <a:bodyPr vert="vert" wrap="none" rtlCol="0">
+            <a:spAutoFit/>
+          </a:bodyPr>
+          <a:lstStyle/>
+          <a:p>
+            <a:r>
+              <a:rPr lang="en-US" b="1" smtClean="0">
+                <a:latin typeface="Helvetica" panose="020B0604020202030204" pitchFamily="34" charset="0"/>
+              </a:rPr>
+              <a:t>...</a:t>
+            </a:r>
+          </a:p>
+        </p:txBody>
+      </p:sp>
+      <p:sp>
+        <p:nvSpPr>
+          <p:cNvPr id="28" name="Flowchart: Process 27"/>
+          <p:cNvSpPr/>
+          <p:nvPr/>
+        </p:nvSpPr>
+        <p:spPr>
+          <a:xfrm>
+            <a:off x="76200" y="1676400"/>
+            <a:ext cx="2362200" cy="762000"/>
+          </a:xfrm>
+          <a:prstGeom prst="flowChartProcess">
+            <a:avLst/>
+          </a:prstGeom>
+        </p:spPr>
+        <p:style>
+          <a:lnRef idx="1">
+            <a:schemeClr val="dk1"/>
+          </a:lnRef>
+          <a:fillRef idx="2">
+            <a:schemeClr val="dk1"/>
+          </a:fillRef>
+          <a:effectRef idx="1">
+            <a:schemeClr val="dk1"/>
+          </a:effectRef>
+          <a:fontRef idx="minor">
+            <a:schemeClr val="dk1"/>
+          </a:fontRef>
+        </p:style>
+        <p:txBody>
+          <a:bodyPr rot="0" spcFirstLastPara="0" vertOverflow="overflow" horzOverflow="overflow" vert="horz" wrap="square" lIns="91440" tIns="45720" rIns="91440" bIns="45720" numCol="1" spcCol="0" rtlCol="0" fromWordArt="0" anchor="ctr" anchorCtr="0" forceAA="0" compatLnSpc="1">
+            <a:prstTxWarp prst="textNoShape">
+              <a:avLst/>
+            </a:prstTxWarp>
+            <a:noAutofit/>
+          </a:bodyPr>
+          <a:lstStyle/>
+          <a:p>
+            <a:r>
+              <a:rPr lang="en-US" smtClean="0">
+                <a:latin typeface="Helvetica" panose="020B0604020202030204" pitchFamily="34" charset="0"/>
+              </a:rPr>
+              <a:t>Driver</a:t>
+            </a:r>
+          </a:p>
+        </p:txBody>
+      </p:sp>
+      <p:sp>
+        <p:nvSpPr>
+          <p:cNvPr id="30" name="Flowchart: Process 29"/>
+          <p:cNvSpPr/>
+          <p:nvPr/>
+        </p:nvSpPr>
+        <p:spPr>
+          <a:xfrm>
+            <a:off x="914400" y="1828800"/>
+            <a:ext cx="1371600" cy="457200"/>
+          </a:xfrm>
+          <a:prstGeom prst="flowChartProcess">
+            <a:avLst/>
+          </a:prstGeom>
+          <a:ln w="9525"/>
+        </p:spPr>
+        <p:style>
+          <a:lnRef idx="2">
+            <a:schemeClr val="dk1"/>
+          </a:lnRef>
+          <a:fillRef idx="1">
+            <a:schemeClr val="lt1"/>
+          </a:fillRef>
+          <a:effectRef idx="0">
+            <a:schemeClr val="dk1"/>
+          </a:effectRef>
+          <a:fontRef idx="minor">
+            <a:schemeClr val="dk1"/>
+          </a:fontRef>
+        </p:style>
+        <p:txBody>
+          <a:bodyPr rot="0" spcFirstLastPara="0" vertOverflow="overflow" horzOverflow="overflow" vert="horz" wrap="square" lIns="91440" tIns="45720" rIns="91440" bIns="45720" numCol="1" spcCol="0" rtlCol="0" fromWordArt="0" anchor="ctr" anchorCtr="0" forceAA="0" compatLnSpc="1">
+            <a:prstTxWarp prst="textNoShape">
+              <a:avLst/>
+            </a:prstTxWarp>
+            <a:noAutofit/>
+          </a:bodyPr>
+          <a:lstStyle/>
+          <a:p>
+            <a:pPr algn="ctr"/>
+            <a:r>
+              <a:rPr lang="en-US" sz="1400" smtClean="0">
+                <a:latin typeface="Helvetica" panose="020B0604020202030204" pitchFamily="34" charset="0"/>
+              </a:rPr>
+              <a:t>Application</a:t>
+            </a:r>
+          </a:p>
+        </p:txBody>
+      </p:sp>
+      <p:cxnSp>
+        <p:nvCxnSpPr>
+          <p:cNvPr id="5" name="Elbow Connector 4"/>
+          <p:cNvCxnSpPr>
+            <a:endCxn id="28" idx="0"/>
+          </p:cNvCxnSpPr>
+          <p:nvPr/>
+        </p:nvCxnSpPr>
+        <p:spPr>
+          <a:xfrm rot="10800000" flipV="1">
+            <a:off x="1257300" y="1143000"/>
+            <a:ext cx="4457700" cy="533400"/>
+          </a:xfrm>
+          <a:prstGeom prst="bentConnector2">
+            <a:avLst/>
+          </a:prstGeom>
+          <a:ln w="12700">
+            <a:tailEnd type="arrow"/>
+          </a:ln>
+        </p:spPr>
+        <p:style>
+          <a:lnRef idx="2">
+            <a:schemeClr val="dk1"/>
+          </a:lnRef>
+          <a:fillRef idx="0">
+            <a:schemeClr val="dk1"/>
+          </a:fillRef>
+          <a:effectRef idx="1">
+            <a:schemeClr val="dk1"/>
+          </a:effectRef>
+          <a:fontRef idx="minor">
+            <a:schemeClr val="tx1"/>
+          </a:fontRef>
+        </p:style>
+      </p:cxnSp>
+      <p:cxnSp>
+        <p:nvCxnSpPr>
+          <p:cNvPr id="12" name="Elbow Connector 11"/>
+          <p:cNvCxnSpPr>
+            <a:endCxn id="28" idx="2"/>
+          </p:cNvCxnSpPr>
+          <p:nvPr/>
+        </p:nvCxnSpPr>
+        <p:spPr>
+          <a:xfrm rot="10800000">
+            <a:off x="1257300" y="2438400"/>
+            <a:ext cx="4457700" cy="533400"/>
+          </a:xfrm>
+          <a:prstGeom prst="bentConnector2">
+            <a:avLst/>
+          </a:prstGeom>
+          <a:ln w="12700">
+            <a:tailEnd type="arrow"/>
+          </a:ln>
+        </p:spPr>
+        <p:style>
+          <a:lnRef idx="2">
+            <a:schemeClr val="dk1"/>
+          </a:lnRef>
+          <a:fillRef idx="0">
+            <a:schemeClr val="dk1"/>
+          </a:fillRef>
+          <a:effectRef idx="1">
+            <a:schemeClr val="dk1"/>
+          </a:effectRef>
+          <a:fontRef idx="minor">
+            <a:schemeClr val="tx1"/>
+          </a:fontRef>
+        </p:style>
+      </p:cxnSp>
     </p:spTree>
     <p:extLst>
       <p:ext uri="{BB962C8B-B14F-4D97-AF65-F5344CB8AC3E}">
-        <p14:creationId xmlns:p14="http://schemas.microsoft.com/office/powerpoint/2010/main" val="3740730358"/>
+        <p14:creationId xmlns:p14="http://schemas.microsoft.com/office/powerpoint/2010/main" val="3177194930"/>
       </p:ext>
     </p:extLst>
   </p:cSld>
@@ -3401,404 +4059,14 @@
       </p:grpSpPr>
       <p:sp>
         <p:nvSpPr>
-          <p:cNvPr id="4" name="Flowchart: Process 3"/>
-          <p:cNvSpPr/>
-          <p:nvPr/>
-        </p:nvSpPr>
-        <p:spPr>
-          <a:xfrm>
-            <a:off x="3124200" y="838200"/>
-            <a:ext cx="5486400" cy="2590800"/>
-          </a:xfrm>
-          <a:prstGeom prst="flowChartProcess">
-            <a:avLst/>
-          </a:prstGeom>
-        </p:spPr>
-        <p:style>
-          <a:lnRef idx="1">
-            <a:schemeClr val="accent1"/>
-          </a:lnRef>
-          <a:fillRef idx="2">
-            <a:schemeClr val="accent1"/>
-          </a:fillRef>
-          <a:effectRef idx="1">
-            <a:schemeClr val="accent1"/>
-          </a:effectRef>
-          <a:fontRef idx="minor">
-            <a:schemeClr val="dk1"/>
-          </a:fontRef>
-        </p:style>
-        <p:txBody>
-          <a:bodyPr rtlCol="0" anchor="b"/>
-          <a:lstStyle/>
-          <a:p>
-            <a:pPr algn="ctr"/>
-            <a:r>
-              <a:rPr lang="en-US" smtClean="0">
-                <a:latin typeface="Helvetica" panose="020B0604020202030204" pitchFamily="34" charset="0"/>
-              </a:rPr>
-              <a:t>Spark Cluster</a:t>
-            </a:r>
-            <a:endParaRPr lang="en-US">
-              <a:latin typeface="Helvetica" panose="020B0604020202030204" pitchFamily="34" charset="0"/>
-            </a:endParaRPr>
-          </a:p>
-        </p:txBody>
-      </p:sp>
-      <p:sp>
-        <p:nvSpPr>
-          <p:cNvPr id="7" name="Flowchart: Process 6"/>
-          <p:cNvSpPr/>
-          <p:nvPr/>
-        </p:nvSpPr>
-        <p:spPr>
-          <a:xfrm>
-            <a:off x="3124200" y="1676400"/>
-            <a:ext cx="1295400" cy="762000"/>
-          </a:xfrm>
-          <a:prstGeom prst="flowChartProcess">
-            <a:avLst/>
-          </a:prstGeom>
-        </p:spPr>
-        <p:style>
-          <a:lnRef idx="1">
-            <a:schemeClr val="dk1"/>
-          </a:lnRef>
-          <a:fillRef idx="2">
-            <a:schemeClr val="dk1"/>
-          </a:fillRef>
-          <a:effectRef idx="1">
-            <a:schemeClr val="dk1"/>
-          </a:effectRef>
-          <a:fontRef idx="minor">
-            <a:schemeClr val="dk1"/>
-          </a:fontRef>
-        </p:style>
-        <p:txBody>
-          <a:bodyPr rot="0" spcFirstLastPara="0" vertOverflow="overflow" horzOverflow="overflow" vert="horz" wrap="square" lIns="91440" tIns="45720" rIns="91440" bIns="45720" numCol="1" spcCol="0" rtlCol="0" fromWordArt="0" anchor="ctr" anchorCtr="0" forceAA="0" compatLnSpc="1">
-            <a:prstTxWarp prst="textNoShape">
-              <a:avLst/>
-            </a:prstTxWarp>
-            <a:noAutofit/>
-          </a:bodyPr>
-          <a:lstStyle/>
-          <a:p>
-            <a:pPr algn="ctr"/>
-            <a:r>
-              <a:rPr lang="en-US" smtClean="0">
-                <a:latin typeface="Helvetica" panose="020B0604020202030204" pitchFamily="34" charset="0"/>
-              </a:rPr>
-              <a:t>Cluster Manager</a:t>
-            </a:r>
-          </a:p>
-        </p:txBody>
-      </p:sp>
-      <p:sp>
-        <p:nvSpPr>
-          <p:cNvPr id="8" name="Flowchart: Process 7"/>
-          <p:cNvSpPr/>
-          <p:nvPr/>
-        </p:nvSpPr>
-        <p:spPr>
-          <a:xfrm>
-            <a:off x="5715000" y="1066800"/>
-            <a:ext cx="2743200" cy="762000"/>
-          </a:xfrm>
-          <a:prstGeom prst="flowChartProcess">
-            <a:avLst/>
-          </a:prstGeom>
-        </p:spPr>
-        <p:style>
-          <a:lnRef idx="1">
-            <a:schemeClr val="dk1"/>
-          </a:lnRef>
-          <a:fillRef idx="2">
-            <a:schemeClr val="dk1"/>
-          </a:fillRef>
-          <a:effectRef idx="1">
-            <a:schemeClr val="dk1"/>
-          </a:effectRef>
-          <a:fontRef idx="minor">
-            <a:schemeClr val="dk1"/>
-          </a:fontRef>
-        </p:style>
-        <p:txBody>
-          <a:bodyPr rot="0" spcFirstLastPara="0" vertOverflow="overflow" horzOverflow="overflow" vert="horz" wrap="square" lIns="91440" tIns="45720" rIns="91440" bIns="45720" numCol="1" spcCol="0" rtlCol="0" fromWordArt="0" anchor="ctr" anchorCtr="0" forceAA="0" compatLnSpc="1">
-            <a:prstTxWarp prst="textNoShape">
-              <a:avLst/>
-            </a:prstTxWarp>
-            <a:noAutofit/>
-          </a:bodyPr>
-          <a:lstStyle/>
-          <a:p>
-            <a:pPr algn="r"/>
-            <a:r>
-              <a:rPr lang="en-US" smtClean="0">
-                <a:latin typeface="Helvetica" panose="020B0604020202030204" pitchFamily="34" charset="0"/>
-              </a:rPr>
-              <a:t>Worker 1</a:t>
-            </a:r>
-          </a:p>
-        </p:txBody>
-      </p:sp>
-      <p:sp>
-        <p:nvSpPr>
-          <p:cNvPr id="9" name="Flowchart: Process 8"/>
-          <p:cNvSpPr/>
-          <p:nvPr/>
-        </p:nvSpPr>
-        <p:spPr>
-          <a:xfrm>
-            <a:off x="5715000" y="2286000"/>
-            <a:ext cx="2743200" cy="762000"/>
-          </a:xfrm>
-          <a:prstGeom prst="flowChartProcess">
-            <a:avLst/>
-          </a:prstGeom>
-        </p:spPr>
-        <p:style>
-          <a:lnRef idx="1">
-            <a:schemeClr val="dk1"/>
-          </a:lnRef>
-          <a:fillRef idx="2">
-            <a:schemeClr val="dk1"/>
-          </a:fillRef>
-          <a:effectRef idx="1">
-            <a:schemeClr val="dk1"/>
-          </a:effectRef>
-          <a:fontRef idx="minor">
-            <a:schemeClr val="dk1"/>
-          </a:fontRef>
-        </p:style>
-        <p:txBody>
-          <a:bodyPr rot="0" spcFirstLastPara="0" vertOverflow="overflow" horzOverflow="overflow" vert="horz" wrap="square" lIns="91440" tIns="45720" rIns="91440" bIns="45720" numCol="1" spcCol="0" rtlCol="0" fromWordArt="0" anchor="ctr" anchorCtr="0" forceAA="0" compatLnSpc="1">
-            <a:prstTxWarp prst="textNoShape">
-              <a:avLst/>
-            </a:prstTxWarp>
-            <a:noAutofit/>
-          </a:bodyPr>
-          <a:lstStyle/>
-          <a:p>
-            <a:pPr algn="r"/>
-            <a:r>
-              <a:rPr lang="en-US" smtClean="0">
-                <a:latin typeface="Helvetica" panose="020B0604020202030204" pitchFamily="34" charset="0"/>
-              </a:rPr>
-              <a:t>Worker n</a:t>
-            </a:r>
-          </a:p>
-        </p:txBody>
-      </p:sp>
-      <p:sp>
-        <p:nvSpPr>
-          <p:cNvPr id="10" name="Flowchart: Process 9"/>
-          <p:cNvSpPr/>
-          <p:nvPr/>
-        </p:nvSpPr>
-        <p:spPr>
-          <a:xfrm>
-            <a:off x="5791200" y="1295400"/>
-            <a:ext cx="1295400" cy="457200"/>
-          </a:xfrm>
-          <a:prstGeom prst="flowChartProcess">
-            <a:avLst/>
-          </a:prstGeom>
-          <a:ln w="9525"/>
-        </p:spPr>
-        <p:style>
-          <a:lnRef idx="2">
-            <a:schemeClr val="dk1"/>
-          </a:lnRef>
-          <a:fillRef idx="1">
-            <a:schemeClr val="lt1"/>
-          </a:fillRef>
-          <a:effectRef idx="0">
-            <a:schemeClr val="dk1"/>
-          </a:effectRef>
-          <a:fontRef idx="minor">
-            <a:schemeClr val="dk1"/>
-          </a:fontRef>
-        </p:style>
-        <p:txBody>
-          <a:bodyPr rot="0" spcFirstLastPara="0" vertOverflow="overflow" horzOverflow="overflow" vert="horz" wrap="square" lIns="91440" tIns="45720" rIns="91440" bIns="45720" numCol="1" spcCol="0" rtlCol="0" fromWordArt="0" anchor="ctr" anchorCtr="0" forceAA="0" compatLnSpc="1">
-            <a:prstTxWarp prst="textNoShape">
-              <a:avLst/>
-            </a:prstTxWarp>
-            <a:noAutofit/>
-          </a:bodyPr>
-          <a:lstStyle/>
-          <a:p>
-            <a:pPr algn="ctr"/>
-            <a:r>
-              <a:rPr lang="en-US" sz="1400" smtClean="0">
-                <a:latin typeface="Helvetica" panose="020B0604020202030204" pitchFamily="34" charset="0"/>
-              </a:rPr>
-              <a:t>Executor</a:t>
-            </a:r>
-          </a:p>
-        </p:txBody>
-      </p:sp>
-      <p:sp>
-        <p:nvSpPr>
-          <p:cNvPr id="11" name="Flowchart: Process 10"/>
-          <p:cNvSpPr/>
-          <p:nvPr/>
-        </p:nvSpPr>
-        <p:spPr>
-          <a:xfrm>
-            <a:off x="5791200" y="2362200"/>
-            <a:ext cx="1295400" cy="457200"/>
-          </a:xfrm>
-          <a:prstGeom prst="flowChartProcess">
-            <a:avLst/>
-          </a:prstGeom>
-          <a:ln w="9525"/>
-        </p:spPr>
-        <p:style>
-          <a:lnRef idx="2">
-            <a:schemeClr val="dk1"/>
-          </a:lnRef>
-          <a:fillRef idx="1">
-            <a:schemeClr val="lt1"/>
-          </a:fillRef>
-          <a:effectRef idx="0">
-            <a:schemeClr val="dk1"/>
-          </a:effectRef>
-          <a:fontRef idx="minor">
-            <a:schemeClr val="dk1"/>
-          </a:fontRef>
-        </p:style>
-        <p:txBody>
-          <a:bodyPr rot="0" spcFirstLastPara="0" vertOverflow="overflow" horzOverflow="overflow" vert="horz" wrap="square" lIns="91440" tIns="45720" rIns="91440" bIns="45720" numCol="1" spcCol="0" rtlCol="0" fromWordArt="0" anchor="ctr" anchorCtr="0" forceAA="0" compatLnSpc="1">
-            <a:prstTxWarp prst="textNoShape">
-              <a:avLst/>
-            </a:prstTxWarp>
-            <a:noAutofit/>
-          </a:bodyPr>
-          <a:lstStyle/>
-          <a:p>
-            <a:pPr algn="ctr"/>
-            <a:r>
-              <a:rPr lang="en-US" sz="1400" smtClean="0">
-                <a:latin typeface="Helvetica" panose="020B0604020202030204" pitchFamily="34" charset="0"/>
-              </a:rPr>
-              <a:t>Executor</a:t>
-            </a:r>
-          </a:p>
-        </p:txBody>
-      </p:sp>
-      <p:cxnSp>
-        <p:nvCxnSpPr>
-          <p:cNvPr id="13" name="Straight Arrow Connector 12"/>
-          <p:cNvCxnSpPr/>
-          <p:nvPr/>
-        </p:nvCxnSpPr>
-        <p:spPr>
-          <a:xfrm>
-            <a:off x="4419600" y="1752600"/>
-            <a:ext cx="1295400" cy="0"/>
-          </a:xfrm>
-          <a:prstGeom prst="straightConnector1">
-            <a:avLst/>
-          </a:prstGeom>
-          <a:ln w="12700">
-            <a:tailEnd type="arrow"/>
-          </a:ln>
-        </p:spPr>
-        <p:style>
-          <a:lnRef idx="2">
-            <a:schemeClr val="dk1"/>
-          </a:lnRef>
-          <a:fillRef idx="0">
-            <a:schemeClr val="dk1"/>
-          </a:fillRef>
-          <a:effectRef idx="1">
-            <a:schemeClr val="dk1"/>
-          </a:effectRef>
-          <a:fontRef idx="minor">
-            <a:schemeClr val="tx1"/>
-          </a:fontRef>
-        </p:style>
-      </p:cxnSp>
-      <p:cxnSp>
-        <p:nvCxnSpPr>
-          <p:cNvPr id="15" name="Straight Arrow Connector 14"/>
-          <p:cNvCxnSpPr/>
-          <p:nvPr/>
-        </p:nvCxnSpPr>
-        <p:spPr>
-          <a:xfrm>
-            <a:off x="4419600" y="2362200"/>
-            <a:ext cx="1295400" cy="0"/>
-          </a:xfrm>
-          <a:prstGeom prst="straightConnector1">
-            <a:avLst/>
-          </a:prstGeom>
-          <a:ln w="12700">
-            <a:tailEnd type="arrow"/>
-          </a:ln>
-        </p:spPr>
-        <p:style>
-          <a:lnRef idx="2">
-            <a:schemeClr val="dk1"/>
-          </a:lnRef>
-          <a:fillRef idx="0">
-            <a:schemeClr val="dk1"/>
-          </a:fillRef>
-          <a:effectRef idx="1">
-            <a:schemeClr val="dk1"/>
-          </a:effectRef>
-          <a:fontRef idx="minor">
-            <a:schemeClr val="tx1"/>
-          </a:fontRef>
-        </p:style>
-      </p:cxnSp>
-      <p:cxnSp>
-        <p:nvCxnSpPr>
-          <p:cNvPr id="17" name="Straight Arrow Connector 16"/>
-          <p:cNvCxnSpPr>
-            <a:stCxn id="28" idx="3"/>
-            <a:endCxn id="7" idx="1"/>
-          </p:cNvCxnSpPr>
-          <p:nvPr/>
-        </p:nvCxnSpPr>
-        <p:spPr>
-          <a:xfrm>
-            <a:off x="2438400" y="2057400"/>
-            <a:ext cx="685800" cy="0"/>
-          </a:xfrm>
-          <a:prstGeom prst="straightConnector1">
-            <a:avLst/>
-          </a:prstGeom>
-          <a:ln w="12700">
-            <a:tailEnd type="arrow"/>
-          </a:ln>
-        </p:spPr>
-        <p:style>
-          <a:lnRef idx="2">
-            <a:schemeClr val="dk1"/>
-          </a:lnRef>
-          <a:fillRef idx="0">
-            <a:schemeClr val="dk1"/>
-          </a:fillRef>
-          <a:effectRef idx="1">
-            <a:schemeClr val="dk1"/>
-          </a:effectRef>
-          <a:fontRef idx="minor">
-            <a:schemeClr val="tx1"/>
-          </a:fontRef>
-        </p:style>
-      </p:cxnSp>
-      <p:sp>
-        <p:nvSpPr>
-          <p:cNvPr id="23" name="TextBox 22"/>
+          <p:cNvPr id="38" name="TextBox 37"/>
           <p:cNvSpPr txBox="1"/>
           <p:nvPr/>
         </p:nvSpPr>
         <p:spPr>
           <a:xfrm>
-            <a:off x="2362200" y="1828800"/>
-            <a:ext cx="431528" cy="276999"/>
+            <a:off x="6934200" y="6400800"/>
+            <a:ext cx="2069797" cy="369332"/>
           </a:xfrm>
           <a:prstGeom prst="rect">
             <a:avLst/>
@@ -3812,316 +4080,6 @@
           <a:lstStyle/>
           <a:p>
             <a:r>
-              <a:rPr lang="en-US" sz="1200" smtClean="0">
-                <a:latin typeface="Helvetica" panose="020B0604020202030204" pitchFamily="34" charset="0"/>
-              </a:rPr>
-              <a:t>Job</a:t>
-            </a:r>
-            <a:endParaRPr lang="en-US" sz="1200">
-              <a:latin typeface="Helvetica" panose="020B0604020202030204" pitchFamily="34" charset="0"/>
-            </a:endParaRPr>
-          </a:p>
-        </p:txBody>
-      </p:sp>
-      <p:sp>
-        <p:nvSpPr>
-          <p:cNvPr id="24" name="TextBox 23"/>
-          <p:cNvSpPr txBox="1"/>
-          <p:nvPr/>
-        </p:nvSpPr>
-        <p:spPr>
-          <a:xfrm>
-            <a:off x="4343400" y="1524000"/>
-            <a:ext cx="595035" cy="276999"/>
-          </a:xfrm>
-          <a:prstGeom prst="rect">
-            <a:avLst/>
-          </a:prstGeom>
-          <a:noFill/>
-        </p:spPr>
-        <p:txBody>
-          <a:bodyPr wrap="none" rtlCol="0">
-            <a:spAutoFit/>
-          </a:bodyPr>
-          <a:lstStyle/>
-          <a:p>
-            <a:r>
-              <a:rPr lang="en-US" sz="1200" smtClean="0">
-                <a:latin typeface="Helvetica" panose="020B0604020202030204" pitchFamily="34" charset="0"/>
-              </a:rPr>
-              <a:t>Tasks</a:t>
-            </a:r>
-            <a:endParaRPr lang="en-US" sz="1200">
-              <a:latin typeface="Helvetica" panose="020B0604020202030204" pitchFamily="34" charset="0"/>
-            </a:endParaRPr>
-          </a:p>
-        </p:txBody>
-      </p:sp>
-      <p:sp>
-        <p:nvSpPr>
-          <p:cNvPr id="25" name="TextBox 24"/>
-          <p:cNvSpPr txBox="1"/>
-          <p:nvPr/>
-        </p:nvSpPr>
-        <p:spPr>
-          <a:xfrm>
-            <a:off x="4343400" y="2085201"/>
-            <a:ext cx="595035" cy="276999"/>
-          </a:xfrm>
-          <a:prstGeom prst="rect">
-            <a:avLst/>
-          </a:prstGeom>
-          <a:noFill/>
-        </p:spPr>
-        <p:txBody>
-          <a:bodyPr wrap="none" rtlCol="0">
-            <a:spAutoFit/>
-          </a:bodyPr>
-          <a:lstStyle/>
-          <a:p>
-            <a:r>
-              <a:rPr lang="en-US" sz="1200" smtClean="0">
-                <a:latin typeface="Helvetica" panose="020B0604020202030204" pitchFamily="34" charset="0"/>
-              </a:rPr>
-              <a:t>Tasks</a:t>
-            </a:r>
-            <a:endParaRPr lang="en-US" sz="1200">
-              <a:latin typeface="Helvetica" panose="020B0604020202030204" pitchFamily="34" charset="0"/>
-            </a:endParaRPr>
-          </a:p>
-        </p:txBody>
-      </p:sp>
-      <p:cxnSp>
-        <p:nvCxnSpPr>
-          <p:cNvPr id="27" name="Elbow Connector 26"/>
-          <p:cNvCxnSpPr>
-            <a:stCxn id="8" idx="1"/>
-            <a:endCxn id="7" idx="0"/>
-          </p:cNvCxnSpPr>
-          <p:nvPr/>
-        </p:nvCxnSpPr>
-        <p:spPr>
-          <a:xfrm rot="10800000" flipV="1">
-            <a:off x="3771900" y="1447800"/>
-            <a:ext cx="1943100" cy="228600"/>
-          </a:xfrm>
-          <a:prstGeom prst="bentConnector2">
-            <a:avLst/>
-          </a:prstGeom>
-          <a:ln w="12700">
-            <a:tailEnd type="arrow"/>
-          </a:ln>
-        </p:spPr>
-        <p:style>
-          <a:lnRef idx="2">
-            <a:schemeClr val="dk1"/>
-          </a:lnRef>
-          <a:fillRef idx="0">
-            <a:schemeClr val="dk1"/>
-          </a:fillRef>
-          <a:effectRef idx="1">
-            <a:schemeClr val="dk1"/>
-          </a:effectRef>
-          <a:fontRef idx="minor">
-            <a:schemeClr val="tx1"/>
-          </a:fontRef>
-        </p:style>
-      </p:cxnSp>
-      <p:cxnSp>
-        <p:nvCxnSpPr>
-          <p:cNvPr id="29" name="Elbow Connector 28"/>
-          <p:cNvCxnSpPr>
-            <a:stCxn id="9" idx="1"/>
-            <a:endCxn id="7" idx="2"/>
-          </p:cNvCxnSpPr>
-          <p:nvPr/>
-        </p:nvCxnSpPr>
-        <p:spPr>
-          <a:xfrm rot="10800000">
-            <a:off x="3771900" y="2438400"/>
-            <a:ext cx="1943100" cy="228600"/>
-          </a:xfrm>
-          <a:prstGeom prst="bentConnector2">
-            <a:avLst/>
-          </a:prstGeom>
-          <a:ln w="12700">
-            <a:tailEnd type="arrow"/>
-          </a:ln>
-        </p:spPr>
-        <p:style>
-          <a:lnRef idx="2">
-            <a:schemeClr val="dk1"/>
-          </a:lnRef>
-          <a:fillRef idx="0">
-            <a:schemeClr val="dk1"/>
-          </a:fillRef>
-          <a:effectRef idx="1">
-            <a:schemeClr val="dk1"/>
-          </a:effectRef>
-          <a:fontRef idx="minor">
-            <a:schemeClr val="tx1"/>
-          </a:fontRef>
-        </p:style>
-      </p:cxnSp>
-      <p:sp>
-        <p:nvSpPr>
-          <p:cNvPr id="31" name="TextBox 30"/>
-          <p:cNvSpPr txBox="1"/>
-          <p:nvPr/>
-        </p:nvSpPr>
-        <p:spPr>
-          <a:xfrm>
-            <a:off x="5105400" y="1219200"/>
-            <a:ext cx="620683" cy="276999"/>
-          </a:xfrm>
-          <a:prstGeom prst="rect">
-            <a:avLst/>
-          </a:prstGeom>
-          <a:noFill/>
-        </p:spPr>
-        <p:txBody>
-          <a:bodyPr wrap="none" rtlCol="0">
-            <a:spAutoFit/>
-          </a:bodyPr>
-          <a:lstStyle/>
-          <a:p>
-            <a:r>
-              <a:rPr lang="en-US" sz="1200" smtClean="0">
-                <a:latin typeface="Helvetica" panose="020B0604020202030204" pitchFamily="34" charset="0"/>
-              </a:rPr>
-              <a:t>Status</a:t>
-            </a:r>
-            <a:endParaRPr lang="en-US" sz="1200">
-              <a:latin typeface="Helvetica" panose="020B0604020202030204" pitchFamily="34" charset="0"/>
-            </a:endParaRPr>
-          </a:p>
-        </p:txBody>
-      </p:sp>
-      <p:sp>
-        <p:nvSpPr>
-          <p:cNvPr id="32" name="TextBox 31"/>
-          <p:cNvSpPr txBox="1"/>
-          <p:nvPr/>
-        </p:nvSpPr>
-        <p:spPr>
-          <a:xfrm>
-            <a:off x="5105400" y="2438400"/>
-            <a:ext cx="620683" cy="276999"/>
-          </a:xfrm>
-          <a:prstGeom prst="rect">
-            <a:avLst/>
-          </a:prstGeom>
-          <a:noFill/>
-        </p:spPr>
-        <p:txBody>
-          <a:bodyPr wrap="none" rtlCol="0">
-            <a:spAutoFit/>
-          </a:bodyPr>
-          <a:lstStyle/>
-          <a:p>
-            <a:r>
-              <a:rPr lang="en-US" sz="1200" smtClean="0">
-                <a:latin typeface="Helvetica" panose="020B0604020202030204" pitchFamily="34" charset="0"/>
-              </a:rPr>
-              <a:t>Status</a:t>
-            </a:r>
-            <a:endParaRPr lang="en-US" sz="1200">
-              <a:latin typeface="Helvetica" panose="020B0604020202030204" pitchFamily="34" charset="0"/>
-            </a:endParaRPr>
-          </a:p>
-        </p:txBody>
-      </p:sp>
-      <p:sp>
-        <p:nvSpPr>
-          <p:cNvPr id="36" name="TextBox 35"/>
-          <p:cNvSpPr txBox="1"/>
-          <p:nvPr/>
-        </p:nvSpPr>
-        <p:spPr>
-          <a:xfrm>
-            <a:off x="5095920" y="2743200"/>
-            <a:ext cx="619080" cy="276999"/>
-          </a:xfrm>
-          <a:prstGeom prst="rect">
-            <a:avLst/>
-          </a:prstGeom>
-          <a:noFill/>
-        </p:spPr>
-        <p:txBody>
-          <a:bodyPr wrap="none" rtlCol="0">
-            <a:spAutoFit/>
-          </a:bodyPr>
-          <a:lstStyle/>
-          <a:p>
-            <a:r>
-              <a:rPr lang="en-US" sz="1200" smtClean="0">
-                <a:latin typeface="Helvetica" panose="020B0604020202030204" pitchFamily="34" charset="0"/>
-              </a:rPr>
-              <a:t>Result</a:t>
-            </a:r>
-            <a:endParaRPr lang="en-US" sz="1200">
-              <a:latin typeface="Helvetica" panose="020B0604020202030204" pitchFamily="34" charset="0"/>
-            </a:endParaRPr>
-          </a:p>
-        </p:txBody>
-      </p:sp>
-      <p:sp>
-        <p:nvSpPr>
-          <p:cNvPr id="37" name="TextBox 36"/>
-          <p:cNvSpPr txBox="1"/>
-          <p:nvPr/>
-        </p:nvSpPr>
-        <p:spPr>
-          <a:xfrm>
-            <a:off x="5095920" y="914400"/>
-            <a:ext cx="619080" cy="276999"/>
-          </a:xfrm>
-          <a:prstGeom prst="rect">
-            <a:avLst/>
-          </a:prstGeom>
-          <a:noFill/>
-        </p:spPr>
-        <p:txBody>
-          <a:bodyPr wrap="none" rtlCol="0">
-            <a:spAutoFit/>
-          </a:bodyPr>
-          <a:lstStyle/>
-          <a:p>
-            <a:r>
-              <a:rPr lang="en-US" sz="1200" smtClean="0">
-                <a:latin typeface="Helvetica" panose="020B0604020202030204" pitchFamily="34" charset="0"/>
-              </a:rPr>
-              <a:t>Result</a:t>
-            </a:r>
-            <a:endParaRPr lang="en-US" sz="1200">
-              <a:latin typeface="Helvetica" panose="020B0604020202030204" pitchFamily="34" charset="0"/>
-            </a:endParaRPr>
-          </a:p>
-        </p:txBody>
-      </p:sp>
-      <p:sp>
-        <p:nvSpPr>
-          <p:cNvPr id="38" name="TextBox 37"/>
-          <p:cNvSpPr txBox="1"/>
-          <p:nvPr/>
-        </p:nvSpPr>
-        <p:spPr>
-          <a:xfrm>
-            <a:off x="6934200" y="6400800"/>
-            <a:ext cx="2069797" cy="369332"/>
-          </a:xfrm>
-          <a:prstGeom prst="rect">
-            <a:avLst/>
-          </a:prstGeom>
-          <a:noFill/>
-        </p:spPr>
-        <p:txBody>
-          <a:bodyPr wrap="none" rtlCol="0">
-            <a:spAutoFit/>
-          </a:bodyPr>
-          <a:lstStyle/>
-          <a:p>
-            <a:r>
               <a:rPr lang="en-US" smtClean="0">
                 <a:latin typeface="Helvetica" panose="020B0604020202030204" pitchFamily="34" charset="0"/>
               </a:rPr>
@@ -4130,855 +4088,30 @@
           </a:p>
         </p:txBody>
       </p:sp>
-      <p:sp>
-        <p:nvSpPr>
-          <p:cNvPr id="39" name="TextBox 38"/>
-          <p:cNvSpPr txBox="1"/>
-          <p:nvPr/>
-        </p:nvSpPr>
-        <p:spPr>
-          <a:xfrm>
-            <a:off x="7844135" y="1925107"/>
-            <a:ext cx="461665" cy="284693"/>
-          </a:xfrm>
-          <a:prstGeom prst="rect">
-            <a:avLst/>
-          </a:prstGeom>
-          <a:noFill/>
-        </p:spPr>
-        <p:txBody>
-          <a:bodyPr vert="vert" wrap="none" rtlCol="0">
-            <a:spAutoFit/>
-          </a:bodyPr>
-          <a:lstStyle/>
-          <a:p>
-            <a:r>
-              <a:rPr lang="en-US" b="1" smtClean="0">
-                <a:latin typeface="Helvetica" panose="020B0604020202030204" pitchFamily="34" charset="0"/>
-              </a:rPr>
-              <a:t>...</a:t>
-            </a:r>
-          </a:p>
-        </p:txBody>
-      </p:sp>
-      <p:sp>
-        <p:nvSpPr>
-          <p:cNvPr id="28" name="Flowchart: Process 27"/>
-          <p:cNvSpPr/>
-          <p:nvPr/>
-        </p:nvSpPr>
-        <p:spPr>
-          <a:xfrm>
-            <a:off x="76200" y="1676400"/>
-            <a:ext cx="2362200" cy="762000"/>
-          </a:xfrm>
-          <a:prstGeom prst="flowChartProcess">
-            <a:avLst/>
-          </a:prstGeom>
-        </p:spPr>
-        <p:style>
-          <a:lnRef idx="1">
-            <a:schemeClr val="dk1"/>
-          </a:lnRef>
-          <a:fillRef idx="2">
-            <a:schemeClr val="dk1"/>
-          </a:fillRef>
-          <a:effectRef idx="1">
-            <a:schemeClr val="dk1"/>
-          </a:effectRef>
-          <a:fontRef idx="minor">
-            <a:schemeClr val="dk1"/>
-          </a:fontRef>
-        </p:style>
-        <p:txBody>
-          <a:bodyPr rot="0" spcFirstLastPara="0" vertOverflow="overflow" horzOverflow="overflow" vert="horz" wrap="square" lIns="91440" tIns="45720" rIns="91440" bIns="45720" numCol="1" spcCol="0" rtlCol="0" fromWordArt="0" anchor="ctr" anchorCtr="0" forceAA="0" compatLnSpc="1">
-            <a:prstTxWarp prst="textNoShape">
-              <a:avLst/>
-            </a:prstTxWarp>
-            <a:noAutofit/>
-          </a:bodyPr>
-          <a:lstStyle/>
-          <a:p>
-            <a:r>
-              <a:rPr lang="en-US" smtClean="0">
-                <a:latin typeface="Helvetica" panose="020B0604020202030204" pitchFamily="34" charset="0"/>
-              </a:rPr>
-              <a:t>Driver</a:t>
-            </a:r>
-          </a:p>
-        </p:txBody>
-      </p:sp>
-      <p:sp>
-        <p:nvSpPr>
-          <p:cNvPr id="30" name="Flowchart: Process 29"/>
-          <p:cNvSpPr/>
-          <p:nvPr/>
-        </p:nvSpPr>
-        <p:spPr>
-          <a:xfrm>
-            <a:off x="914400" y="1828800"/>
-            <a:ext cx="1371600" cy="457200"/>
-          </a:xfrm>
-          <a:prstGeom prst="flowChartProcess">
-            <a:avLst/>
-          </a:prstGeom>
-          <a:ln w="9525"/>
-        </p:spPr>
-        <p:style>
-          <a:lnRef idx="2">
-            <a:schemeClr val="dk1"/>
-          </a:lnRef>
-          <a:fillRef idx="1">
-            <a:schemeClr val="lt1"/>
-          </a:fillRef>
-          <a:effectRef idx="0">
-            <a:schemeClr val="dk1"/>
-          </a:effectRef>
-          <a:fontRef idx="minor">
-            <a:schemeClr val="dk1"/>
-          </a:fontRef>
-        </p:style>
-        <p:txBody>
-          <a:bodyPr rot="0" spcFirstLastPara="0" vertOverflow="overflow" horzOverflow="overflow" vert="horz" wrap="square" lIns="91440" tIns="45720" rIns="91440" bIns="45720" numCol="1" spcCol="0" rtlCol="0" fromWordArt="0" anchor="ctr" anchorCtr="0" forceAA="0" compatLnSpc="1">
-            <a:prstTxWarp prst="textNoShape">
-              <a:avLst/>
-            </a:prstTxWarp>
-            <a:noAutofit/>
-          </a:bodyPr>
-          <a:lstStyle/>
-          <a:p>
-            <a:pPr algn="ctr"/>
-            <a:r>
-              <a:rPr lang="en-US" sz="1400" smtClean="0">
-                <a:latin typeface="Helvetica" panose="020B0604020202030204" pitchFamily="34" charset="0"/>
-              </a:rPr>
-              <a:t>Application</a:t>
-            </a:r>
-          </a:p>
-        </p:txBody>
-      </p:sp>
-      <p:cxnSp>
-        <p:nvCxnSpPr>
-          <p:cNvPr id="5" name="Elbow Connector 4"/>
-          <p:cNvCxnSpPr>
-            <a:endCxn id="28" idx="0"/>
-          </p:cNvCxnSpPr>
-          <p:nvPr/>
-        </p:nvCxnSpPr>
-        <p:spPr>
-          <a:xfrm rot="10800000" flipV="1">
-            <a:off x="1257300" y="1143000"/>
-            <a:ext cx="4457700" cy="533400"/>
-          </a:xfrm>
-          <a:prstGeom prst="bentConnector2">
-            <a:avLst/>
-          </a:prstGeom>
-          <a:ln w="12700">
-            <a:tailEnd type="arrow"/>
-          </a:ln>
-        </p:spPr>
-        <p:style>
-          <a:lnRef idx="2">
-            <a:schemeClr val="dk1"/>
-          </a:lnRef>
-          <a:fillRef idx="0">
-            <a:schemeClr val="dk1"/>
-          </a:fillRef>
-          <a:effectRef idx="1">
-            <a:schemeClr val="dk1"/>
-          </a:effectRef>
-          <a:fontRef idx="minor">
-            <a:schemeClr val="tx1"/>
-          </a:fontRef>
-        </p:style>
-      </p:cxnSp>
-      <p:cxnSp>
-        <p:nvCxnSpPr>
-          <p:cNvPr id="12" name="Elbow Connector 11"/>
-          <p:cNvCxnSpPr>
-            <a:endCxn id="28" idx="2"/>
-          </p:cNvCxnSpPr>
-          <p:nvPr/>
-        </p:nvCxnSpPr>
-        <p:spPr>
-          <a:xfrm rot="10800000">
-            <a:off x="1257300" y="2438400"/>
-            <a:ext cx="4457700" cy="533400"/>
-          </a:xfrm>
-          <a:prstGeom prst="bentConnector2">
-            <a:avLst/>
-          </a:prstGeom>
-          <a:ln w="12700">
-            <a:tailEnd type="arrow"/>
-          </a:ln>
-        </p:spPr>
-        <p:style>
-          <a:lnRef idx="2">
-            <a:schemeClr val="dk1"/>
-          </a:lnRef>
-          <a:fillRef idx="0">
-            <a:schemeClr val="dk1"/>
-          </a:fillRef>
-          <a:effectRef idx="1">
-            <a:schemeClr val="dk1"/>
-          </a:effectRef>
-          <a:fontRef idx="minor">
-            <a:schemeClr val="tx1"/>
-          </a:fontRef>
-        </p:style>
-      </p:cxnSp>
-    </p:spTree>
-    <p:extLst>
-      <p:ext uri="{BB962C8B-B14F-4D97-AF65-F5344CB8AC3E}">
-        <p14:creationId xmlns:p14="http://schemas.microsoft.com/office/powerpoint/2010/main" val="3177194930"/>
-      </p:ext>
-    </p:extLst>
-  </p:cSld>
-  <p:clrMapOvr>
-    <a:masterClrMapping/>
-  </p:clrMapOvr>
-</p:sld>
-</file>
-
-<file path=ppt/slides/slide3.xml><?xml version="1.0" encoding="utf-8"?>
-<p:sld xmlns:a="http://schemas.openxmlformats.org/drawingml/2006/main" xmlns:r="http://schemas.openxmlformats.org/officeDocument/2006/relationships" xmlns:p="http://schemas.openxmlformats.org/presentationml/2006/main">
-  <p:cSld>
-    <p:spTree>
-      <p:nvGrpSpPr>
-        <p:cNvPr id="1" name=""/>
-        <p:cNvGrpSpPr/>
-        <p:nvPr/>
-      </p:nvGrpSpPr>
-      <p:grpSpPr>
-        <a:xfrm>
-          <a:off x="0" y="0"/>
-          <a:ext cx="0" cy="0"/>
-          <a:chOff x="0" y="0"/>
-          <a:chExt cx="0" cy="0"/>
-        </a:xfrm>
-      </p:grpSpPr>
-      <p:sp>
-        <p:nvSpPr>
-          <p:cNvPr id="38" name="TextBox 37"/>
-          <p:cNvSpPr txBox="1"/>
-          <p:nvPr/>
-        </p:nvSpPr>
-        <p:spPr>
-          <a:xfrm>
-            <a:off x="6934200" y="6400800"/>
-            <a:ext cx="2069797" cy="369332"/>
-          </a:xfrm>
-          <a:prstGeom prst="rect">
-            <a:avLst/>
-          </a:prstGeom>
-          <a:noFill/>
-        </p:spPr>
-        <p:txBody>
-          <a:bodyPr wrap="none" rtlCol="0">
-            <a:spAutoFit/>
-          </a:bodyPr>
-          <a:lstStyle/>
-          <a:p>
-            <a:r>
-              <a:rPr lang="en-US" smtClean="0">
-                <a:latin typeface="Helvetica" panose="020B0604020202030204" pitchFamily="34" charset="0"/>
-              </a:rPr>
-              <a:t>managing-clusters</a:t>
-            </a:r>
-          </a:p>
-        </p:txBody>
-      </p:sp>
-      <p:sp>
-        <p:nvSpPr>
-          <p:cNvPr id="4" name="Flowchart: Process 3"/>
-          <p:cNvSpPr/>
-          <p:nvPr/>
-        </p:nvSpPr>
-        <p:spPr>
-          <a:xfrm>
-            <a:off x="2971800" y="533401"/>
-            <a:ext cx="2971800" cy="1295400"/>
-          </a:xfrm>
-          <a:prstGeom prst="flowChartProcess">
-            <a:avLst/>
-          </a:prstGeom>
-        </p:spPr>
-        <p:style>
-          <a:lnRef idx="1">
-            <a:schemeClr val="accent1"/>
-          </a:lnRef>
-          <a:fillRef idx="2">
-            <a:schemeClr val="accent1"/>
-          </a:fillRef>
-          <a:effectRef idx="1">
-            <a:schemeClr val="accent1"/>
-          </a:effectRef>
-          <a:fontRef idx="minor">
-            <a:schemeClr val="dk1"/>
-          </a:fontRef>
-        </p:style>
-        <p:txBody>
-          <a:bodyPr rtlCol="0" anchor="b"/>
-          <a:lstStyle/>
-          <a:p>
-            <a:pPr algn="ctr"/>
-            <a:endParaRPr lang="en-US">
-              <a:latin typeface="Helvetica" panose="020B0604020202030204" pitchFamily="34" charset="0"/>
-            </a:endParaRPr>
-          </a:p>
-        </p:txBody>
-      </p:sp>
-      <p:sp>
-        <p:nvSpPr>
-          <p:cNvPr id="7" name="Flowchart: Process 6"/>
-          <p:cNvSpPr/>
-          <p:nvPr/>
-        </p:nvSpPr>
-        <p:spPr>
-          <a:xfrm>
-            <a:off x="3051279" y="762000"/>
-            <a:ext cx="1295400" cy="762000"/>
-          </a:xfrm>
-          <a:prstGeom prst="flowChartProcess">
-            <a:avLst/>
-          </a:prstGeom>
-        </p:spPr>
-        <p:style>
-          <a:lnRef idx="1">
-            <a:schemeClr val="dk1"/>
-          </a:lnRef>
-          <a:fillRef idx="2">
-            <a:schemeClr val="dk1"/>
-          </a:fillRef>
-          <a:effectRef idx="1">
-            <a:schemeClr val="dk1"/>
-          </a:effectRef>
-          <a:fontRef idx="minor">
-            <a:schemeClr val="dk1"/>
-          </a:fontRef>
-        </p:style>
-        <p:txBody>
-          <a:bodyPr rot="0" spcFirstLastPara="0" vertOverflow="overflow" horzOverflow="overflow" vert="horz" wrap="square" lIns="91440" tIns="45720" rIns="91440" bIns="45720" numCol="1" spcCol="0" rtlCol="0" fromWordArt="0" anchor="b" anchorCtr="0" forceAA="0" compatLnSpc="1">
-            <a:prstTxWarp prst="textNoShape">
-              <a:avLst/>
-            </a:prstTxWarp>
-            <a:noAutofit/>
-          </a:bodyPr>
-          <a:lstStyle/>
-          <a:p>
-            <a:pPr algn="ctr"/>
-            <a:r>
-              <a:rPr lang="en-US" sz="1200" i="1" smtClean="0">
-                <a:latin typeface="Helvetica" panose="020B0604020202030204" pitchFamily="34" charset="0"/>
-              </a:rPr>
-              <a:t>sparkour-master</a:t>
-            </a:r>
-            <a:endParaRPr lang="en-US" sz="1200" i="1" smtClean="0">
-              <a:latin typeface="Helvetica" panose="020B0604020202030204" pitchFamily="34" charset="0"/>
-            </a:endParaRPr>
-          </a:p>
-        </p:txBody>
-      </p:sp>
-      <p:sp>
-        <p:nvSpPr>
-          <p:cNvPr id="26" name="Flowchart: Process 25"/>
-          <p:cNvSpPr/>
-          <p:nvPr/>
-        </p:nvSpPr>
-        <p:spPr>
-          <a:xfrm>
-            <a:off x="4511102" y="770467"/>
-            <a:ext cx="1295400" cy="762000"/>
-          </a:xfrm>
-          <a:prstGeom prst="flowChartProcess">
-            <a:avLst/>
-          </a:prstGeom>
-        </p:spPr>
-        <p:style>
-          <a:lnRef idx="1">
-            <a:schemeClr val="dk1"/>
-          </a:lnRef>
-          <a:fillRef idx="2">
-            <a:schemeClr val="dk1"/>
-          </a:fillRef>
-          <a:effectRef idx="1">
-            <a:schemeClr val="dk1"/>
-          </a:effectRef>
-          <a:fontRef idx="minor">
-            <a:schemeClr val="dk1"/>
-          </a:fontRef>
-        </p:style>
-        <p:txBody>
-          <a:bodyPr rot="0" spcFirstLastPara="0" vertOverflow="overflow" horzOverflow="overflow" vert="horz" wrap="square" lIns="91440" tIns="45720" rIns="91440" bIns="45720" numCol="1" spcCol="0" rtlCol="0" fromWordArt="0" anchor="b" anchorCtr="0" forceAA="0" compatLnSpc="1">
-            <a:prstTxWarp prst="textNoShape">
-              <a:avLst/>
-            </a:prstTxWarp>
-            <a:noAutofit/>
-          </a:bodyPr>
-          <a:lstStyle/>
-          <a:p>
-            <a:pPr algn="ctr"/>
-            <a:r>
-              <a:rPr lang="en-US" sz="1200" i="1" smtClean="0">
-                <a:latin typeface="Helvetica" panose="020B0604020202030204" pitchFamily="34" charset="0"/>
-              </a:rPr>
-              <a:t>sparkour-slave</a:t>
-            </a:r>
-            <a:endParaRPr lang="en-US" sz="1200" i="1" smtClean="0">
-              <a:latin typeface="Helvetica" panose="020B0604020202030204" pitchFamily="34" charset="0"/>
-            </a:endParaRPr>
-          </a:p>
-        </p:txBody>
-      </p:sp>
-      <p:sp>
-        <p:nvSpPr>
-          <p:cNvPr id="45" name="TextBox 44"/>
-          <p:cNvSpPr txBox="1"/>
-          <p:nvPr/>
-        </p:nvSpPr>
-        <p:spPr>
-          <a:xfrm>
-            <a:off x="5978194" y="533400"/>
-            <a:ext cx="1779654" cy="461665"/>
-          </a:xfrm>
-          <a:prstGeom prst="rect">
-            <a:avLst/>
-          </a:prstGeom>
-          <a:noFill/>
-        </p:spPr>
-        <p:txBody>
-          <a:bodyPr wrap="none" rtlCol="0">
-            <a:spAutoFit/>
-          </a:bodyPr>
-          <a:lstStyle/>
-          <a:p>
-            <a:r>
-              <a:rPr lang="en-US" sz="1200" b="1" smtClean="0">
-                <a:latin typeface="Helvetica" panose="020B0604020202030204" pitchFamily="34" charset="0"/>
-              </a:rPr>
-              <a:t>Real Spark Cluster</a:t>
-            </a:r>
-          </a:p>
-          <a:p>
-            <a:r>
-              <a:rPr lang="en-US" sz="1200" smtClean="0">
-                <a:latin typeface="Helvetica" panose="020B0604020202030204" pitchFamily="34" charset="0"/>
-              </a:rPr>
-              <a:t>3 instances with 3 roles</a:t>
-            </a:r>
-            <a:endParaRPr lang="en-US" sz="1200">
-              <a:latin typeface="Helvetica" panose="020B0604020202030204" pitchFamily="34" charset="0"/>
-            </a:endParaRPr>
-          </a:p>
-        </p:txBody>
-      </p:sp>
-      <p:sp>
-        <p:nvSpPr>
-          <p:cNvPr id="17" name="Flowchart: Process 16"/>
-          <p:cNvSpPr/>
-          <p:nvPr/>
-        </p:nvSpPr>
-        <p:spPr>
-          <a:xfrm>
-            <a:off x="609600" y="762000"/>
-            <a:ext cx="1295400" cy="762000"/>
-          </a:xfrm>
-          <a:prstGeom prst="flowChartProcess">
-            <a:avLst/>
-          </a:prstGeom>
-        </p:spPr>
-        <p:style>
-          <a:lnRef idx="1">
-            <a:schemeClr val="dk1"/>
-          </a:lnRef>
-          <a:fillRef idx="2">
-            <a:schemeClr val="dk1"/>
-          </a:fillRef>
-          <a:effectRef idx="1">
-            <a:schemeClr val="dk1"/>
-          </a:effectRef>
-          <a:fontRef idx="minor">
-            <a:schemeClr val="dk1"/>
-          </a:fontRef>
-        </p:style>
-        <p:txBody>
-          <a:bodyPr rot="0" spcFirstLastPara="0" vertOverflow="overflow" horzOverflow="overflow" vert="horz" wrap="square" lIns="91440" tIns="45720" rIns="91440" bIns="45720" numCol="1" spcCol="0" rtlCol="0" fromWordArt="0" anchor="b" anchorCtr="0" forceAA="0" compatLnSpc="1">
-            <a:prstTxWarp prst="textNoShape">
-              <a:avLst/>
-            </a:prstTxWarp>
-            <a:noAutofit/>
-          </a:bodyPr>
-          <a:lstStyle/>
-          <a:p>
-            <a:pPr algn="ctr"/>
-            <a:r>
-              <a:rPr lang="en-US" sz="1200" i="1" smtClean="0">
-                <a:latin typeface="Helvetica" panose="020B0604020202030204" pitchFamily="34" charset="0"/>
-              </a:rPr>
-              <a:t>sparkour-dev</a:t>
-            </a:r>
-            <a:endParaRPr lang="en-US" sz="1200" i="1" smtClean="0">
-              <a:latin typeface="Helvetica" panose="020B0604020202030204" pitchFamily="34" charset="0"/>
-            </a:endParaRPr>
-          </a:p>
-        </p:txBody>
-      </p:sp>
-      <p:cxnSp>
-        <p:nvCxnSpPr>
-          <p:cNvPr id="6" name="Straight Arrow Connector 5"/>
-          <p:cNvCxnSpPr>
-            <a:stCxn id="22" idx="3"/>
-            <a:endCxn id="24" idx="1"/>
-          </p:cNvCxnSpPr>
-          <p:nvPr/>
-        </p:nvCxnSpPr>
-        <p:spPr>
-          <a:xfrm flipV="1">
-            <a:off x="1828800" y="1045204"/>
-            <a:ext cx="1298679" cy="1"/>
-          </a:xfrm>
-          <a:prstGeom prst="straightConnector1">
-            <a:avLst/>
-          </a:prstGeom>
-          <a:ln>
-            <a:tailEnd type="arrow"/>
-          </a:ln>
-        </p:spPr>
-        <p:style>
-          <a:lnRef idx="2">
-            <a:schemeClr val="dk1"/>
-          </a:lnRef>
-          <a:fillRef idx="0">
-            <a:schemeClr val="dk1"/>
-          </a:fillRef>
-          <a:effectRef idx="1">
-            <a:schemeClr val="dk1"/>
-          </a:effectRef>
-          <a:fontRef idx="minor">
-            <a:schemeClr val="tx1"/>
-          </a:fontRef>
-        </p:style>
-      </p:cxnSp>
-      <p:sp>
-        <p:nvSpPr>
-          <p:cNvPr id="21" name="TextBox 20"/>
-          <p:cNvSpPr txBox="1"/>
-          <p:nvPr/>
-        </p:nvSpPr>
-        <p:spPr>
-          <a:xfrm>
-            <a:off x="1828800" y="805190"/>
-            <a:ext cx="990977" cy="261610"/>
-          </a:xfrm>
-          <a:prstGeom prst="rect">
-            <a:avLst/>
-          </a:prstGeom>
-          <a:noFill/>
-        </p:spPr>
-        <p:txBody>
-          <a:bodyPr wrap="none" rtlCol="0">
-            <a:spAutoFit/>
-          </a:bodyPr>
-          <a:lstStyle/>
-          <a:p>
-            <a:r>
-              <a:rPr lang="en-US" sz="1050" smtClean="0">
-                <a:latin typeface="Helvetica" panose="020B0604020202030204" pitchFamily="34" charset="0"/>
-              </a:rPr>
-              <a:t>spark-submit</a:t>
-            </a:r>
-            <a:endParaRPr lang="en-US" sz="1050">
-              <a:latin typeface="Helvetica" panose="020B0604020202030204" pitchFamily="34" charset="0"/>
-            </a:endParaRPr>
-          </a:p>
-        </p:txBody>
-      </p:sp>
-      <p:sp>
-        <p:nvSpPr>
-          <p:cNvPr id="22" name="Flowchart: Process 21"/>
-          <p:cNvSpPr/>
-          <p:nvPr/>
-        </p:nvSpPr>
-        <p:spPr>
-          <a:xfrm>
-            <a:off x="685800" y="855382"/>
-            <a:ext cx="1143000" cy="379645"/>
-          </a:xfrm>
-          <a:prstGeom prst="flowChartProcess">
-            <a:avLst/>
-          </a:prstGeom>
-          <a:ln w="9525"/>
-        </p:spPr>
-        <p:style>
-          <a:lnRef idx="2">
-            <a:schemeClr val="dk1"/>
-          </a:lnRef>
-          <a:fillRef idx="1">
-            <a:schemeClr val="lt1"/>
-          </a:fillRef>
-          <a:effectRef idx="0">
-            <a:schemeClr val="dk1"/>
-          </a:effectRef>
-          <a:fontRef idx="minor">
-            <a:schemeClr val="dk1"/>
-          </a:fontRef>
-        </p:style>
-        <p:txBody>
-          <a:bodyPr rot="0" spcFirstLastPara="0" vertOverflow="overflow" horzOverflow="overflow" vert="horz" wrap="square" lIns="91440" tIns="45720" rIns="91440" bIns="45720" numCol="1" spcCol="0" rtlCol="0" fromWordArt="0" anchor="ctr" anchorCtr="0" forceAA="0" compatLnSpc="1">
-            <a:prstTxWarp prst="textNoShape">
-              <a:avLst/>
-            </a:prstTxWarp>
-            <a:noAutofit/>
-          </a:bodyPr>
-          <a:lstStyle/>
-          <a:p>
-            <a:pPr algn="ctr"/>
-            <a:r>
-              <a:rPr lang="en-US" sz="1100" smtClean="0">
-                <a:latin typeface="Helvetica" panose="020B0604020202030204" pitchFamily="34" charset="0"/>
-              </a:rPr>
-              <a:t>de</a:t>
-            </a:r>
-            <a:r>
-              <a:rPr lang="en-US" sz="1100" smtClean="0">
-                <a:latin typeface="Helvetica" panose="020B0604020202030204" pitchFamily="34" charset="0"/>
-              </a:rPr>
-              <a:t>velopment environment</a:t>
-            </a:r>
-            <a:endParaRPr lang="en-US" sz="1100" smtClean="0">
-              <a:latin typeface="Helvetica" panose="020B0604020202030204" pitchFamily="34" charset="0"/>
-            </a:endParaRPr>
-          </a:p>
-        </p:txBody>
-      </p:sp>
-      <p:sp>
-        <p:nvSpPr>
-          <p:cNvPr id="24" name="Flowchart: Process 23"/>
-          <p:cNvSpPr/>
-          <p:nvPr/>
-        </p:nvSpPr>
-        <p:spPr>
-          <a:xfrm>
-            <a:off x="3127479" y="855381"/>
-            <a:ext cx="1143000" cy="379645"/>
-          </a:xfrm>
-          <a:prstGeom prst="flowChartProcess">
-            <a:avLst/>
-          </a:prstGeom>
-          <a:ln w="9525"/>
-        </p:spPr>
-        <p:style>
-          <a:lnRef idx="2">
-            <a:schemeClr val="dk1"/>
-          </a:lnRef>
-          <a:fillRef idx="1">
-            <a:schemeClr val="lt1"/>
-          </a:fillRef>
-          <a:effectRef idx="0">
-            <a:schemeClr val="dk1"/>
-          </a:effectRef>
-          <a:fontRef idx="minor">
-            <a:schemeClr val="dk1"/>
-          </a:fontRef>
-        </p:style>
-        <p:txBody>
-          <a:bodyPr rot="0" spcFirstLastPara="0" vertOverflow="overflow" horzOverflow="overflow" vert="horz" wrap="square" lIns="91440" tIns="45720" rIns="91440" bIns="45720" numCol="1" spcCol="0" rtlCol="0" fromWordArt="0" anchor="ctr" anchorCtr="0" forceAA="0" compatLnSpc="1">
-            <a:prstTxWarp prst="textNoShape">
-              <a:avLst/>
-            </a:prstTxWarp>
-            <a:noAutofit/>
-          </a:bodyPr>
-          <a:lstStyle/>
-          <a:p>
-            <a:pPr algn="ctr"/>
-            <a:r>
-              <a:rPr lang="en-US" sz="1100" smtClean="0">
-                <a:latin typeface="Helvetica" panose="020B0604020202030204" pitchFamily="34" charset="0"/>
-              </a:rPr>
-              <a:t>master</a:t>
-            </a:r>
-            <a:endParaRPr lang="en-US" sz="1100" smtClean="0">
-              <a:latin typeface="Helvetica" panose="020B0604020202030204" pitchFamily="34" charset="0"/>
-            </a:endParaRPr>
-          </a:p>
-        </p:txBody>
-      </p:sp>
-      <p:sp>
-        <p:nvSpPr>
-          <p:cNvPr id="25" name="Flowchart: Process 24"/>
-          <p:cNvSpPr/>
-          <p:nvPr/>
-        </p:nvSpPr>
-        <p:spPr>
-          <a:xfrm>
-            <a:off x="4572000" y="855382"/>
-            <a:ext cx="1143000" cy="379645"/>
-          </a:xfrm>
-          <a:prstGeom prst="flowChartProcess">
-            <a:avLst/>
-          </a:prstGeom>
-          <a:ln w="9525"/>
-        </p:spPr>
-        <p:style>
-          <a:lnRef idx="2">
-            <a:schemeClr val="dk1"/>
-          </a:lnRef>
-          <a:fillRef idx="1">
-            <a:schemeClr val="lt1"/>
-          </a:fillRef>
-          <a:effectRef idx="0">
-            <a:schemeClr val="dk1"/>
-          </a:effectRef>
-          <a:fontRef idx="minor">
-            <a:schemeClr val="dk1"/>
-          </a:fontRef>
-        </p:style>
-        <p:txBody>
-          <a:bodyPr rot="0" spcFirstLastPara="0" vertOverflow="overflow" horzOverflow="overflow" vert="horz" wrap="square" lIns="91440" tIns="45720" rIns="91440" bIns="45720" numCol="1" spcCol="0" rtlCol="0" fromWordArt="0" anchor="ctr" anchorCtr="0" forceAA="0" compatLnSpc="1">
-            <a:prstTxWarp prst="textNoShape">
-              <a:avLst/>
-            </a:prstTxWarp>
-            <a:noAutofit/>
-          </a:bodyPr>
-          <a:lstStyle/>
-          <a:p>
-            <a:pPr algn="ctr"/>
-            <a:r>
-              <a:rPr lang="en-US" sz="1100" smtClean="0">
-                <a:latin typeface="Helvetica" panose="020B0604020202030204" pitchFamily="34" charset="0"/>
-              </a:rPr>
-              <a:t>worker</a:t>
-            </a:r>
-            <a:endParaRPr lang="en-US" sz="1100" smtClean="0">
-              <a:latin typeface="Helvetica" panose="020B0604020202030204" pitchFamily="34" charset="0"/>
-            </a:endParaRPr>
-          </a:p>
-        </p:txBody>
-      </p:sp>
       <p:grpSp>
         <p:nvGrpSpPr>
-          <p:cNvPr id="16" name="Group 15"/>
+          <p:cNvPr id="2" name="Group 1"/>
           <p:cNvGrpSpPr/>
           <p:nvPr/>
         </p:nvGrpSpPr>
         <p:grpSpPr>
           <a:xfrm>
-            <a:off x="609600" y="2438400"/>
-            <a:ext cx="7154659" cy="1295399"/>
-            <a:chOff x="2895600" y="2510135"/>
-            <a:chExt cx="7154659" cy="1295399"/>
+            <a:off x="838200" y="701017"/>
+            <a:ext cx="2971800" cy="1188767"/>
+            <a:chOff x="838200" y="685800"/>
+            <a:chExt cx="2971800" cy="1188767"/>
           </a:xfrm>
         </p:grpSpPr>
         <p:sp>
           <p:nvSpPr>
-            <p:cNvPr id="34" name="TextBox 33"/>
-            <p:cNvSpPr txBox="1"/>
-            <p:nvPr/>
-          </p:nvSpPr>
-          <p:spPr>
-            <a:xfrm>
-              <a:off x="8257782" y="2510135"/>
-              <a:ext cx="1792477" cy="461665"/>
-            </a:xfrm>
-            <a:prstGeom prst="rect">
-              <a:avLst/>
-            </a:prstGeom>
-            <a:noFill/>
-          </p:spPr>
-          <p:txBody>
-            <a:bodyPr wrap="none" rtlCol="0">
-              <a:spAutoFit/>
-            </a:bodyPr>
-            <a:lstStyle/>
-            <a:p>
-              <a:pPr algn="ctr"/>
-              <a:r>
-                <a:rPr lang="en-US" sz="1200" b="1" smtClean="0">
-                  <a:latin typeface="Helvetica" panose="020B0604020202030204" pitchFamily="34" charset="0"/>
-                </a:rPr>
-                <a:t>Tutorial </a:t>
-              </a:r>
-              <a:r>
-                <a:rPr lang="en-US" sz="1200" b="1" smtClean="0">
-                  <a:latin typeface="Helvetica" panose="020B0604020202030204" pitchFamily="34" charset="0"/>
-                </a:rPr>
-                <a:t>Spark Cluster</a:t>
-              </a:r>
-            </a:p>
-            <a:p>
-              <a:r>
-                <a:rPr lang="en-US" sz="1200" smtClean="0">
-                  <a:latin typeface="Helvetica" panose="020B0604020202030204" pitchFamily="34" charset="0"/>
-                </a:rPr>
-                <a:t>1 instance with 3 roles</a:t>
-              </a:r>
-              <a:endParaRPr lang="en-US" sz="1200">
-                <a:latin typeface="Helvetica" panose="020B0604020202030204" pitchFamily="34" charset="0"/>
-              </a:endParaRPr>
-            </a:p>
-          </p:txBody>
-        </p:sp>
-        <p:sp>
-          <p:nvSpPr>
-            <p:cNvPr id="35" name="Flowchart: Process 34"/>
+            <p:cNvPr id="4" name="Flowchart: Process 3"/>
             <p:cNvSpPr/>
             <p:nvPr/>
           </p:nvSpPr>
           <p:spPr>
             <a:xfrm>
-              <a:off x="2895600" y="2514600"/>
-              <a:ext cx="5334000" cy="1290934"/>
-            </a:xfrm>
-            <a:prstGeom prst="flowChartProcess">
-              <a:avLst/>
-            </a:prstGeom>
-          </p:spPr>
-          <p:style>
-            <a:lnRef idx="1">
-              <a:schemeClr val="dk1"/>
-            </a:lnRef>
-            <a:fillRef idx="2">
-              <a:schemeClr val="dk1"/>
-            </a:fillRef>
-            <a:effectRef idx="1">
-              <a:schemeClr val="dk1"/>
-            </a:effectRef>
-            <a:fontRef idx="minor">
-              <a:schemeClr val="dk1"/>
-            </a:fontRef>
-          </p:style>
-          <p:txBody>
-            <a:bodyPr rot="0" spcFirstLastPara="0" vertOverflow="overflow" horzOverflow="overflow" vert="horz" wrap="square" lIns="91440" tIns="45720" rIns="91440" bIns="45720" numCol="1" spcCol="0" rtlCol="0" fromWordArt="0" anchor="b" anchorCtr="0" forceAA="0" compatLnSpc="1">
-              <a:prstTxWarp prst="textNoShape">
-                <a:avLst/>
-              </a:prstTxWarp>
-              <a:noAutofit/>
-            </a:bodyPr>
-            <a:lstStyle/>
-            <a:p>
-              <a:pPr algn="ctr"/>
-              <a:r>
-                <a:rPr lang="en-US" sz="1200" i="1" smtClean="0">
-                  <a:latin typeface="Helvetica" panose="020B0604020202030204" pitchFamily="34" charset="0"/>
-                </a:rPr>
-                <a:t>sparkour-app</a:t>
-              </a:r>
-              <a:endParaRPr lang="en-US" sz="1200" i="1" smtClean="0">
-                <a:latin typeface="Helvetica" panose="020B0604020202030204" pitchFamily="34" charset="0"/>
-              </a:endParaRPr>
-            </a:p>
-          </p:txBody>
-        </p:sp>
-        <p:sp>
-          <p:nvSpPr>
-            <p:cNvPr id="29" name="Flowchart: Process 28"/>
-            <p:cNvSpPr/>
-            <p:nvPr/>
-          </p:nvSpPr>
-          <p:spPr>
-            <a:xfrm>
-              <a:off x="5257800" y="2667000"/>
-              <a:ext cx="2834702" cy="762000"/>
+              <a:off x="838200" y="685800"/>
+              <a:ext cx="2971800" cy="1188767"/>
             </a:xfrm>
             <a:prstGeom prst="flowChartProcess">
               <a:avLst/>
@@ -5009,99 +4142,29 @@
             </a:p>
           </p:txBody>
         </p:sp>
-        <p:cxnSp>
-          <p:nvCxnSpPr>
-            <p:cNvPr id="36" name="Straight Arrow Connector 35"/>
-            <p:cNvCxnSpPr>
-              <a:endCxn id="41" idx="1"/>
-            </p:cNvCxnSpPr>
-            <p:nvPr/>
-          </p:nvCxnSpPr>
-          <p:spPr>
-            <a:xfrm flipV="1">
-              <a:off x="4114800" y="3026403"/>
-              <a:ext cx="1298679" cy="1"/>
-            </a:xfrm>
-            <a:prstGeom prst="straightConnector1">
-              <a:avLst/>
-            </a:prstGeom>
-            <a:ln>
-              <a:tailEnd type="arrow"/>
-            </a:ln>
-          </p:spPr>
-          <p:style>
-            <a:lnRef idx="2">
-              <a:schemeClr val="dk1"/>
-            </a:lnRef>
-            <a:fillRef idx="0">
-              <a:schemeClr val="dk1"/>
-            </a:fillRef>
-            <a:effectRef idx="1">
-              <a:schemeClr val="dk1"/>
-            </a:effectRef>
-            <a:fontRef idx="minor">
-              <a:schemeClr val="tx1"/>
-            </a:fontRef>
-          </p:style>
-        </p:cxnSp>
         <p:sp>
           <p:nvSpPr>
-            <p:cNvPr id="37" name="TextBox 36"/>
-            <p:cNvSpPr txBox="1"/>
-            <p:nvPr/>
-          </p:nvSpPr>
-          <p:spPr>
-            <a:xfrm>
-              <a:off x="4038600" y="2786390"/>
-              <a:ext cx="990977" cy="261610"/>
-            </a:xfrm>
-            <a:prstGeom prst="rect">
-              <a:avLst/>
-            </a:prstGeom>
-            <a:noFill/>
-          </p:spPr>
-          <p:txBody>
-            <a:bodyPr wrap="none" rtlCol="0">
-              <a:spAutoFit/>
-            </a:bodyPr>
-            <a:lstStyle/>
-            <a:p>
-              <a:r>
-                <a:rPr lang="en-US" sz="1050" smtClean="0">
-                  <a:latin typeface="Helvetica" panose="020B0604020202030204" pitchFamily="34" charset="0"/>
-                </a:rPr>
-                <a:t>spark-submit</a:t>
-              </a:r>
-              <a:endParaRPr lang="en-US" sz="1050">
-                <a:latin typeface="Helvetica" panose="020B0604020202030204" pitchFamily="34" charset="0"/>
-              </a:endParaRPr>
-            </a:p>
-          </p:txBody>
-        </p:sp>
-        <p:sp>
-          <p:nvSpPr>
-            <p:cNvPr id="39" name="Flowchart: Process 38"/>
+            <p:cNvPr id="7" name="Flowchart: Process 6"/>
             <p:cNvSpPr/>
             <p:nvPr/>
           </p:nvSpPr>
           <p:spPr>
             <a:xfrm>
-              <a:off x="2971800" y="2836581"/>
-              <a:ext cx="1143000" cy="379645"/>
+              <a:off x="917679" y="838200"/>
+              <a:ext cx="1295400" cy="762000"/>
             </a:xfrm>
             <a:prstGeom prst="flowChartProcess">
               <a:avLst/>
             </a:prstGeom>
-            <a:ln w="9525"/>
           </p:spPr>
           <p:style>
-            <a:lnRef idx="2">
+            <a:lnRef idx="1">
               <a:schemeClr val="dk1"/>
             </a:lnRef>
-            <a:fillRef idx="1">
-              <a:schemeClr val="lt1"/>
+            <a:fillRef idx="2">
+              <a:schemeClr val="dk1"/>
             </a:fillRef>
-            <a:effectRef idx="0">
+            <a:effectRef idx="1">
               <a:schemeClr val="dk1"/>
             </a:effectRef>
             <a:fontRef idx="minor">
@@ -5119,47 +4182,37 @@
             <a:p>
               <a:pPr algn="ctr"/>
               <a:r>
-                <a:rPr lang="en-US" sz="1100" smtClean="0">
+                <a:rPr lang="en-US" smtClean="0">
                   <a:latin typeface="Helvetica" panose="020B0604020202030204" pitchFamily="34" charset="0"/>
                 </a:rPr>
-                <a:t>de</a:t>
+                <a:t>Master</a:t>
               </a:r>
-              <a:r>
-                <a:rPr lang="en-US" sz="1100" smtClean="0">
-                  <a:latin typeface="Helvetica" panose="020B0604020202030204" pitchFamily="34" charset="0"/>
-                </a:rPr>
-                <a:t>velopment environment</a:t>
-              </a:r>
-              <a:endParaRPr lang="en-US" sz="1100" smtClean="0">
-                <a:latin typeface="Helvetica" panose="020B0604020202030204" pitchFamily="34" charset="0"/>
-              </a:endParaRPr>
             </a:p>
           </p:txBody>
         </p:sp>
         <p:sp>
           <p:nvSpPr>
-            <p:cNvPr id="41" name="Flowchart: Process 40"/>
+            <p:cNvPr id="26" name="Flowchart: Process 25"/>
             <p:cNvSpPr/>
             <p:nvPr/>
           </p:nvSpPr>
           <p:spPr>
             <a:xfrm>
-              <a:off x="5413479" y="2836580"/>
-              <a:ext cx="1143000" cy="379645"/>
+              <a:off x="2377502" y="846667"/>
+              <a:ext cx="1295400" cy="762000"/>
             </a:xfrm>
             <a:prstGeom prst="flowChartProcess">
               <a:avLst/>
             </a:prstGeom>
-            <a:ln w="9525"/>
           </p:spPr>
           <p:style>
-            <a:lnRef idx="2">
+            <a:lnRef idx="1">
               <a:schemeClr val="dk1"/>
             </a:lnRef>
-            <a:fillRef idx="1">
-              <a:schemeClr val="lt1"/>
+            <a:fillRef idx="2">
+              <a:schemeClr val="dk1"/>
             </a:fillRef>
-            <a:effectRef idx="0">
+            <a:effectRef idx="1">
               <a:schemeClr val="dk1"/>
             </a:effectRef>
             <a:fontRef idx="minor">
@@ -5177,12 +4230,43 @@
             <a:p>
               <a:pPr algn="ctr"/>
               <a:r>
-                <a:rPr lang="en-US" sz="1100" smtClean="0">
+                <a:rPr lang="en-US" smtClean="0">
                   <a:latin typeface="Helvetica" panose="020B0604020202030204" pitchFamily="34" charset="0"/>
                 </a:rPr>
-                <a:t>master</a:t>
+                <a:t>Slave 1</a:t>
               </a:r>
-              <a:endParaRPr lang="en-US" sz="1100" smtClean="0">
+            </a:p>
+          </p:txBody>
+        </p:sp>
+        <p:sp>
+          <p:nvSpPr>
+            <p:cNvPr id="28" name="TextBox 27"/>
+            <p:cNvSpPr txBox="1"/>
+            <p:nvPr/>
+          </p:nvSpPr>
+          <p:spPr>
+            <a:xfrm>
+              <a:off x="914400" y="1597568"/>
+              <a:ext cx="1301959" cy="276999"/>
+            </a:xfrm>
+            <a:prstGeom prst="rect">
+              <a:avLst/>
+            </a:prstGeom>
+            <a:noFill/>
+          </p:spPr>
+          <p:txBody>
+            <a:bodyPr wrap="none" rtlCol="0">
+              <a:spAutoFit/>
+            </a:bodyPr>
+            <a:lstStyle/>
+            <a:p>
+              <a:r>
+                <a:rPr lang="en-US" sz="1200" smtClean="0">
+                  <a:latin typeface="Helvetica" panose="020B0604020202030204" pitchFamily="34" charset="0"/>
+                </a:rPr>
+                <a:t>sparkour-master</a:t>
+              </a:r>
+              <a:endParaRPr lang="en-US" sz="1200">
                 <a:latin typeface="Helvetica" panose="020B0604020202030204" pitchFamily="34" charset="0"/>
               </a:endParaRPr>
             </a:p>
@@ -5190,28 +4274,116 @@
         </p:sp>
         <p:sp>
           <p:nvSpPr>
-            <p:cNvPr id="47" name="Flowchart: Process 46"/>
+            <p:cNvPr id="30" name="TextBox 29"/>
+            <p:cNvSpPr txBox="1"/>
+            <p:nvPr/>
+          </p:nvSpPr>
+          <p:spPr>
+            <a:xfrm>
+              <a:off x="2362200" y="1597568"/>
+              <a:ext cx="1326004" cy="276999"/>
+            </a:xfrm>
+            <a:prstGeom prst="rect">
+              <a:avLst/>
+            </a:prstGeom>
+            <a:noFill/>
+          </p:spPr>
+          <p:txBody>
+            <a:bodyPr wrap="none" rtlCol="0">
+              <a:spAutoFit/>
+            </a:bodyPr>
+            <a:lstStyle/>
+            <a:p>
+              <a:r>
+                <a:rPr lang="en-US" sz="1200" smtClean="0">
+                  <a:latin typeface="Helvetica" panose="020B0604020202030204" pitchFamily="34" charset="0"/>
+                </a:rPr>
+                <a:t>sparkour-slave-1</a:t>
+              </a:r>
+              <a:endParaRPr lang="en-US" sz="1200">
+                <a:latin typeface="Helvetica" panose="020B0604020202030204" pitchFamily="34" charset="0"/>
+              </a:endParaRPr>
+            </a:p>
+          </p:txBody>
+        </p:sp>
+      </p:grpSp>
+      <p:grpSp>
+        <p:nvGrpSpPr>
+          <p:cNvPr id="3" name="Group 2"/>
+          <p:cNvGrpSpPr/>
+          <p:nvPr/>
+        </p:nvGrpSpPr>
+        <p:grpSpPr>
+          <a:xfrm>
+            <a:off x="4191000" y="691634"/>
+            <a:ext cx="2959403" cy="1207532"/>
+            <a:chOff x="4191000" y="697468"/>
+            <a:chExt cx="2959403" cy="1207532"/>
+          </a:xfrm>
+        </p:grpSpPr>
+        <p:sp>
+          <p:nvSpPr>
+            <p:cNvPr id="33" name="Flowchart: Process 32"/>
             <p:cNvSpPr/>
             <p:nvPr/>
           </p:nvSpPr>
           <p:spPr>
             <a:xfrm>
-              <a:off x="6858000" y="2836581"/>
-              <a:ext cx="1143000" cy="379645"/>
+              <a:off x="4191000" y="697468"/>
+              <a:ext cx="2959403" cy="1207532"/>
             </a:xfrm>
             <a:prstGeom prst="flowChartProcess">
               <a:avLst/>
             </a:prstGeom>
-            <a:ln w="9525"/>
           </p:spPr>
           <p:style>
-            <a:lnRef idx="2">
+            <a:lnRef idx="1">
+              <a:schemeClr val="accent1"/>
+            </a:lnRef>
+            <a:fillRef idx="2">
+              <a:schemeClr val="accent1"/>
+            </a:fillRef>
+            <a:effectRef idx="1">
+              <a:schemeClr val="accent1"/>
+            </a:effectRef>
+            <a:fontRef idx="minor">
+              <a:schemeClr val="dk1"/>
+            </a:fontRef>
+          </p:style>
+          <p:txBody>
+            <a:bodyPr rtlCol="0" anchor="b"/>
+            <a:lstStyle/>
+            <a:p>
+              <a:pPr algn="ctr"/>
+              <a:endParaRPr lang="en-US">
+                <a:latin typeface="Helvetica" panose="020B0604020202030204" pitchFamily="34" charset="0"/>
+              </a:endParaRPr>
+            </a:p>
+          </p:txBody>
+        </p:sp>
+        <p:sp>
+          <p:nvSpPr>
+            <p:cNvPr id="40" name="Flowchart: Process 39"/>
+            <p:cNvSpPr/>
+            <p:nvPr/>
+          </p:nvSpPr>
+          <p:spPr>
+            <a:xfrm>
+              <a:off x="4267200" y="849868"/>
+              <a:ext cx="1295400" cy="762000"/>
+            </a:xfrm>
+            <a:prstGeom prst="flowChartProcess">
+              <a:avLst/>
+            </a:prstGeom>
+          </p:spPr>
+          <p:style>
+            <a:lnRef idx="1">
               <a:schemeClr val="dk1"/>
             </a:lnRef>
-            <a:fillRef idx="1">
-              <a:schemeClr val="lt1"/>
+            <a:fillRef idx="2">
+              <a:schemeClr val="dk1"/>
             </a:fillRef>
-            <a:effectRef idx="0">
+            <a:effectRef idx="1">
               <a:schemeClr val="dk1"/>
             </a:effectRef>
             <a:fontRef idx="minor">
@@ -5229,272 +4401,219 @@
             <a:p>
               <a:pPr algn="ctr"/>
               <a:r>
-                <a:rPr lang="en-US" sz="1100" smtClean="0">
+                <a:rPr lang="en-US" smtClean="0">
                   <a:latin typeface="Helvetica" panose="020B0604020202030204" pitchFamily="34" charset="0"/>
                 </a:rPr>
-                <a:t>worker</a:t>
+                <a:t>Master</a:t>
               </a:r>
-              <a:endParaRPr lang="en-US" sz="1100" smtClean="0">
+            </a:p>
+          </p:txBody>
+        </p:sp>
+        <p:sp>
+          <p:nvSpPr>
+            <p:cNvPr id="42" name="Flowchart: Process 41"/>
+            <p:cNvSpPr/>
+            <p:nvPr/>
+          </p:nvSpPr>
+          <p:spPr>
+            <a:xfrm>
+              <a:off x="5702603" y="858335"/>
+              <a:ext cx="1295400" cy="762000"/>
+            </a:xfrm>
+            <a:prstGeom prst="flowChartProcess">
+              <a:avLst/>
+            </a:prstGeom>
+          </p:spPr>
+          <p:style>
+            <a:lnRef idx="1">
+              <a:schemeClr val="dk1"/>
+            </a:lnRef>
+            <a:fillRef idx="2">
+              <a:schemeClr val="dk1"/>
+            </a:fillRef>
+            <a:effectRef idx="1">
+              <a:schemeClr val="dk1"/>
+            </a:effectRef>
+            <a:fontRef idx="minor">
+              <a:schemeClr val="dk1"/>
+            </a:fontRef>
+          </p:style>
+          <p:txBody>
+            <a:bodyPr rot="0" spcFirstLastPara="0" vertOverflow="overflow" horzOverflow="overflow" vert="horz" wrap="square" lIns="91440" tIns="45720" rIns="91440" bIns="45720" numCol="1" spcCol="0" rtlCol="0" fromWordArt="0" anchor="ctr" anchorCtr="0" forceAA="0" compatLnSpc="1">
+              <a:prstTxWarp prst="textNoShape">
+                <a:avLst/>
+              </a:prstTxWarp>
+              <a:noAutofit/>
+            </a:bodyPr>
+            <a:lstStyle/>
+            <a:p>
+              <a:pPr algn="ctr"/>
+              <a:r>
+                <a:rPr lang="en-US" smtClean="0">
+                  <a:latin typeface="Helvetica" panose="020B0604020202030204" pitchFamily="34" charset="0"/>
+                </a:rPr>
+                <a:t>Slave 1</a:t>
+              </a:r>
+            </a:p>
+          </p:txBody>
+        </p:sp>
+        <p:sp>
+          <p:nvSpPr>
+            <p:cNvPr id="43" name="TextBox 42"/>
+            <p:cNvSpPr txBox="1"/>
+            <p:nvPr/>
+          </p:nvSpPr>
+          <p:spPr>
+            <a:xfrm>
+              <a:off x="4371322" y="1597568"/>
+              <a:ext cx="1087157" cy="276999"/>
+            </a:xfrm>
+            <a:prstGeom prst="rect">
+              <a:avLst/>
+            </a:prstGeom>
+            <a:noFill/>
+          </p:spPr>
+          <p:txBody>
+            <a:bodyPr wrap="none" rtlCol="0">
+              <a:spAutoFit/>
+            </a:bodyPr>
+            <a:lstStyle/>
+            <a:p>
+              <a:r>
+                <a:rPr lang="en-US" sz="1200" smtClean="0">
+                  <a:latin typeface="Helvetica" panose="020B0604020202030204" pitchFamily="34" charset="0"/>
+                </a:rPr>
+                <a:t>sparkour-app</a:t>
+              </a:r>
+              <a:endParaRPr lang="en-US" sz="1200">
+                <a:latin typeface="Helvetica" panose="020B0604020202030204" pitchFamily="34" charset="0"/>
+              </a:endParaRPr>
+            </a:p>
+          </p:txBody>
+        </p:sp>
+        <p:sp>
+          <p:nvSpPr>
+            <p:cNvPr id="44" name="TextBox 43"/>
+            <p:cNvSpPr txBox="1"/>
+            <p:nvPr/>
+          </p:nvSpPr>
+          <p:spPr>
+            <a:xfrm>
+              <a:off x="5806725" y="1597568"/>
+              <a:ext cx="1087157" cy="276999"/>
+            </a:xfrm>
+            <a:prstGeom prst="rect">
+              <a:avLst/>
+            </a:prstGeom>
+            <a:noFill/>
+          </p:spPr>
+          <p:txBody>
+            <a:bodyPr wrap="none" rtlCol="0">
+              <a:spAutoFit/>
+            </a:bodyPr>
+            <a:lstStyle/>
+            <a:p>
+              <a:r>
+                <a:rPr lang="en-US" sz="1200" smtClean="0">
+                  <a:latin typeface="Helvetica" panose="020B0604020202030204" pitchFamily="34" charset="0"/>
+                </a:rPr>
+                <a:t>sparkour-app</a:t>
+              </a:r>
+              <a:endParaRPr lang="en-US" sz="1200">
                 <a:latin typeface="Helvetica" panose="020B0604020202030204" pitchFamily="34" charset="0"/>
               </a:endParaRPr>
             </a:p>
           </p:txBody>
         </p:sp>
       </p:grpSp>
-      <p:grpSp>
-        <p:nvGrpSpPr>
-          <p:cNvPr id="53" name="Group 52"/>
-          <p:cNvGrpSpPr/>
+      <p:sp>
+        <p:nvSpPr>
+          <p:cNvPr id="45" name="TextBox 44"/>
+          <p:cNvSpPr txBox="1"/>
           <p:nvPr/>
-        </p:nvGrpSpPr>
-        <p:grpSpPr>
-          <a:xfrm>
-            <a:off x="6553200" y="2971800"/>
-            <a:ext cx="1066800" cy="1143000"/>
-            <a:chOff x="6172200" y="1600200"/>
-            <a:chExt cx="1066800" cy="1143000"/>
-          </a:xfrm>
-        </p:grpSpPr>
-        <p:sp>
-          <p:nvSpPr>
-            <p:cNvPr id="20" name="Rounded Rectangle 19"/>
-            <p:cNvSpPr/>
-            <p:nvPr/>
-          </p:nvSpPr>
-          <p:spPr>
-            <a:xfrm>
-              <a:off x="6172200" y="1600200"/>
-              <a:ext cx="1066800" cy="1143000"/>
-            </a:xfrm>
-            <a:prstGeom prst="roundRect">
-              <a:avLst/>
-            </a:prstGeom>
-          </p:spPr>
-          <p:style>
-            <a:lnRef idx="1">
-              <a:schemeClr val="accent3"/>
-            </a:lnRef>
-            <a:fillRef idx="2">
-              <a:schemeClr val="accent3"/>
-            </a:fillRef>
-            <a:effectRef idx="1">
-              <a:schemeClr val="accent3"/>
-            </a:effectRef>
-            <a:fontRef idx="minor">
-              <a:schemeClr val="dk1"/>
-            </a:fontRef>
-          </p:style>
-          <p:txBody>
-            <a:bodyPr rtlCol="0" anchor="b"/>
-            <a:lstStyle/>
-            <a:p>
-              <a:pPr algn="ctr"/>
-              <a:endParaRPr lang="en-US" smtClean="0">
+        </p:nvSpPr>
+        <p:spPr>
+          <a:xfrm>
+            <a:off x="1084819" y="1906355"/>
+            <a:ext cx="2478564" cy="461665"/>
+          </a:xfrm>
+          <a:prstGeom prst="rect">
+            <a:avLst/>
+          </a:prstGeom>
+          <a:noFill/>
+        </p:spPr>
+        <p:txBody>
+          <a:bodyPr wrap="none" rtlCol="0">
+            <a:spAutoFit/>
+          </a:bodyPr>
+          <a:lstStyle/>
+          <a:p>
+            <a:pPr algn="ctr"/>
+            <a:r>
+              <a:rPr lang="en-US" sz="1200" b="1" smtClean="0">
                 <a:latin typeface="Helvetica" panose="020B0604020202030204" pitchFamily="34" charset="0"/>
-              </a:endParaRPr>
-            </a:p>
-          </p:txBody>
-        </p:sp>
-        <p:grpSp>
-          <p:nvGrpSpPr>
-            <p:cNvPr id="18" name="Group 17"/>
-            <p:cNvGrpSpPr/>
-            <p:nvPr/>
-          </p:nvGrpSpPr>
-          <p:grpSpPr>
-            <a:xfrm>
-              <a:off x="6248400" y="1752600"/>
-              <a:ext cx="915440" cy="962799"/>
-              <a:chOff x="6324600" y="1752600"/>
-              <a:chExt cx="915440" cy="962799"/>
-            </a:xfrm>
-          </p:grpSpPr>
-          <p:sp>
-            <p:nvSpPr>
-              <p:cNvPr id="48" name="Flowchart: Process 47"/>
-              <p:cNvSpPr/>
-              <p:nvPr/>
-            </p:nvSpPr>
-            <p:spPr>
-              <a:xfrm>
-                <a:off x="6331611" y="1752600"/>
-                <a:ext cx="908429" cy="228600"/>
-              </a:xfrm>
-              <a:prstGeom prst="flowChartProcess">
-                <a:avLst/>
-              </a:prstGeom>
-            </p:spPr>
-            <p:style>
-              <a:lnRef idx="1">
-                <a:schemeClr val="dk1"/>
-              </a:lnRef>
-              <a:fillRef idx="2">
-                <a:schemeClr val="dk1"/>
-              </a:fillRef>
-              <a:effectRef idx="1">
-                <a:schemeClr val="dk1"/>
-              </a:effectRef>
-              <a:fontRef idx="minor">
-                <a:schemeClr val="dk1"/>
-              </a:fontRef>
-            </p:style>
-            <p:txBody>
-              <a:bodyPr rot="0" spcFirstLastPara="0" vertOverflow="overflow" horzOverflow="overflow" vert="horz" wrap="square" lIns="91440" tIns="45720" rIns="91440" bIns="45720" numCol="1" spcCol="0" rtlCol="0" fromWordArt="0" anchor="ctr" anchorCtr="0" forceAA="0" compatLnSpc="1">
-                <a:prstTxWarp prst="textNoShape">
-                  <a:avLst/>
-                </a:prstTxWarp>
-                <a:noAutofit/>
-              </a:bodyPr>
-              <a:lstStyle/>
-              <a:p>
-                <a:pPr algn="ctr"/>
-                <a:r>
-                  <a:rPr lang="en-US" sz="800" i="1" smtClean="0">
-                    <a:latin typeface="Helvetica" panose="020B0604020202030204" pitchFamily="34" charset="0"/>
-                  </a:rPr>
-                  <a:t>instance</a:t>
-                </a:r>
-                <a:endParaRPr lang="en-US" sz="800" i="1" smtClean="0">
-                  <a:latin typeface="Helvetica" panose="020B0604020202030204" pitchFamily="34" charset="0"/>
-                </a:endParaRPr>
-              </a:p>
-            </p:txBody>
-          </p:sp>
-          <p:sp>
-            <p:nvSpPr>
-              <p:cNvPr id="50" name="Flowchart: Process 49"/>
-              <p:cNvSpPr/>
-              <p:nvPr/>
-            </p:nvSpPr>
-            <p:spPr>
-              <a:xfrm>
-                <a:off x="6324600" y="2031569"/>
-                <a:ext cx="914400" cy="178231"/>
-              </a:xfrm>
-              <a:prstGeom prst="flowChartProcess">
-                <a:avLst/>
-              </a:prstGeom>
-              <a:ln w="9525"/>
-            </p:spPr>
-            <p:style>
-              <a:lnRef idx="2">
-                <a:schemeClr val="dk1"/>
-              </a:lnRef>
-              <a:fillRef idx="1">
-                <a:schemeClr val="lt1"/>
-              </a:fillRef>
-              <a:effectRef idx="0">
-                <a:schemeClr val="dk1"/>
-              </a:effectRef>
-              <a:fontRef idx="minor">
-                <a:schemeClr val="dk1"/>
-              </a:fontRef>
-            </p:style>
-            <p:txBody>
-              <a:bodyPr rot="0" spcFirstLastPara="0" vertOverflow="overflow" horzOverflow="overflow" vert="horz" wrap="square" lIns="91440" tIns="45720" rIns="91440" bIns="45720" numCol="1" spcCol="0" rtlCol="0" fromWordArt="0" anchor="ctr" anchorCtr="0" forceAA="0" compatLnSpc="1">
-                <a:prstTxWarp prst="textNoShape">
-                  <a:avLst/>
-                </a:prstTxWarp>
-                <a:noAutofit/>
-              </a:bodyPr>
-              <a:lstStyle/>
-              <a:p>
-                <a:pPr algn="ctr"/>
-                <a:r>
-                  <a:rPr lang="en-US" sz="800" smtClean="0">
-                    <a:latin typeface="Helvetica" panose="020B0604020202030204" pitchFamily="34" charset="0"/>
-                  </a:rPr>
-                  <a:t>role</a:t>
-                </a:r>
-                <a:endParaRPr lang="en-US" sz="800" smtClean="0">
-                  <a:latin typeface="Helvetica" panose="020B0604020202030204" pitchFamily="34" charset="0"/>
-                </a:endParaRPr>
-              </a:p>
-            </p:txBody>
-          </p:sp>
-          <p:sp>
-            <p:nvSpPr>
-              <p:cNvPr id="51" name="Flowchart: Process 50"/>
-              <p:cNvSpPr/>
-              <p:nvPr/>
-            </p:nvSpPr>
-            <p:spPr>
-              <a:xfrm>
-                <a:off x="6331611" y="2286000"/>
-                <a:ext cx="908429" cy="152400"/>
-              </a:xfrm>
-              <a:prstGeom prst="flowChartProcess">
-                <a:avLst/>
-              </a:prstGeom>
-            </p:spPr>
-            <p:style>
-              <a:lnRef idx="1">
-                <a:schemeClr val="accent1"/>
-              </a:lnRef>
-              <a:fillRef idx="2">
-                <a:schemeClr val="accent1"/>
-              </a:fillRef>
-              <a:effectRef idx="1">
-                <a:schemeClr val="accent1"/>
-              </a:effectRef>
-              <a:fontRef idx="minor">
-                <a:schemeClr val="dk1"/>
-              </a:fontRef>
-            </p:style>
-            <p:txBody>
-              <a:bodyPr rtlCol="0" anchor="ctr"/>
-              <a:lstStyle/>
-              <a:p>
-                <a:pPr algn="ctr"/>
-                <a:r>
-                  <a:rPr lang="en-US" sz="800" smtClean="0">
-                    <a:latin typeface="Helvetica" panose="020B0604020202030204" pitchFamily="34" charset="0"/>
-                  </a:rPr>
-                  <a:t>logical cluster</a:t>
-                </a:r>
-                <a:endParaRPr lang="en-US" sz="800">
-                  <a:latin typeface="Helvetica" panose="020B0604020202030204" pitchFamily="34" charset="0"/>
-                </a:endParaRPr>
-              </a:p>
-            </p:txBody>
-          </p:sp>
-          <p:sp>
-            <p:nvSpPr>
-              <p:cNvPr id="52" name="TextBox 51"/>
-              <p:cNvSpPr txBox="1"/>
-              <p:nvPr/>
-            </p:nvSpPr>
-            <p:spPr>
-              <a:xfrm>
-                <a:off x="6545208" y="2438400"/>
-                <a:ext cx="465192" cy="276999"/>
-              </a:xfrm>
-              <a:prstGeom prst="rect">
-                <a:avLst/>
-              </a:prstGeom>
-              <a:noFill/>
-            </p:spPr>
-            <p:txBody>
-              <a:bodyPr wrap="none" rtlCol="0">
-                <a:spAutoFit/>
-              </a:bodyPr>
-              <a:lstStyle/>
-              <a:p>
-                <a:pPr algn="ctr"/>
-                <a:r>
-                  <a:rPr lang="en-US" sz="1200" b="1" smtClean="0">
-                    <a:latin typeface="Helvetica" panose="020B0604020202030204" pitchFamily="34" charset="0"/>
-                  </a:rPr>
-                  <a:t>Key</a:t>
-                </a:r>
-                <a:endParaRPr lang="en-US" sz="1200">
-                  <a:latin typeface="Helvetica" panose="020B0604020202030204" pitchFamily="34" charset="0"/>
-                </a:endParaRPr>
-              </a:p>
-            </p:txBody>
-          </p:sp>
-        </p:grpSp>
-      </p:grpSp>
+              </a:rPr>
+              <a:t>Real Spark Cluster</a:t>
+            </a:r>
+          </a:p>
+          <a:p>
+            <a:pPr algn="ctr"/>
+            <a:r>
+              <a:rPr lang="en-US" sz="1200" smtClean="0">
+                <a:latin typeface="Helvetica" panose="020B0604020202030204" pitchFamily="34" charset="0"/>
+              </a:rPr>
+              <a:t>Separate instances for each node</a:t>
+            </a:r>
+            <a:endParaRPr lang="en-US" sz="1200">
+              <a:latin typeface="Helvetica" panose="020B0604020202030204" pitchFamily="34" charset="0"/>
+            </a:endParaRPr>
+          </a:p>
+        </p:txBody>
+      </p:sp>
+      <p:sp>
+        <p:nvSpPr>
+          <p:cNvPr id="46" name="TextBox 45"/>
+          <p:cNvSpPr txBox="1"/>
+          <p:nvPr/>
+        </p:nvSpPr>
+        <p:spPr>
+          <a:xfrm>
+            <a:off x="4567677" y="1906355"/>
+            <a:ext cx="2206053" cy="461665"/>
+          </a:xfrm>
+          <a:prstGeom prst="rect">
+            <a:avLst/>
+          </a:prstGeom>
+          <a:noFill/>
+        </p:spPr>
+        <p:txBody>
+          <a:bodyPr wrap="none" rtlCol="0">
+            <a:spAutoFit/>
+          </a:bodyPr>
+          <a:lstStyle/>
+          <a:p>
+            <a:pPr algn="ctr"/>
+            <a:r>
+              <a:rPr lang="en-US" sz="1200" b="1" smtClean="0">
+                <a:latin typeface="Helvetica" panose="020B0604020202030204" pitchFamily="34" charset="0"/>
+              </a:rPr>
+              <a:t>Our Spark Cluster</a:t>
+            </a:r>
+          </a:p>
+          <a:p>
+            <a:pPr algn="ctr"/>
+            <a:r>
+              <a:rPr lang="en-US" sz="1200" smtClean="0">
+                <a:latin typeface="Helvetica" panose="020B0604020202030204" pitchFamily="34" charset="0"/>
+              </a:rPr>
+              <a:t>Both nodes on same instance</a:t>
+            </a:r>
+            <a:endParaRPr lang="en-US" sz="1200">
+              <a:latin typeface="Helvetica" panose="020B0604020202030204" pitchFamily="34" charset="0"/>
+            </a:endParaRPr>
+          </a:p>
+        </p:txBody>
+      </p:sp>
     </p:spTree>
     <p:extLst>
       <p:ext uri="{BB962C8B-B14F-4D97-AF65-F5344CB8AC3E}">
@@ -5508,7 +4627,7 @@
 </p:sld>
 </file>
 
-<file path=ppt/slides/slide4.xml><?xml version="1.0" encoding="utf-8"?>
+<file path=ppt/slides/slide3.xml><?xml version="1.0" encoding="utf-8"?>
 <p:sld xmlns:a="http://schemas.openxmlformats.org/drawingml/2006/main" xmlns:r="http://schemas.openxmlformats.org/officeDocument/2006/relationships" xmlns:p="http://schemas.openxmlformats.org/presentationml/2006/main">
   <p:cSld>
     <p:spTree>
@@ -5527,14 +4646,14 @@
       </p:grpSpPr>
       <p:sp>
         <p:nvSpPr>
-          <p:cNvPr id="38" name="TextBox 37"/>
+          <p:cNvPr id="5" name="TextBox 4"/>
           <p:cNvSpPr txBox="1"/>
           <p:nvPr/>
         </p:nvSpPr>
         <p:spPr>
           <a:xfrm>
-            <a:off x="6477000" y="6400800"/>
-            <a:ext cx="2531462" cy="369332"/>
+            <a:off x="6934200" y="6400800"/>
+            <a:ext cx="1620957" cy="369332"/>
           </a:xfrm>
           <a:prstGeom prst="rect">
             <a:avLst/>
@@ -5551,256 +4670,21 @@
               <a:rPr lang="en-US" smtClean="0">
                 <a:latin typeface="Helvetica" panose="020B0604020202030204" pitchFamily="34" charset="0"/>
               </a:rPr>
-              <a:t>submitting-applications</a:t>
-            </a:r>
-            <a:endParaRPr lang="en-US" smtClean="0">
-              <a:latin typeface="Helvetica" panose="020B0604020202030204" pitchFamily="34" charset="0"/>
-            </a:endParaRPr>
-          </a:p>
-        </p:txBody>
-      </p:sp>
-      <p:sp>
-        <p:nvSpPr>
-          <p:cNvPr id="45" name="TextBox 44"/>
-          <p:cNvSpPr txBox="1"/>
-          <p:nvPr/>
-        </p:nvSpPr>
-        <p:spPr>
-          <a:xfrm>
-            <a:off x="6014533" y="605135"/>
-            <a:ext cx="2752677" cy="461665"/>
-          </a:xfrm>
-          <a:prstGeom prst="rect">
-            <a:avLst/>
-          </a:prstGeom>
-          <a:noFill/>
-        </p:spPr>
-        <p:txBody>
-          <a:bodyPr wrap="none" rtlCol="0">
-            <a:spAutoFit/>
-          </a:bodyPr>
-          <a:lstStyle/>
-          <a:p>
-            <a:r>
-              <a:rPr lang="en-US" sz="1200" b="1" smtClean="0">
-                <a:latin typeface="Helvetica" panose="020B0604020202030204" pitchFamily="34" charset="0"/>
-              </a:rPr>
-              <a:t>Client Deploy Mode</a:t>
-            </a:r>
-            <a:endParaRPr lang="en-US" sz="1200" b="1" smtClean="0">
-              <a:latin typeface="Helvetica" panose="020B0604020202030204" pitchFamily="34" charset="0"/>
-            </a:endParaRPr>
-          </a:p>
-          <a:p>
-            <a:r>
-              <a:rPr lang="en-US" sz="1200">
-                <a:latin typeface="Helvetica" panose="020B0604020202030204" pitchFamily="34" charset="0"/>
-              </a:rPr>
-              <a:t>Driver exists where spark-submit runs</a:t>
-            </a:r>
-          </a:p>
-        </p:txBody>
-      </p:sp>
-      <p:sp>
-        <p:nvSpPr>
-          <p:cNvPr id="22" name="Flowchart: Process 21"/>
+              <a:t>spark-nutshell</a:t>
+            </a:r>
+          </a:p>
+        </p:txBody>
+      </p:sp>
+      <p:sp>
+        <p:nvSpPr>
+          <p:cNvPr id="7" name="Flowchart: Process 6"/>
           <p:cNvSpPr/>
           <p:nvPr/>
         </p:nvSpPr>
         <p:spPr>
           <a:xfrm>
-            <a:off x="685800" y="855382"/>
-            <a:ext cx="1143000" cy="379645"/>
-          </a:xfrm>
-          <a:prstGeom prst="flowChartProcess">
-            <a:avLst/>
-          </a:prstGeom>
-          <a:ln w="9525"/>
-        </p:spPr>
-        <p:style>
-          <a:lnRef idx="2">
-            <a:schemeClr val="dk1"/>
-          </a:lnRef>
-          <a:fillRef idx="1">
-            <a:schemeClr val="lt1"/>
-          </a:fillRef>
-          <a:effectRef idx="0">
-            <a:schemeClr val="dk1"/>
-          </a:effectRef>
-          <a:fontRef idx="minor">
-            <a:schemeClr val="dk1"/>
-          </a:fontRef>
-        </p:style>
-        <p:txBody>
-          <a:bodyPr rot="0" spcFirstLastPara="0" vertOverflow="overflow" horzOverflow="overflow" vert="horz" wrap="square" lIns="91440" tIns="45720" rIns="91440" bIns="45720" numCol="1" spcCol="0" rtlCol="0" fromWordArt="0" anchor="ctr" anchorCtr="0" forceAA="0" compatLnSpc="1">
-            <a:prstTxWarp prst="textNoShape">
-              <a:avLst/>
-            </a:prstTxWarp>
-            <a:noAutofit/>
-          </a:bodyPr>
-          <a:lstStyle/>
-          <a:p>
-            <a:pPr algn="ctr"/>
-            <a:r>
-              <a:rPr lang="en-US" sz="1100" smtClean="0">
-                <a:latin typeface="Helvetica" panose="020B0604020202030204" pitchFamily="34" charset="0"/>
-              </a:rPr>
-              <a:t>de</a:t>
-            </a:r>
-            <a:r>
-              <a:rPr lang="en-US" sz="1100" smtClean="0">
-                <a:latin typeface="Helvetica" panose="020B0604020202030204" pitchFamily="34" charset="0"/>
-              </a:rPr>
-              <a:t>velopment environment</a:t>
-            </a:r>
-            <a:endParaRPr lang="en-US" sz="1100" smtClean="0">
-              <a:latin typeface="Helvetica" panose="020B0604020202030204" pitchFamily="34" charset="0"/>
-            </a:endParaRPr>
-          </a:p>
-        </p:txBody>
-      </p:sp>
-      <p:sp>
-        <p:nvSpPr>
-          <p:cNvPr id="34" name="TextBox 33"/>
-          <p:cNvSpPr txBox="1"/>
-          <p:nvPr/>
-        </p:nvSpPr>
-        <p:spPr>
-          <a:xfrm>
-            <a:off x="6033794" y="2209800"/>
-            <a:ext cx="1967206" cy="461665"/>
-          </a:xfrm>
-          <a:prstGeom prst="rect">
-            <a:avLst/>
-          </a:prstGeom>
-          <a:noFill/>
-        </p:spPr>
-        <p:txBody>
-          <a:bodyPr wrap="none" rtlCol="0">
-            <a:spAutoFit/>
-          </a:bodyPr>
-          <a:lstStyle/>
-          <a:p>
-            <a:r>
-              <a:rPr lang="en-US" sz="1200" b="1">
-                <a:latin typeface="Helvetica" panose="020B0604020202030204" pitchFamily="34" charset="0"/>
-              </a:rPr>
-              <a:t>Cluster Deploy Mode</a:t>
-            </a:r>
-          </a:p>
-          <a:p>
-            <a:pPr algn="ctr"/>
-            <a:r>
-              <a:rPr lang="en-US" sz="1200">
-                <a:latin typeface="Helvetica" panose="020B0604020202030204" pitchFamily="34" charset="0"/>
-              </a:rPr>
-              <a:t>Driver exists inside cluster</a:t>
-            </a:r>
-          </a:p>
-        </p:txBody>
-      </p:sp>
-      <p:sp>
-        <p:nvSpPr>
-          <p:cNvPr id="39" name="Flowchart: Process 38"/>
-          <p:cNvSpPr/>
-          <p:nvPr/>
-        </p:nvSpPr>
-        <p:spPr>
-          <a:xfrm>
-            <a:off x="609600" y="2456937"/>
-            <a:ext cx="1143000" cy="378290"/>
-          </a:xfrm>
-          <a:prstGeom prst="flowChartProcess">
-            <a:avLst/>
-          </a:prstGeom>
-          <a:ln w="9525"/>
-        </p:spPr>
-        <p:style>
-          <a:lnRef idx="2">
-            <a:schemeClr val="dk1"/>
-          </a:lnRef>
-          <a:fillRef idx="1">
-            <a:schemeClr val="lt1"/>
-          </a:fillRef>
-          <a:effectRef idx="0">
-            <a:schemeClr val="dk1"/>
-          </a:effectRef>
-          <a:fontRef idx="minor">
-            <a:schemeClr val="dk1"/>
-          </a:fontRef>
-        </p:style>
-        <p:txBody>
-          <a:bodyPr rot="0" spcFirstLastPara="0" vertOverflow="overflow" horzOverflow="overflow" vert="horz" wrap="square" lIns="91440" tIns="45720" rIns="91440" bIns="45720" numCol="1" spcCol="0" rtlCol="0" fromWordArt="0" anchor="ctr" anchorCtr="0" forceAA="0" compatLnSpc="1">
-            <a:prstTxWarp prst="textNoShape">
-              <a:avLst/>
-            </a:prstTxWarp>
-            <a:noAutofit/>
-          </a:bodyPr>
-          <a:lstStyle/>
-          <a:p>
-            <a:pPr algn="ctr"/>
-            <a:r>
-              <a:rPr lang="en-US" sz="1100" smtClean="0">
-                <a:latin typeface="Helvetica" panose="020B0604020202030204" pitchFamily="34" charset="0"/>
-              </a:rPr>
-              <a:t>de</a:t>
-            </a:r>
-            <a:r>
-              <a:rPr lang="en-US" sz="1100" smtClean="0">
-                <a:latin typeface="Helvetica" panose="020B0604020202030204" pitchFamily="34" charset="0"/>
-              </a:rPr>
-              <a:t>velopment environment</a:t>
-            </a:r>
-            <a:endParaRPr lang="en-US" sz="1100" smtClean="0">
-              <a:latin typeface="Helvetica" panose="020B0604020202030204" pitchFamily="34" charset="0"/>
-            </a:endParaRPr>
-          </a:p>
-        </p:txBody>
-      </p:sp>
-      <p:sp>
-        <p:nvSpPr>
-          <p:cNvPr id="31" name="TextBox 30"/>
-          <p:cNvSpPr txBox="1"/>
-          <p:nvPr/>
-        </p:nvSpPr>
-        <p:spPr>
-          <a:xfrm>
-            <a:off x="1752600" y="805190"/>
-            <a:ext cx="990977" cy="261610"/>
-          </a:xfrm>
-          <a:prstGeom prst="rect">
-            <a:avLst/>
-          </a:prstGeom>
-          <a:noFill/>
-        </p:spPr>
-        <p:txBody>
-          <a:bodyPr wrap="none" rtlCol="0">
-            <a:spAutoFit/>
-          </a:bodyPr>
-          <a:lstStyle/>
-          <a:p>
-            <a:r>
-              <a:rPr lang="en-US" sz="1050" smtClean="0">
-                <a:latin typeface="Helvetica" panose="020B0604020202030204" pitchFamily="34" charset="0"/>
-              </a:rPr>
-              <a:t>spark-submit</a:t>
-            </a:r>
-            <a:endParaRPr lang="en-US" sz="1050">
-              <a:latin typeface="Helvetica" panose="020B0604020202030204" pitchFamily="34" charset="0"/>
-            </a:endParaRPr>
-          </a:p>
-        </p:txBody>
-      </p:sp>
-      <p:sp>
-        <p:nvSpPr>
-          <p:cNvPr id="32" name="Flowchart: Process 31"/>
-          <p:cNvSpPr/>
-          <p:nvPr/>
-        </p:nvSpPr>
-        <p:spPr>
-          <a:xfrm>
-            <a:off x="3200400" y="664202"/>
-            <a:ext cx="2834702" cy="935997"/>
+            <a:off x="914400" y="1600201"/>
+            <a:ext cx="5689600" cy="533399"/>
           </a:xfrm>
           <a:prstGeom prst="flowChartProcess">
             <a:avLst/>
@@ -5821,17 +4705,17 @@
           </a:fontRef>
         </p:style>
         <p:txBody>
-          <a:bodyPr rtlCol="0" anchor="b"/>
+          <a:bodyPr rtlCol="0" anchor="ctr"/>
           <a:lstStyle/>
           <a:p>
             <a:pPr algn="ctr"/>
             <a:r>
-              <a:rPr lang="en-US" sz="1400" smtClean="0">
+              <a:rPr lang="en-US" smtClean="0">
                 <a:latin typeface="Helvetica" panose="020B0604020202030204" pitchFamily="34" charset="0"/>
               </a:rPr>
-              <a:t>cluster</a:t>
-            </a:r>
-            <a:endParaRPr lang="en-US" sz="1400">
+              <a:t>Spark Core</a:t>
+            </a:r>
+            <a:endParaRPr lang="en-US">
               <a:latin typeface="Helvetica" panose="020B0604020202030204" pitchFamily="34" charset="0"/>
             </a:endParaRPr>
           </a:p>
@@ -5839,28 +4723,27 @@
       </p:sp>
       <p:sp>
         <p:nvSpPr>
-          <p:cNvPr id="33" name="Flowchart: Process 32"/>
+          <p:cNvPr id="8" name="Flowchart: Process 7"/>
           <p:cNvSpPr/>
           <p:nvPr/>
         </p:nvSpPr>
         <p:spPr>
           <a:xfrm>
-            <a:off x="3356079" y="855381"/>
-            <a:ext cx="1143000" cy="379645"/>
+            <a:off x="917679" y="857650"/>
+            <a:ext cx="1295400" cy="762000"/>
           </a:xfrm>
           <a:prstGeom prst="flowChartProcess">
             <a:avLst/>
           </a:prstGeom>
-          <a:ln w="9525"/>
         </p:spPr>
         <p:style>
-          <a:lnRef idx="2">
+          <a:lnRef idx="1">
             <a:schemeClr val="dk1"/>
           </a:lnRef>
-          <a:fillRef idx="1">
-            <a:schemeClr val="lt1"/>
+          <a:fillRef idx="2">
+            <a:schemeClr val="dk1"/>
           </a:fillRef>
-          <a:effectRef idx="0">
+          <a:effectRef idx="1">
             <a:schemeClr val="dk1"/>
           </a:effectRef>
           <a:fontRef idx="minor">
@@ -5878,41 +4761,37 @@
           <a:p>
             <a:pPr algn="ctr"/>
             <a:r>
-              <a:rPr lang="en-US" sz="1100" smtClean="0">
+              <a:rPr lang="en-US" smtClean="0">
                 <a:latin typeface="Helvetica" panose="020B0604020202030204" pitchFamily="34" charset="0"/>
               </a:rPr>
-              <a:t>master</a:t>
-            </a:r>
-            <a:endParaRPr lang="en-US" sz="1100" smtClean="0">
-              <a:latin typeface="Helvetica" panose="020B0604020202030204" pitchFamily="34" charset="0"/>
-            </a:endParaRPr>
-          </a:p>
-        </p:txBody>
-      </p:sp>
-      <p:sp>
-        <p:nvSpPr>
-          <p:cNvPr id="40" name="Flowchart: Process 39"/>
+              <a:t>Spark Streaming</a:t>
+            </a:r>
+          </a:p>
+        </p:txBody>
+      </p:sp>
+      <p:sp>
+        <p:nvSpPr>
+          <p:cNvPr id="9" name="Flowchart: Process 8"/>
           <p:cNvSpPr/>
           <p:nvPr/>
         </p:nvSpPr>
         <p:spPr>
           <a:xfrm>
-            <a:off x="4800600" y="855382"/>
-            <a:ext cx="1143000" cy="379645"/>
+            <a:off x="2377502" y="857650"/>
+            <a:ext cx="1295400" cy="762000"/>
           </a:xfrm>
           <a:prstGeom prst="flowChartProcess">
             <a:avLst/>
           </a:prstGeom>
-          <a:ln w="9525"/>
         </p:spPr>
         <p:style>
-          <a:lnRef idx="2">
+          <a:lnRef idx="1">
             <a:schemeClr val="dk1"/>
           </a:lnRef>
-          <a:fillRef idx="1">
-            <a:schemeClr val="lt1"/>
+          <a:fillRef idx="2">
+            <a:schemeClr val="dk1"/>
           </a:fillRef>
-          <a:effectRef idx="0">
+          <a:effectRef idx="1">
             <a:schemeClr val="dk1"/>
           </a:effectRef>
           <a:fontRef idx="minor">
@@ -5930,41 +4809,37 @@
           <a:p>
             <a:pPr algn="ctr"/>
             <a:r>
-              <a:rPr lang="en-US" sz="1100" smtClean="0">
+              <a:rPr lang="en-US" smtClean="0">
                 <a:latin typeface="Helvetica" panose="020B0604020202030204" pitchFamily="34" charset="0"/>
               </a:rPr>
-              <a:t>worker</a:t>
-            </a:r>
-            <a:endParaRPr lang="en-US" sz="1100" smtClean="0">
-              <a:latin typeface="Helvetica" panose="020B0604020202030204" pitchFamily="34" charset="0"/>
-            </a:endParaRPr>
-          </a:p>
-        </p:txBody>
-      </p:sp>
-      <p:sp>
-        <p:nvSpPr>
-          <p:cNvPr id="49" name="Flowchart: Process 48"/>
+              <a:t>Spark SQL</a:t>
+            </a:r>
+          </a:p>
+        </p:txBody>
+      </p:sp>
+      <p:sp>
+        <p:nvSpPr>
+          <p:cNvPr id="12" name="Flowchart: Process 11"/>
           <p:cNvSpPr/>
           <p:nvPr/>
         </p:nvSpPr>
         <p:spPr>
           <a:xfrm>
-            <a:off x="1828800" y="855380"/>
-            <a:ext cx="1143000" cy="379645"/>
+            <a:off x="3848777" y="857650"/>
+            <a:ext cx="1295400" cy="762000"/>
           </a:xfrm>
           <a:prstGeom prst="flowChartProcess">
             <a:avLst/>
           </a:prstGeom>
-          <a:ln w="9525"/>
         </p:spPr>
         <p:style>
-          <a:lnRef idx="2">
+          <a:lnRef idx="1">
             <a:schemeClr val="dk1"/>
           </a:lnRef>
-          <a:fillRef idx="1">
-            <a:schemeClr val="lt1"/>
+          <a:fillRef idx="2">
+            <a:schemeClr val="dk1"/>
           </a:fillRef>
-          <a:effectRef idx="0">
+          <a:effectRef idx="1">
             <a:schemeClr val="dk1"/>
           </a:effectRef>
           <a:fontRef idx="minor">
@@ -5982,27 +4857,24 @@
           <a:p>
             <a:pPr algn="ctr"/>
             <a:r>
-              <a:rPr lang="en-US" sz="1100" smtClean="0">
+              <a:rPr lang="en-US" smtClean="0">
                 <a:latin typeface="Helvetica" panose="020B0604020202030204" pitchFamily="34" charset="0"/>
               </a:rPr>
-              <a:t>driver</a:t>
-            </a:r>
-            <a:endParaRPr lang="en-US" sz="1100" smtClean="0">
-              <a:latin typeface="Helvetica" panose="020B0604020202030204" pitchFamily="34" charset="0"/>
-            </a:endParaRPr>
-          </a:p>
-        </p:txBody>
-      </p:sp>
-      <p:sp>
-        <p:nvSpPr>
-          <p:cNvPr id="55" name="Flowchart: Process 54"/>
+              <a:t>MLib</a:t>
+            </a:r>
+          </a:p>
+        </p:txBody>
+      </p:sp>
+      <p:sp>
+        <p:nvSpPr>
+          <p:cNvPr id="13" name="Flowchart: Process 12"/>
           <p:cNvSpPr/>
           <p:nvPr/>
         </p:nvSpPr>
         <p:spPr>
           <a:xfrm>
-            <a:off x="1981200" y="2264402"/>
-            <a:ext cx="4061382" cy="935997"/>
+            <a:off x="5308600" y="857650"/>
+            <a:ext cx="1295400" cy="762000"/>
           </a:xfrm>
           <a:prstGeom prst="flowChartProcess">
             <a:avLst/>
@@ -6010,59 +4882,12 @@
         </p:spPr>
         <p:style>
           <a:lnRef idx="1">
-            <a:schemeClr val="accent1"/>
+            <a:schemeClr val="dk1"/>
           </a:lnRef>
           <a:fillRef idx="2">
-            <a:schemeClr val="accent1"/>
+            <a:schemeClr val="dk1"/>
           </a:fillRef>
           <a:effectRef idx="1">
-            <a:schemeClr val="accent1"/>
-          </a:effectRef>
-          <a:fontRef idx="minor">
-            <a:schemeClr val="dk1"/>
-          </a:fontRef>
-        </p:style>
-        <p:txBody>
-          <a:bodyPr rtlCol="0" anchor="b"/>
-          <a:lstStyle/>
-          <a:p>
-            <a:pPr algn="ctr"/>
-            <a:r>
-              <a:rPr lang="en-US" sz="1400" smtClean="0">
-                <a:latin typeface="Helvetica" panose="020B0604020202030204" pitchFamily="34" charset="0"/>
-              </a:rPr>
-              <a:t>cluster</a:t>
-            </a:r>
-            <a:endParaRPr lang="en-US" sz="1400">
-              <a:latin typeface="Helvetica" panose="020B0604020202030204" pitchFamily="34" charset="0"/>
-            </a:endParaRPr>
-          </a:p>
-        </p:txBody>
-      </p:sp>
-      <p:sp>
-        <p:nvSpPr>
-          <p:cNvPr id="56" name="Flowchart: Process 55"/>
-          <p:cNvSpPr/>
-          <p:nvPr/>
-        </p:nvSpPr>
-        <p:spPr>
-          <a:xfrm>
-            <a:off x="3356490" y="2455581"/>
-            <a:ext cx="1146016" cy="379645"/>
-          </a:xfrm>
-          <a:prstGeom prst="flowChartProcess">
-            <a:avLst/>
-          </a:prstGeom>
-          <a:ln w="9525"/>
-        </p:spPr>
-        <p:style>
-          <a:lnRef idx="2">
-            <a:schemeClr val="dk1"/>
-          </a:lnRef>
-          <a:fillRef idx="1">
-            <a:schemeClr val="lt1"/>
-          </a:fillRef>
-          <a:effectRef idx="0">
             <a:schemeClr val="dk1"/>
           </a:effectRef>
           <a:fontRef idx="minor">
@@ -6080,197 +4905,18 @@
           <a:p>
             <a:pPr algn="ctr"/>
             <a:r>
-              <a:rPr lang="en-US" sz="1100" smtClean="0">
+              <a:rPr lang="en-US" smtClean="0">
                 <a:latin typeface="Helvetica" panose="020B0604020202030204" pitchFamily="34" charset="0"/>
               </a:rPr>
-              <a:t>master</a:t>
-            </a:r>
-            <a:endParaRPr lang="en-US" sz="1100" smtClean="0">
-              <a:latin typeface="Helvetica" panose="020B0604020202030204" pitchFamily="34" charset="0"/>
-            </a:endParaRPr>
-          </a:p>
-        </p:txBody>
-      </p:sp>
-      <p:sp>
-        <p:nvSpPr>
-          <p:cNvPr id="57" name="Flowchart: Process 56"/>
-          <p:cNvSpPr/>
-          <p:nvPr/>
-        </p:nvSpPr>
-        <p:spPr>
-          <a:xfrm>
-            <a:off x="4804822" y="2455582"/>
-            <a:ext cx="1146016" cy="379645"/>
-          </a:xfrm>
-          <a:prstGeom prst="flowChartProcess">
-            <a:avLst/>
-          </a:prstGeom>
-          <a:ln w="9525"/>
-        </p:spPr>
-        <p:style>
-          <a:lnRef idx="2">
-            <a:schemeClr val="dk1"/>
-          </a:lnRef>
-          <a:fillRef idx="1">
-            <a:schemeClr val="lt1"/>
-          </a:fillRef>
-          <a:effectRef idx="0">
-            <a:schemeClr val="dk1"/>
-          </a:effectRef>
-          <a:fontRef idx="minor">
-            <a:schemeClr val="dk1"/>
-          </a:fontRef>
-        </p:style>
-        <p:txBody>
-          <a:bodyPr rot="0" spcFirstLastPara="0" vertOverflow="overflow" horzOverflow="overflow" vert="horz" wrap="square" lIns="91440" tIns="45720" rIns="91440" bIns="45720" numCol="1" spcCol="0" rtlCol="0" fromWordArt="0" anchor="ctr" anchorCtr="0" forceAA="0" compatLnSpc="1">
-            <a:prstTxWarp prst="textNoShape">
-              <a:avLst/>
-            </a:prstTxWarp>
-            <a:noAutofit/>
-          </a:bodyPr>
-          <a:lstStyle/>
-          <a:p>
-            <a:pPr algn="ctr"/>
-            <a:r>
-              <a:rPr lang="en-US" sz="1100" smtClean="0">
-                <a:latin typeface="Helvetica" panose="020B0604020202030204" pitchFamily="34" charset="0"/>
-              </a:rPr>
-              <a:t>worker</a:t>
-            </a:r>
-            <a:endParaRPr lang="en-US" sz="1100" smtClean="0">
-              <a:latin typeface="Helvetica" panose="020B0604020202030204" pitchFamily="34" charset="0"/>
-            </a:endParaRPr>
-          </a:p>
-        </p:txBody>
-      </p:sp>
-      <p:sp>
-        <p:nvSpPr>
-          <p:cNvPr id="58" name="Flowchart: Process 57"/>
-          <p:cNvSpPr/>
-          <p:nvPr/>
-        </p:nvSpPr>
-        <p:spPr>
-          <a:xfrm>
-            <a:off x="2209800" y="2456937"/>
-            <a:ext cx="1143000" cy="378290"/>
-          </a:xfrm>
-          <a:prstGeom prst="flowChartProcess">
-            <a:avLst/>
-          </a:prstGeom>
-          <a:ln w="9525"/>
-        </p:spPr>
-        <p:style>
-          <a:lnRef idx="2">
-            <a:schemeClr val="dk1"/>
-          </a:lnRef>
-          <a:fillRef idx="1">
-            <a:schemeClr val="lt1"/>
-          </a:fillRef>
-          <a:effectRef idx="0">
-            <a:schemeClr val="dk1"/>
-          </a:effectRef>
-          <a:fontRef idx="minor">
-            <a:schemeClr val="dk1"/>
-          </a:fontRef>
-        </p:style>
-        <p:txBody>
-          <a:bodyPr rot="0" spcFirstLastPara="0" vertOverflow="overflow" horzOverflow="overflow" vert="horz" wrap="square" lIns="91440" tIns="45720" rIns="91440" bIns="45720" numCol="1" spcCol="0" rtlCol="0" fromWordArt="0" anchor="ctr" anchorCtr="0" forceAA="0" compatLnSpc="1">
-            <a:prstTxWarp prst="textNoShape">
-              <a:avLst/>
-            </a:prstTxWarp>
-            <a:noAutofit/>
-          </a:bodyPr>
-          <a:lstStyle/>
-          <a:p>
-            <a:pPr algn="ctr"/>
-            <a:r>
-              <a:rPr lang="en-US" sz="1100" smtClean="0">
-                <a:latin typeface="Helvetica" panose="020B0604020202030204" pitchFamily="34" charset="0"/>
-              </a:rPr>
-              <a:t>driver</a:t>
-            </a:r>
-            <a:endParaRPr lang="en-US" sz="1100" smtClean="0">
-              <a:latin typeface="Helvetica" panose="020B0604020202030204" pitchFamily="34" charset="0"/>
-            </a:endParaRPr>
-          </a:p>
-        </p:txBody>
-      </p:sp>
-      <p:cxnSp>
-        <p:nvCxnSpPr>
-          <p:cNvPr id="5" name="Straight Arrow Connector 4"/>
-          <p:cNvCxnSpPr>
-            <a:stCxn id="39" idx="3"/>
-            <a:endCxn id="58" idx="1"/>
-          </p:cNvCxnSpPr>
-          <p:nvPr/>
-        </p:nvCxnSpPr>
-        <p:spPr>
-          <a:xfrm>
-            <a:off x="1752600" y="2646082"/>
-            <a:ext cx="457200" cy="0"/>
-          </a:xfrm>
-          <a:prstGeom prst="straightConnector1">
-            <a:avLst/>
-          </a:prstGeom>
-          <a:ln>
-            <a:tailEnd type="arrow"/>
-          </a:ln>
-        </p:spPr>
-        <p:style>
-          <a:lnRef idx="2">
-            <a:schemeClr val="dk1"/>
-          </a:lnRef>
-          <a:fillRef idx="0">
-            <a:schemeClr val="dk1"/>
-          </a:fillRef>
-          <a:effectRef idx="1">
-            <a:schemeClr val="dk1"/>
-          </a:effectRef>
-          <a:fontRef idx="minor">
-            <a:schemeClr val="tx1"/>
-          </a:fontRef>
-        </p:style>
-      </p:cxnSp>
-      <p:cxnSp>
-        <p:nvCxnSpPr>
-          <p:cNvPr id="59" name="Straight Arrow Connector 58"/>
-          <p:cNvCxnSpPr>
-            <a:stCxn id="49" idx="3"/>
-            <a:endCxn id="33" idx="1"/>
-          </p:cNvCxnSpPr>
-          <p:nvPr/>
-        </p:nvCxnSpPr>
-        <p:spPr>
-          <a:xfrm>
-            <a:off x="2971800" y="1045203"/>
-            <a:ext cx="384279" cy="1"/>
-          </a:xfrm>
-          <a:prstGeom prst="straightConnector1">
-            <a:avLst/>
-          </a:prstGeom>
-          <a:ln>
-            <a:tailEnd type="arrow"/>
-          </a:ln>
-        </p:spPr>
-        <p:style>
-          <a:lnRef idx="2">
-            <a:schemeClr val="dk1"/>
-          </a:lnRef>
-          <a:fillRef idx="0">
-            <a:schemeClr val="dk1"/>
-          </a:fillRef>
-          <a:effectRef idx="1">
-            <a:schemeClr val="dk1"/>
-          </a:effectRef>
-          <a:fontRef idx="minor">
-            <a:schemeClr val="tx1"/>
-          </a:fontRef>
-        </p:style>
-      </p:cxnSp>
+              <a:t>GraphX</a:t>
+            </a:r>
+          </a:p>
+        </p:txBody>
+      </p:sp>
     </p:spTree>
     <p:extLst>
       <p:ext uri="{BB962C8B-B14F-4D97-AF65-F5344CB8AC3E}">
-        <p14:creationId xmlns:p14="http://schemas.microsoft.com/office/powerpoint/2010/main" val="1279907951"/>
+        <p14:creationId xmlns:p14="http://schemas.microsoft.com/office/powerpoint/2010/main" val="3740730358"/>
       </p:ext>
     </p:extLst>
   </p:cSld>
@@ -6280,7 +4926,7 @@
 </p:sld>
 </file>
 
-<file path=ppt/slides/slide5.xml><?xml version="1.0" encoding="utf-8"?>
+<file path=ppt/slides/slide4.xml><?xml version="1.0" encoding="utf-8"?>
 <p:sld xmlns:a="http://schemas.openxmlformats.org/drawingml/2006/main" xmlns:r="http://schemas.openxmlformats.org/officeDocument/2006/relationships" xmlns:p="http://schemas.openxmlformats.org/presentationml/2006/main">
   <p:cSld>
     <p:spTree>
@@ -6875,7 +5521,7 @@
 </p:sld>
 </file>
 
-<file path=ppt/slides/slide6.xml><?xml version="1.0" encoding="utf-8"?>
+<file path=ppt/slides/slide5.xml><?xml version="1.0" encoding="utf-8"?>
 <p:sld xmlns:a="http://schemas.openxmlformats.org/drawingml/2006/main" xmlns:r="http://schemas.openxmlformats.org/officeDocument/2006/relationships" xmlns:p="http://schemas.openxmlformats.org/presentationml/2006/main">
   <p:cSld>
     <p:spTree>
@@ -6927,6 +5573,9 @@
               </a:rPr>
               <a:t>orking-rdds</a:t>
             </a:r>
+            <a:endParaRPr lang="en-US" smtClean="0">
+              <a:latin typeface="Helvetica" panose="020B0604020202030204" pitchFamily="34" charset="0"/>
+            </a:endParaRPr>
           </a:p>
         </p:txBody>
       </p:sp>
@@ -6970,6 +5619,9 @@
               </a:rPr>
               <a:t>parallelize</a:t>
             </a:r>
+            <a:endParaRPr lang="en-US" sz="1200" smtClean="0">
+              <a:latin typeface="Helvetica" panose="020B0604020202030204" pitchFamily="34" charset="0"/>
+            </a:endParaRPr>
           </a:p>
         </p:txBody>
       </p:sp>
@@ -7013,6 +5665,9 @@
               </a:rPr>
               <a:t>textFile</a:t>
             </a:r>
+            <a:endParaRPr lang="en-US" sz="1200" smtClean="0">
+              <a:latin typeface="Helvetica" panose="020B0604020202030204" pitchFamily="34" charset="0"/>
+            </a:endParaRPr>
           </a:p>
         </p:txBody>
       </p:sp>
@@ -7056,6 +5711,9 @@
               </a:rPr>
               <a:t>filter</a:t>
             </a:r>
+            <a:endParaRPr lang="en-US" sz="1200" smtClean="0">
+              <a:latin typeface="Helvetica" panose="020B0604020202030204" pitchFamily="34" charset="0"/>
+            </a:endParaRPr>
           </a:p>
         </p:txBody>
       </p:sp>
@@ -7099,6 +5757,9 @@
               </a:rPr>
               <a:t>map</a:t>
             </a:r>
+            <a:endParaRPr lang="en-US" sz="1200" smtClean="0">
+              <a:latin typeface="Helvetica" panose="020B0604020202030204" pitchFamily="34" charset="0"/>
+            </a:endParaRPr>
           </a:p>
         </p:txBody>
       </p:sp>
@@ -7142,6 +5803,9 @@
               </a:rPr>
               <a:t>flatMap</a:t>
             </a:r>
+            <a:endParaRPr lang="en-US" sz="1200" smtClean="0">
+              <a:latin typeface="Helvetica" panose="020B0604020202030204" pitchFamily="34" charset="0"/>
+            </a:endParaRPr>
           </a:p>
         </p:txBody>
       </p:sp>
@@ -7185,6 +5849,9 @@
               </a:rPr>
               <a:t>count</a:t>
             </a:r>
+            <a:endParaRPr lang="en-US" sz="1200" smtClean="0">
+              <a:latin typeface="Helvetica" panose="020B0604020202030204" pitchFamily="34" charset="0"/>
+            </a:endParaRPr>
           </a:p>
         </p:txBody>
       </p:sp>
@@ -7228,6 +5895,9 @@
               </a:rPr>
               <a:t>file of string numbers</a:t>
             </a:r>
+            <a:endParaRPr lang="en-US" sz="1200" smtClean="0">
+              <a:latin typeface="Helvetica" panose="020B0604020202030204" pitchFamily="34" charset="0"/>
+            </a:endParaRPr>
           </a:p>
         </p:txBody>
       </p:sp>
@@ -7271,6 +5941,9 @@
               </a:rPr>
               <a:t>array / list of numbers</a:t>
             </a:r>
+            <a:endParaRPr lang="en-US" sz="1200" smtClean="0">
+              <a:latin typeface="Helvetica" panose="020B0604020202030204" pitchFamily="34" charset="0"/>
+            </a:endParaRPr>
           </a:p>
         </p:txBody>
       </p:sp>
@@ -7314,6 +5987,9 @@
               </a:rPr>
               <a:t>union</a:t>
             </a:r>
+            <a:endParaRPr lang="en-US" sz="1200" smtClean="0">
+              <a:latin typeface="Helvetica" panose="020B0604020202030204" pitchFamily="34" charset="0"/>
+            </a:endParaRPr>
           </a:p>
         </p:txBody>
       </p:sp>
@@ -7357,6 +6033,9 @@
               </a:rPr>
               <a:t>reduce</a:t>
             </a:r>
+            <a:endParaRPr lang="en-US" sz="1200" smtClean="0">
+              <a:latin typeface="Helvetica" panose="020B0604020202030204" pitchFamily="34" charset="0"/>
+            </a:endParaRPr>
           </a:p>
         </p:txBody>
       </p:sp>
@@ -7400,6 +6079,9 @@
               </a:rPr>
               <a:t>reduce</a:t>
             </a:r>
+            <a:endParaRPr lang="en-US" sz="1200" smtClean="0">
+              <a:latin typeface="Helvetica" panose="020B0604020202030204" pitchFamily="34" charset="0"/>
+            </a:endParaRPr>
           </a:p>
         </p:txBody>
       </p:sp>
@@ -7790,6 +6472,9 @@
               </a:rPr>
               <a:t>More than 30 in Chicago</a:t>
             </a:r>
+            <a:endParaRPr lang="en-US" sz="1200" smtClean="0">
+              <a:latin typeface="Helvetica" panose="020B0604020202030204" pitchFamily="34" charset="0"/>
+            </a:endParaRPr>
           </a:p>
         </p:txBody>
       </p:sp>
@@ -7822,6 +6507,9 @@
               </a:rPr>
               <a:t>Most books owned in either city</a:t>
             </a:r>
+            <a:endParaRPr lang="en-US" sz="1200" smtClean="0">
+              <a:latin typeface="Helvetica" panose="020B0604020202030204" pitchFamily="34" charset="0"/>
+            </a:endParaRPr>
           </a:p>
         </p:txBody>
       </p:sp>
@@ -7854,6 +6542,9 @@
               </a:rPr>
               <a:t>Total books in both cities</a:t>
             </a:r>
+            <a:endParaRPr lang="en-US" sz="1200" smtClean="0">
+              <a:latin typeface="Helvetica" panose="020B0604020202030204" pitchFamily="34" charset="0"/>
+            </a:endParaRPr>
           </a:p>
         </p:txBody>
       </p:sp>

</xml_diff>

<commit_message>
SPARKOUR-6: New section on programming languages in spark-nutshell.
</commit_message>
<xml_diff>
--- a/data/work/diagrams.pptx
+++ b/data/work/diagrams.pptx
@@ -6,11 +6,12 @@
   </p:sldMasterIdLst>
   <p:sldIdLst>
     <p:sldId id="259" r:id="rId2"/>
-    <p:sldId id="256" r:id="rId3"/>
-    <p:sldId id="258" r:id="rId4"/>
-    <p:sldId id="262" r:id="rId5"/>
-    <p:sldId id="260" r:id="rId6"/>
-    <p:sldId id="261" r:id="rId7"/>
+    <p:sldId id="264" r:id="rId3"/>
+    <p:sldId id="256" r:id="rId4"/>
+    <p:sldId id="258" r:id="rId5"/>
+    <p:sldId id="262" r:id="rId6"/>
+    <p:sldId id="260" r:id="rId7"/>
+    <p:sldId id="261" r:id="rId8"/>
   </p:sldIdLst>
   <p:sldSz cx="9144000" cy="6858000" type="screen4x3"/>
   <p:notesSz cx="6858000" cy="9144000"/>
@@ -293,7 +294,7 @@
           <a:p>
             <a:fld id="{8136B1A2-BD48-40D0-8ACE-0BC0EB70CE80}" type="datetimeFigureOut">
               <a:rPr lang="en-US" smtClean="0"/>
-              <a:t>3/5/2016</a:t>
+              <a:t>3/29/2016</a:t>
             </a:fld>
             <a:endParaRPr lang="en-US"/>
           </a:p>
@@ -463,7 +464,7 @@
           <a:p>
             <a:fld id="{8136B1A2-BD48-40D0-8ACE-0BC0EB70CE80}" type="datetimeFigureOut">
               <a:rPr lang="en-US" smtClean="0"/>
-              <a:t>3/5/2016</a:t>
+              <a:t>3/29/2016</a:t>
             </a:fld>
             <a:endParaRPr lang="en-US"/>
           </a:p>
@@ -643,7 +644,7 @@
           <a:p>
             <a:fld id="{8136B1A2-BD48-40D0-8ACE-0BC0EB70CE80}" type="datetimeFigureOut">
               <a:rPr lang="en-US" smtClean="0"/>
-              <a:t>3/5/2016</a:t>
+              <a:t>3/29/2016</a:t>
             </a:fld>
             <a:endParaRPr lang="en-US"/>
           </a:p>
@@ -813,7 +814,7 @@
           <a:p>
             <a:fld id="{8136B1A2-BD48-40D0-8ACE-0BC0EB70CE80}" type="datetimeFigureOut">
               <a:rPr lang="en-US" smtClean="0"/>
-              <a:t>3/5/2016</a:t>
+              <a:t>3/29/2016</a:t>
             </a:fld>
             <a:endParaRPr lang="en-US"/>
           </a:p>
@@ -1059,7 +1060,7 @@
           <a:p>
             <a:fld id="{8136B1A2-BD48-40D0-8ACE-0BC0EB70CE80}" type="datetimeFigureOut">
               <a:rPr lang="en-US" smtClean="0"/>
-              <a:t>3/5/2016</a:t>
+              <a:t>3/29/2016</a:t>
             </a:fld>
             <a:endParaRPr lang="en-US"/>
           </a:p>
@@ -1347,7 +1348,7 @@
           <a:p>
             <a:fld id="{8136B1A2-BD48-40D0-8ACE-0BC0EB70CE80}" type="datetimeFigureOut">
               <a:rPr lang="en-US" smtClean="0"/>
-              <a:t>3/5/2016</a:t>
+              <a:t>3/29/2016</a:t>
             </a:fld>
             <a:endParaRPr lang="en-US"/>
           </a:p>
@@ -1769,7 +1770,7 @@
           <a:p>
             <a:fld id="{8136B1A2-BD48-40D0-8ACE-0BC0EB70CE80}" type="datetimeFigureOut">
               <a:rPr lang="en-US" smtClean="0"/>
-              <a:t>3/5/2016</a:t>
+              <a:t>3/29/2016</a:t>
             </a:fld>
             <a:endParaRPr lang="en-US"/>
           </a:p>
@@ -1887,7 +1888,7 @@
           <a:p>
             <a:fld id="{8136B1A2-BD48-40D0-8ACE-0BC0EB70CE80}" type="datetimeFigureOut">
               <a:rPr lang="en-US" smtClean="0"/>
-              <a:t>3/5/2016</a:t>
+              <a:t>3/29/2016</a:t>
             </a:fld>
             <a:endParaRPr lang="en-US"/>
           </a:p>
@@ -1982,7 +1983,7 @@
           <a:p>
             <a:fld id="{8136B1A2-BD48-40D0-8ACE-0BC0EB70CE80}" type="datetimeFigureOut">
               <a:rPr lang="en-US" smtClean="0"/>
-              <a:t>3/5/2016</a:t>
+              <a:t>3/29/2016</a:t>
             </a:fld>
             <a:endParaRPr lang="en-US"/>
           </a:p>
@@ -2259,7 +2260,7 @@
           <a:p>
             <a:fld id="{8136B1A2-BD48-40D0-8ACE-0BC0EB70CE80}" type="datetimeFigureOut">
               <a:rPr lang="en-US" smtClean="0"/>
-              <a:t>3/5/2016</a:t>
+              <a:t>3/29/2016</a:t>
             </a:fld>
             <a:endParaRPr lang="en-US"/>
           </a:p>
@@ -2512,7 +2513,7 @@
           <a:p>
             <a:fld id="{8136B1A2-BD48-40D0-8ACE-0BC0EB70CE80}" type="datetimeFigureOut">
               <a:rPr lang="en-US" smtClean="0"/>
-              <a:t>3/5/2016</a:t>
+              <a:t>3/29/2016</a:t>
             </a:fld>
             <a:endParaRPr lang="en-US"/>
           </a:p>
@@ -2725,7 +2726,7 @@
           <a:p>
             <a:fld id="{8136B1A2-BD48-40D0-8ACE-0BC0EB70CE80}" type="datetimeFigureOut">
               <a:rPr lang="en-US" smtClean="0"/>
-              <a:t>3/5/2016</a:t>
+              <a:t>3/29/2016</a:t>
             </a:fld>
             <a:endParaRPr lang="en-US"/>
           </a:p>
@@ -3401,936 +3402,69 @@
       </p:grpSpPr>
       <p:sp>
         <p:nvSpPr>
-          <p:cNvPr id="4" name="Flowchart: Process 3"/>
-          <p:cNvSpPr/>
-          <p:nvPr/>
-        </p:nvSpPr>
-        <p:spPr>
-          <a:xfrm>
-            <a:off x="3124200" y="838200"/>
-            <a:ext cx="5486400" cy="2590800"/>
-          </a:xfrm>
-          <a:prstGeom prst="flowChartProcess">
-            <a:avLst/>
-          </a:prstGeom>
-        </p:spPr>
-        <p:style>
-          <a:lnRef idx="1">
-            <a:schemeClr val="accent1"/>
-          </a:lnRef>
-          <a:fillRef idx="2">
-            <a:schemeClr val="accent1"/>
-          </a:fillRef>
-          <a:effectRef idx="1">
-            <a:schemeClr val="accent1"/>
-          </a:effectRef>
-          <a:fontRef idx="minor">
-            <a:schemeClr val="dk1"/>
-          </a:fontRef>
-        </p:style>
-        <p:txBody>
-          <a:bodyPr rtlCol="0" anchor="b"/>
-          <a:lstStyle/>
-          <a:p>
-            <a:pPr algn="ctr"/>
+          <p:cNvPr id="5" name="TextBox 4"/>
+          <p:cNvSpPr txBox="1"/>
+          <p:nvPr/>
+        </p:nvSpPr>
+        <p:spPr>
+          <a:xfrm>
+            <a:off x="6934200" y="6400800"/>
+            <a:ext cx="1620957" cy="369332"/>
+          </a:xfrm>
+          <a:prstGeom prst="rect">
+            <a:avLst/>
+          </a:prstGeom>
+          <a:noFill/>
+        </p:spPr>
+        <p:txBody>
+          <a:bodyPr wrap="none" rtlCol="0">
+            <a:spAutoFit/>
+          </a:bodyPr>
+          <a:lstStyle/>
+          <a:p>
             <a:r>
               <a:rPr lang="en-US" smtClean="0">
                 <a:latin typeface="Helvetica" panose="020B0604020202030204" pitchFamily="34" charset="0"/>
               </a:rPr>
-              <a:t>Spark Cluster</a:t>
-            </a:r>
-            <a:endParaRPr lang="en-US">
-              <a:latin typeface="Helvetica" panose="020B0604020202030204" pitchFamily="34" charset="0"/>
-            </a:endParaRPr>
-          </a:p>
-        </p:txBody>
-      </p:sp>
-      <p:sp>
-        <p:nvSpPr>
-          <p:cNvPr id="7" name="Flowchart: Process 6"/>
-          <p:cNvSpPr/>
-          <p:nvPr/>
-        </p:nvSpPr>
-        <p:spPr>
-          <a:xfrm>
-            <a:off x="3124200" y="1676400"/>
-            <a:ext cx="1295400" cy="762000"/>
-          </a:xfrm>
-          <a:prstGeom prst="flowChartProcess">
-            <a:avLst/>
-          </a:prstGeom>
-        </p:spPr>
-        <p:style>
-          <a:lnRef idx="1">
-            <a:schemeClr val="dk1"/>
-          </a:lnRef>
-          <a:fillRef idx="2">
-            <a:schemeClr val="dk1"/>
-          </a:fillRef>
-          <a:effectRef idx="1">
-            <a:schemeClr val="dk1"/>
-          </a:effectRef>
-          <a:fontRef idx="minor">
-            <a:schemeClr val="dk1"/>
-          </a:fontRef>
-        </p:style>
-        <p:txBody>
-          <a:bodyPr rot="0" spcFirstLastPara="0" vertOverflow="overflow" horzOverflow="overflow" vert="horz" wrap="square" lIns="91440" tIns="45720" rIns="91440" bIns="45720" numCol="1" spcCol="0" rtlCol="0" fromWordArt="0" anchor="ctr" anchorCtr="0" forceAA="0" compatLnSpc="1">
-            <a:prstTxWarp prst="textNoShape">
-              <a:avLst/>
-            </a:prstTxWarp>
-            <a:noAutofit/>
-          </a:bodyPr>
-          <a:lstStyle/>
-          <a:p>
-            <a:pPr algn="ctr"/>
-            <a:r>
-              <a:rPr lang="en-US" smtClean="0">
-                <a:latin typeface="Helvetica" panose="020B0604020202030204" pitchFamily="34" charset="0"/>
-              </a:rPr>
-              <a:t>Cluster Manager</a:t>
-            </a:r>
-          </a:p>
-        </p:txBody>
-      </p:sp>
-      <p:sp>
-        <p:nvSpPr>
-          <p:cNvPr id="8" name="Flowchart: Process 7"/>
-          <p:cNvSpPr/>
-          <p:nvPr/>
-        </p:nvSpPr>
-        <p:spPr>
-          <a:xfrm>
-            <a:off x="5715000" y="1066800"/>
-            <a:ext cx="2743200" cy="762000"/>
-          </a:xfrm>
-          <a:prstGeom prst="flowChartProcess">
-            <a:avLst/>
-          </a:prstGeom>
-        </p:spPr>
-        <p:style>
-          <a:lnRef idx="1">
-            <a:schemeClr val="dk1"/>
-          </a:lnRef>
-          <a:fillRef idx="2">
-            <a:schemeClr val="dk1"/>
-          </a:fillRef>
-          <a:effectRef idx="1">
-            <a:schemeClr val="dk1"/>
-          </a:effectRef>
-          <a:fontRef idx="minor">
-            <a:schemeClr val="dk1"/>
-          </a:fontRef>
-        </p:style>
-        <p:txBody>
-          <a:bodyPr rot="0" spcFirstLastPara="0" vertOverflow="overflow" horzOverflow="overflow" vert="horz" wrap="square" lIns="91440" tIns="45720" rIns="91440" bIns="45720" numCol="1" spcCol="0" rtlCol="0" fromWordArt="0" anchor="ctr" anchorCtr="0" forceAA="0" compatLnSpc="1">
-            <a:prstTxWarp prst="textNoShape">
-              <a:avLst/>
-            </a:prstTxWarp>
-            <a:noAutofit/>
-          </a:bodyPr>
-          <a:lstStyle/>
-          <a:p>
-            <a:pPr algn="r"/>
-            <a:r>
-              <a:rPr lang="en-US" smtClean="0">
-                <a:latin typeface="Helvetica" panose="020B0604020202030204" pitchFamily="34" charset="0"/>
-              </a:rPr>
-              <a:t>Worker 1</a:t>
-            </a:r>
-          </a:p>
-        </p:txBody>
-      </p:sp>
-      <p:sp>
-        <p:nvSpPr>
-          <p:cNvPr id="9" name="Flowchart: Process 8"/>
-          <p:cNvSpPr/>
-          <p:nvPr/>
-        </p:nvSpPr>
-        <p:spPr>
-          <a:xfrm>
-            <a:off x="5715000" y="2286000"/>
-            <a:ext cx="2743200" cy="762000"/>
-          </a:xfrm>
-          <a:prstGeom prst="flowChartProcess">
-            <a:avLst/>
-          </a:prstGeom>
-        </p:spPr>
-        <p:style>
-          <a:lnRef idx="1">
-            <a:schemeClr val="dk1"/>
-          </a:lnRef>
-          <a:fillRef idx="2">
-            <a:schemeClr val="dk1"/>
-          </a:fillRef>
-          <a:effectRef idx="1">
-            <a:schemeClr val="dk1"/>
-          </a:effectRef>
-          <a:fontRef idx="minor">
-            <a:schemeClr val="dk1"/>
-          </a:fontRef>
-        </p:style>
-        <p:txBody>
-          <a:bodyPr rot="0" spcFirstLastPara="0" vertOverflow="overflow" horzOverflow="overflow" vert="horz" wrap="square" lIns="91440" tIns="45720" rIns="91440" bIns="45720" numCol="1" spcCol="0" rtlCol="0" fromWordArt="0" anchor="ctr" anchorCtr="0" forceAA="0" compatLnSpc="1">
-            <a:prstTxWarp prst="textNoShape">
-              <a:avLst/>
-            </a:prstTxWarp>
-            <a:noAutofit/>
-          </a:bodyPr>
-          <a:lstStyle/>
-          <a:p>
-            <a:pPr algn="r"/>
-            <a:r>
-              <a:rPr lang="en-US" smtClean="0">
-                <a:latin typeface="Helvetica" panose="020B0604020202030204" pitchFamily="34" charset="0"/>
-              </a:rPr>
-              <a:t>Worker n</a:t>
-            </a:r>
-          </a:p>
-        </p:txBody>
-      </p:sp>
-      <p:sp>
-        <p:nvSpPr>
-          <p:cNvPr id="10" name="Flowchart: Process 9"/>
-          <p:cNvSpPr/>
-          <p:nvPr/>
-        </p:nvSpPr>
-        <p:spPr>
-          <a:xfrm>
-            <a:off x="5791200" y="1295400"/>
-            <a:ext cx="1295400" cy="457200"/>
-          </a:xfrm>
-          <a:prstGeom prst="flowChartProcess">
-            <a:avLst/>
-          </a:prstGeom>
-          <a:ln w="9525"/>
-        </p:spPr>
-        <p:style>
-          <a:lnRef idx="2">
-            <a:schemeClr val="dk1"/>
-          </a:lnRef>
-          <a:fillRef idx="1">
-            <a:schemeClr val="lt1"/>
-          </a:fillRef>
-          <a:effectRef idx="0">
-            <a:schemeClr val="dk1"/>
-          </a:effectRef>
-          <a:fontRef idx="minor">
-            <a:schemeClr val="dk1"/>
-          </a:fontRef>
-        </p:style>
-        <p:txBody>
-          <a:bodyPr rot="0" spcFirstLastPara="0" vertOverflow="overflow" horzOverflow="overflow" vert="horz" wrap="square" lIns="91440" tIns="45720" rIns="91440" bIns="45720" numCol="1" spcCol="0" rtlCol="0" fromWordArt="0" anchor="ctr" anchorCtr="0" forceAA="0" compatLnSpc="1">
-            <a:prstTxWarp prst="textNoShape">
-              <a:avLst/>
-            </a:prstTxWarp>
-            <a:noAutofit/>
-          </a:bodyPr>
-          <a:lstStyle/>
-          <a:p>
-            <a:pPr algn="ctr"/>
-            <a:r>
-              <a:rPr lang="en-US" sz="1400" smtClean="0">
-                <a:latin typeface="Helvetica" panose="020B0604020202030204" pitchFamily="34" charset="0"/>
-              </a:rPr>
-              <a:t>Executor</a:t>
-            </a:r>
-          </a:p>
-        </p:txBody>
-      </p:sp>
-      <p:sp>
-        <p:nvSpPr>
-          <p:cNvPr id="11" name="Flowchart: Process 10"/>
-          <p:cNvSpPr/>
-          <p:nvPr/>
-        </p:nvSpPr>
-        <p:spPr>
-          <a:xfrm>
-            <a:off x="5791200" y="2362200"/>
-            <a:ext cx="1295400" cy="457200"/>
-          </a:xfrm>
-          <a:prstGeom prst="flowChartProcess">
-            <a:avLst/>
-          </a:prstGeom>
-          <a:ln w="9525"/>
-        </p:spPr>
-        <p:style>
-          <a:lnRef idx="2">
-            <a:schemeClr val="dk1"/>
-          </a:lnRef>
-          <a:fillRef idx="1">
-            <a:schemeClr val="lt1"/>
-          </a:fillRef>
-          <a:effectRef idx="0">
-            <a:schemeClr val="dk1"/>
-          </a:effectRef>
-          <a:fontRef idx="minor">
-            <a:schemeClr val="dk1"/>
-          </a:fontRef>
-        </p:style>
-        <p:txBody>
-          <a:bodyPr rot="0" spcFirstLastPara="0" vertOverflow="overflow" horzOverflow="overflow" vert="horz" wrap="square" lIns="91440" tIns="45720" rIns="91440" bIns="45720" numCol="1" spcCol="0" rtlCol="0" fromWordArt="0" anchor="ctr" anchorCtr="0" forceAA="0" compatLnSpc="1">
-            <a:prstTxWarp prst="textNoShape">
-              <a:avLst/>
-            </a:prstTxWarp>
-            <a:noAutofit/>
-          </a:bodyPr>
-          <a:lstStyle/>
-          <a:p>
-            <a:pPr algn="ctr"/>
-            <a:r>
-              <a:rPr lang="en-US" sz="1400" smtClean="0">
-                <a:latin typeface="Helvetica" panose="020B0604020202030204" pitchFamily="34" charset="0"/>
-              </a:rPr>
-              <a:t>Executor</a:t>
-            </a:r>
-          </a:p>
-        </p:txBody>
-      </p:sp>
-      <p:cxnSp>
-        <p:nvCxnSpPr>
-          <p:cNvPr id="13" name="Straight Arrow Connector 12"/>
-          <p:cNvCxnSpPr/>
-          <p:nvPr/>
-        </p:nvCxnSpPr>
-        <p:spPr>
-          <a:xfrm>
-            <a:off x="4419600" y="1752600"/>
-            <a:ext cx="1295400" cy="0"/>
-          </a:xfrm>
-          <a:prstGeom prst="straightConnector1">
-            <a:avLst/>
-          </a:prstGeom>
-          <a:ln w="12700">
-            <a:tailEnd type="arrow"/>
-          </a:ln>
-        </p:spPr>
-        <p:style>
-          <a:lnRef idx="2">
-            <a:schemeClr val="dk1"/>
-          </a:lnRef>
-          <a:fillRef idx="0">
-            <a:schemeClr val="dk1"/>
-          </a:fillRef>
-          <a:effectRef idx="1">
-            <a:schemeClr val="dk1"/>
-          </a:effectRef>
-          <a:fontRef idx="minor">
-            <a:schemeClr val="tx1"/>
-          </a:fontRef>
-        </p:style>
-      </p:cxnSp>
-      <p:cxnSp>
-        <p:nvCxnSpPr>
-          <p:cNvPr id="15" name="Straight Arrow Connector 14"/>
-          <p:cNvCxnSpPr/>
-          <p:nvPr/>
-        </p:nvCxnSpPr>
-        <p:spPr>
-          <a:xfrm>
-            <a:off x="4419600" y="2362200"/>
-            <a:ext cx="1295400" cy="0"/>
-          </a:xfrm>
-          <a:prstGeom prst="straightConnector1">
-            <a:avLst/>
-          </a:prstGeom>
-          <a:ln w="12700">
-            <a:tailEnd type="arrow"/>
-          </a:ln>
-        </p:spPr>
-        <p:style>
-          <a:lnRef idx="2">
-            <a:schemeClr val="dk1"/>
-          </a:lnRef>
-          <a:fillRef idx="0">
-            <a:schemeClr val="dk1"/>
-          </a:fillRef>
-          <a:effectRef idx="1">
-            <a:schemeClr val="dk1"/>
-          </a:effectRef>
-          <a:fontRef idx="minor">
-            <a:schemeClr val="tx1"/>
-          </a:fontRef>
-        </p:style>
-      </p:cxnSp>
-      <p:cxnSp>
-        <p:nvCxnSpPr>
-          <p:cNvPr id="17" name="Straight Arrow Connector 16"/>
-          <p:cNvCxnSpPr>
-            <a:stCxn id="28" idx="3"/>
-            <a:endCxn id="7" idx="1"/>
-          </p:cNvCxnSpPr>
-          <p:nvPr/>
-        </p:nvCxnSpPr>
-        <p:spPr>
-          <a:xfrm>
-            <a:off x="2438400" y="2057400"/>
-            <a:ext cx="685800" cy="0"/>
-          </a:xfrm>
-          <a:prstGeom prst="straightConnector1">
-            <a:avLst/>
-          </a:prstGeom>
-          <a:ln w="12700">
-            <a:tailEnd type="arrow"/>
-          </a:ln>
-        </p:spPr>
-        <p:style>
-          <a:lnRef idx="2">
-            <a:schemeClr val="dk1"/>
-          </a:lnRef>
-          <a:fillRef idx="0">
-            <a:schemeClr val="dk1"/>
-          </a:fillRef>
-          <a:effectRef idx="1">
-            <a:schemeClr val="dk1"/>
-          </a:effectRef>
-          <a:fontRef idx="minor">
-            <a:schemeClr val="tx1"/>
-          </a:fontRef>
-        </p:style>
-      </p:cxnSp>
-      <p:sp>
-        <p:nvSpPr>
-          <p:cNvPr id="23" name="TextBox 22"/>
-          <p:cNvSpPr txBox="1"/>
-          <p:nvPr/>
-        </p:nvSpPr>
-        <p:spPr>
-          <a:xfrm>
-            <a:off x="2362200" y="1828800"/>
-            <a:ext cx="431528" cy="276999"/>
+              <a:t>spark-nutshell</a:t>
+            </a:r>
+          </a:p>
+        </p:txBody>
+      </p:sp>
+      <p:pic>
+        <p:nvPicPr>
+          <p:cNvPr id="2" name="Picture 1"/>
+          <p:cNvPicPr>
+            <a:picLocks noChangeAspect="1"/>
+          </p:cNvPicPr>
+          <p:nvPr/>
+        </p:nvPicPr>
+        <p:blipFill>
+          <a:blip r:embed="rId2">
+            <a:extLst>
+              <a:ext uri="{28A0092B-C50C-407E-A947-70E740481C1C}">
+                <a14:useLocalDpi xmlns:a14="http://schemas.microsoft.com/office/drawing/2010/main" val="0"/>
+              </a:ext>
+            </a:extLst>
+          </a:blip>
+          <a:stretch>
+            <a:fillRect/>
+          </a:stretch>
+        </p:blipFill>
+        <p:spPr>
+          <a:xfrm>
+            <a:off x="914400" y="457200"/>
+            <a:ext cx="7143750" cy="3200400"/>
           </a:xfrm>
           <a:prstGeom prst="rect">
             <a:avLst/>
           </a:prstGeom>
-          <a:noFill/>
-        </p:spPr>
-        <p:txBody>
-          <a:bodyPr wrap="none" rtlCol="0">
-            <a:spAutoFit/>
-          </a:bodyPr>
-          <a:lstStyle/>
-          <a:p>
-            <a:r>
-              <a:rPr lang="en-US" sz="1200" smtClean="0">
-                <a:latin typeface="Helvetica" panose="020B0604020202030204" pitchFamily="34" charset="0"/>
-              </a:rPr>
-              <a:t>Job</a:t>
-            </a:r>
-            <a:endParaRPr lang="en-US" sz="1200">
-              <a:latin typeface="Helvetica" panose="020B0604020202030204" pitchFamily="34" charset="0"/>
-            </a:endParaRPr>
-          </a:p>
-        </p:txBody>
-      </p:sp>
-      <p:sp>
-        <p:nvSpPr>
-          <p:cNvPr id="24" name="TextBox 23"/>
-          <p:cNvSpPr txBox="1"/>
-          <p:nvPr/>
-        </p:nvSpPr>
-        <p:spPr>
-          <a:xfrm>
-            <a:off x="4343400" y="1524000"/>
-            <a:ext cx="595035" cy="276999"/>
-          </a:xfrm>
-          <a:prstGeom prst="rect">
-            <a:avLst/>
-          </a:prstGeom>
-          <a:noFill/>
-        </p:spPr>
-        <p:txBody>
-          <a:bodyPr wrap="none" rtlCol="0">
-            <a:spAutoFit/>
-          </a:bodyPr>
-          <a:lstStyle/>
-          <a:p>
-            <a:r>
-              <a:rPr lang="en-US" sz="1200" smtClean="0">
-                <a:latin typeface="Helvetica" panose="020B0604020202030204" pitchFamily="34" charset="0"/>
-              </a:rPr>
-              <a:t>Tasks</a:t>
-            </a:r>
-            <a:endParaRPr lang="en-US" sz="1200">
-              <a:latin typeface="Helvetica" panose="020B0604020202030204" pitchFamily="34" charset="0"/>
-            </a:endParaRPr>
-          </a:p>
-        </p:txBody>
-      </p:sp>
-      <p:sp>
-        <p:nvSpPr>
-          <p:cNvPr id="25" name="TextBox 24"/>
-          <p:cNvSpPr txBox="1"/>
-          <p:nvPr/>
-        </p:nvSpPr>
-        <p:spPr>
-          <a:xfrm>
-            <a:off x="4343400" y="2085201"/>
-            <a:ext cx="595035" cy="276999"/>
-          </a:xfrm>
-          <a:prstGeom prst="rect">
-            <a:avLst/>
-          </a:prstGeom>
-          <a:noFill/>
-        </p:spPr>
-        <p:txBody>
-          <a:bodyPr wrap="none" rtlCol="0">
-            <a:spAutoFit/>
-          </a:bodyPr>
-          <a:lstStyle/>
-          <a:p>
-            <a:r>
-              <a:rPr lang="en-US" sz="1200" smtClean="0">
-                <a:latin typeface="Helvetica" panose="020B0604020202030204" pitchFamily="34" charset="0"/>
-              </a:rPr>
-              <a:t>Tasks</a:t>
-            </a:r>
-            <a:endParaRPr lang="en-US" sz="1200">
-              <a:latin typeface="Helvetica" panose="020B0604020202030204" pitchFamily="34" charset="0"/>
-            </a:endParaRPr>
-          </a:p>
-        </p:txBody>
-      </p:sp>
-      <p:cxnSp>
-        <p:nvCxnSpPr>
-          <p:cNvPr id="27" name="Elbow Connector 26"/>
-          <p:cNvCxnSpPr>
-            <a:stCxn id="8" idx="1"/>
-            <a:endCxn id="7" idx="0"/>
-          </p:cNvCxnSpPr>
-          <p:nvPr/>
-        </p:nvCxnSpPr>
-        <p:spPr>
-          <a:xfrm rot="10800000" flipV="1">
-            <a:off x="3771900" y="1447800"/>
-            <a:ext cx="1943100" cy="228600"/>
-          </a:xfrm>
-          <a:prstGeom prst="bentConnector2">
-            <a:avLst/>
-          </a:prstGeom>
-          <a:ln w="12700">
-            <a:tailEnd type="arrow"/>
-          </a:ln>
-        </p:spPr>
-        <p:style>
-          <a:lnRef idx="2">
-            <a:schemeClr val="dk1"/>
-          </a:lnRef>
-          <a:fillRef idx="0">
-            <a:schemeClr val="dk1"/>
-          </a:fillRef>
-          <a:effectRef idx="1">
-            <a:schemeClr val="dk1"/>
-          </a:effectRef>
-          <a:fontRef idx="minor">
-            <a:schemeClr val="tx1"/>
-          </a:fontRef>
-        </p:style>
-      </p:cxnSp>
-      <p:cxnSp>
-        <p:nvCxnSpPr>
-          <p:cNvPr id="29" name="Elbow Connector 28"/>
-          <p:cNvCxnSpPr>
-            <a:stCxn id="9" idx="1"/>
-            <a:endCxn id="7" idx="2"/>
-          </p:cNvCxnSpPr>
-          <p:nvPr/>
-        </p:nvCxnSpPr>
-        <p:spPr>
-          <a:xfrm rot="10800000">
-            <a:off x="3771900" y="2438400"/>
-            <a:ext cx="1943100" cy="228600"/>
-          </a:xfrm>
-          <a:prstGeom prst="bentConnector2">
-            <a:avLst/>
-          </a:prstGeom>
-          <a:ln w="12700">
-            <a:tailEnd type="arrow"/>
-          </a:ln>
-        </p:spPr>
-        <p:style>
-          <a:lnRef idx="2">
-            <a:schemeClr val="dk1"/>
-          </a:lnRef>
-          <a:fillRef idx="0">
-            <a:schemeClr val="dk1"/>
-          </a:fillRef>
-          <a:effectRef idx="1">
-            <a:schemeClr val="dk1"/>
-          </a:effectRef>
-          <a:fontRef idx="minor">
-            <a:schemeClr val="tx1"/>
-          </a:fontRef>
-        </p:style>
-      </p:cxnSp>
-      <p:sp>
-        <p:nvSpPr>
-          <p:cNvPr id="31" name="TextBox 30"/>
-          <p:cNvSpPr txBox="1"/>
-          <p:nvPr/>
-        </p:nvSpPr>
-        <p:spPr>
-          <a:xfrm>
-            <a:off x="5105400" y="1219200"/>
-            <a:ext cx="620683" cy="276999"/>
-          </a:xfrm>
-          <a:prstGeom prst="rect">
-            <a:avLst/>
-          </a:prstGeom>
-          <a:noFill/>
-        </p:spPr>
-        <p:txBody>
-          <a:bodyPr wrap="none" rtlCol="0">
-            <a:spAutoFit/>
-          </a:bodyPr>
-          <a:lstStyle/>
-          <a:p>
-            <a:r>
-              <a:rPr lang="en-US" sz="1200" smtClean="0">
-                <a:latin typeface="Helvetica" panose="020B0604020202030204" pitchFamily="34" charset="0"/>
-              </a:rPr>
-              <a:t>Status</a:t>
-            </a:r>
-            <a:endParaRPr lang="en-US" sz="1200">
-              <a:latin typeface="Helvetica" panose="020B0604020202030204" pitchFamily="34" charset="0"/>
-            </a:endParaRPr>
-          </a:p>
-        </p:txBody>
-      </p:sp>
-      <p:sp>
-        <p:nvSpPr>
-          <p:cNvPr id="32" name="TextBox 31"/>
-          <p:cNvSpPr txBox="1"/>
-          <p:nvPr/>
-        </p:nvSpPr>
-        <p:spPr>
-          <a:xfrm>
-            <a:off x="5105400" y="2438400"/>
-            <a:ext cx="620683" cy="276999"/>
-          </a:xfrm>
-          <a:prstGeom prst="rect">
-            <a:avLst/>
-          </a:prstGeom>
-          <a:noFill/>
-        </p:spPr>
-        <p:txBody>
-          <a:bodyPr wrap="none" rtlCol="0">
-            <a:spAutoFit/>
-          </a:bodyPr>
-          <a:lstStyle/>
-          <a:p>
-            <a:r>
-              <a:rPr lang="en-US" sz="1200" smtClean="0">
-                <a:latin typeface="Helvetica" panose="020B0604020202030204" pitchFamily="34" charset="0"/>
-              </a:rPr>
-              <a:t>Status</a:t>
-            </a:r>
-            <a:endParaRPr lang="en-US" sz="1200">
-              <a:latin typeface="Helvetica" panose="020B0604020202030204" pitchFamily="34" charset="0"/>
-            </a:endParaRPr>
-          </a:p>
-        </p:txBody>
-      </p:sp>
-      <p:sp>
-        <p:nvSpPr>
-          <p:cNvPr id="36" name="TextBox 35"/>
-          <p:cNvSpPr txBox="1"/>
-          <p:nvPr/>
-        </p:nvSpPr>
-        <p:spPr>
-          <a:xfrm>
-            <a:off x="5095920" y="2743200"/>
-            <a:ext cx="619080" cy="276999"/>
-          </a:xfrm>
-          <a:prstGeom prst="rect">
-            <a:avLst/>
-          </a:prstGeom>
-          <a:noFill/>
-        </p:spPr>
-        <p:txBody>
-          <a:bodyPr wrap="none" rtlCol="0">
-            <a:spAutoFit/>
-          </a:bodyPr>
-          <a:lstStyle/>
-          <a:p>
-            <a:r>
-              <a:rPr lang="en-US" sz="1200" smtClean="0">
-                <a:latin typeface="Helvetica" panose="020B0604020202030204" pitchFamily="34" charset="0"/>
-              </a:rPr>
-              <a:t>Result</a:t>
-            </a:r>
-            <a:endParaRPr lang="en-US" sz="1200">
-              <a:latin typeface="Helvetica" panose="020B0604020202030204" pitchFamily="34" charset="0"/>
-            </a:endParaRPr>
-          </a:p>
-        </p:txBody>
-      </p:sp>
-      <p:sp>
-        <p:nvSpPr>
-          <p:cNvPr id="37" name="TextBox 36"/>
-          <p:cNvSpPr txBox="1"/>
-          <p:nvPr/>
-        </p:nvSpPr>
-        <p:spPr>
-          <a:xfrm>
-            <a:off x="5095920" y="914400"/>
-            <a:ext cx="619080" cy="276999"/>
-          </a:xfrm>
-          <a:prstGeom prst="rect">
-            <a:avLst/>
-          </a:prstGeom>
-          <a:noFill/>
-        </p:spPr>
-        <p:txBody>
-          <a:bodyPr wrap="none" rtlCol="0">
-            <a:spAutoFit/>
-          </a:bodyPr>
-          <a:lstStyle/>
-          <a:p>
-            <a:r>
-              <a:rPr lang="en-US" sz="1200" smtClean="0">
-                <a:latin typeface="Helvetica" panose="020B0604020202030204" pitchFamily="34" charset="0"/>
-              </a:rPr>
-              <a:t>Result</a:t>
-            </a:r>
-            <a:endParaRPr lang="en-US" sz="1200">
-              <a:latin typeface="Helvetica" panose="020B0604020202030204" pitchFamily="34" charset="0"/>
-            </a:endParaRPr>
-          </a:p>
-        </p:txBody>
-      </p:sp>
-      <p:sp>
-        <p:nvSpPr>
-          <p:cNvPr id="38" name="TextBox 37"/>
-          <p:cNvSpPr txBox="1"/>
-          <p:nvPr/>
-        </p:nvSpPr>
-        <p:spPr>
-          <a:xfrm>
-            <a:off x="6934200" y="6400800"/>
-            <a:ext cx="2069797" cy="369332"/>
-          </a:xfrm>
-          <a:prstGeom prst="rect">
-            <a:avLst/>
-          </a:prstGeom>
-          <a:noFill/>
-        </p:spPr>
-        <p:txBody>
-          <a:bodyPr wrap="none" rtlCol="0">
-            <a:spAutoFit/>
-          </a:bodyPr>
-          <a:lstStyle/>
-          <a:p>
-            <a:r>
-              <a:rPr lang="en-US" smtClean="0">
-                <a:latin typeface="Helvetica" panose="020B0604020202030204" pitchFamily="34" charset="0"/>
-              </a:rPr>
-              <a:t>managing-clusters</a:t>
-            </a:r>
-          </a:p>
-        </p:txBody>
-      </p:sp>
-      <p:sp>
-        <p:nvSpPr>
-          <p:cNvPr id="39" name="TextBox 38"/>
-          <p:cNvSpPr txBox="1"/>
-          <p:nvPr/>
-        </p:nvSpPr>
-        <p:spPr>
-          <a:xfrm>
-            <a:off x="7844135" y="1925107"/>
-            <a:ext cx="461665" cy="284693"/>
-          </a:xfrm>
-          <a:prstGeom prst="rect">
-            <a:avLst/>
-          </a:prstGeom>
-          <a:noFill/>
-        </p:spPr>
-        <p:txBody>
-          <a:bodyPr vert="vert" wrap="none" rtlCol="0">
-            <a:spAutoFit/>
-          </a:bodyPr>
-          <a:lstStyle/>
-          <a:p>
-            <a:r>
-              <a:rPr lang="en-US" b="1" smtClean="0">
-                <a:latin typeface="Helvetica" panose="020B0604020202030204" pitchFamily="34" charset="0"/>
-              </a:rPr>
-              <a:t>...</a:t>
-            </a:r>
-          </a:p>
-        </p:txBody>
-      </p:sp>
-      <p:sp>
-        <p:nvSpPr>
-          <p:cNvPr id="28" name="Flowchart: Process 27"/>
-          <p:cNvSpPr/>
-          <p:nvPr/>
-        </p:nvSpPr>
-        <p:spPr>
-          <a:xfrm>
-            <a:off x="76200" y="1676400"/>
-            <a:ext cx="2362200" cy="762000"/>
-          </a:xfrm>
-          <a:prstGeom prst="flowChartProcess">
-            <a:avLst/>
-          </a:prstGeom>
-        </p:spPr>
-        <p:style>
-          <a:lnRef idx="1">
-            <a:schemeClr val="dk1"/>
-          </a:lnRef>
-          <a:fillRef idx="2">
-            <a:schemeClr val="dk1"/>
-          </a:fillRef>
-          <a:effectRef idx="1">
-            <a:schemeClr val="dk1"/>
-          </a:effectRef>
-          <a:fontRef idx="minor">
-            <a:schemeClr val="dk1"/>
-          </a:fontRef>
-        </p:style>
-        <p:txBody>
-          <a:bodyPr rot="0" spcFirstLastPara="0" vertOverflow="overflow" horzOverflow="overflow" vert="horz" wrap="square" lIns="91440" tIns="45720" rIns="91440" bIns="45720" numCol="1" spcCol="0" rtlCol="0" fromWordArt="0" anchor="ctr" anchorCtr="0" forceAA="0" compatLnSpc="1">
-            <a:prstTxWarp prst="textNoShape">
-              <a:avLst/>
-            </a:prstTxWarp>
-            <a:noAutofit/>
-          </a:bodyPr>
-          <a:lstStyle/>
-          <a:p>
-            <a:r>
-              <a:rPr lang="en-US" smtClean="0">
-                <a:latin typeface="Helvetica" panose="020B0604020202030204" pitchFamily="34" charset="0"/>
-              </a:rPr>
-              <a:t>Driver</a:t>
-            </a:r>
-          </a:p>
-        </p:txBody>
-      </p:sp>
-      <p:sp>
-        <p:nvSpPr>
-          <p:cNvPr id="30" name="Flowchart: Process 29"/>
-          <p:cNvSpPr/>
-          <p:nvPr/>
-        </p:nvSpPr>
-        <p:spPr>
-          <a:xfrm>
-            <a:off x="914400" y="1828800"/>
-            <a:ext cx="1371600" cy="457200"/>
-          </a:xfrm>
-          <a:prstGeom prst="flowChartProcess">
-            <a:avLst/>
-          </a:prstGeom>
-          <a:ln w="9525"/>
-        </p:spPr>
-        <p:style>
-          <a:lnRef idx="2">
-            <a:schemeClr val="dk1"/>
-          </a:lnRef>
-          <a:fillRef idx="1">
-            <a:schemeClr val="lt1"/>
-          </a:fillRef>
-          <a:effectRef idx="0">
-            <a:schemeClr val="dk1"/>
-          </a:effectRef>
-          <a:fontRef idx="minor">
-            <a:schemeClr val="dk1"/>
-          </a:fontRef>
-        </p:style>
-        <p:txBody>
-          <a:bodyPr rot="0" spcFirstLastPara="0" vertOverflow="overflow" horzOverflow="overflow" vert="horz" wrap="square" lIns="91440" tIns="45720" rIns="91440" bIns="45720" numCol="1" spcCol="0" rtlCol="0" fromWordArt="0" anchor="ctr" anchorCtr="0" forceAA="0" compatLnSpc="1">
-            <a:prstTxWarp prst="textNoShape">
-              <a:avLst/>
-            </a:prstTxWarp>
-            <a:noAutofit/>
-          </a:bodyPr>
-          <a:lstStyle/>
-          <a:p>
-            <a:pPr algn="ctr"/>
-            <a:r>
-              <a:rPr lang="en-US" sz="1400" smtClean="0">
-                <a:latin typeface="Helvetica" panose="020B0604020202030204" pitchFamily="34" charset="0"/>
-              </a:rPr>
-              <a:t>Application</a:t>
-            </a:r>
-          </a:p>
-        </p:txBody>
-      </p:sp>
-      <p:cxnSp>
-        <p:nvCxnSpPr>
-          <p:cNvPr id="5" name="Elbow Connector 4"/>
-          <p:cNvCxnSpPr>
-            <a:endCxn id="28" idx="0"/>
-          </p:cNvCxnSpPr>
-          <p:nvPr/>
-        </p:nvCxnSpPr>
-        <p:spPr>
-          <a:xfrm rot="10800000" flipV="1">
-            <a:off x="1257300" y="1143000"/>
-            <a:ext cx="4457700" cy="533400"/>
-          </a:xfrm>
-          <a:prstGeom prst="bentConnector2">
-            <a:avLst/>
-          </a:prstGeom>
-          <a:ln w="12700">
-            <a:tailEnd type="arrow"/>
-          </a:ln>
-        </p:spPr>
-        <p:style>
-          <a:lnRef idx="2">
-            <a:schemeClr val="dk1"/>
-          </a:lnRef>
-          <a:fillRef idx="0">
-            <a:schemeClr val="dk1"/>
-          </a:fillRef>
-          <a:effectRef idx="1">
-            <a:schemeClr val="dk1"/>
-          </a:effectRef>
-          <a:fontRef idx="minor">
-            <a:schemeClr val="tx1"/>
-          </a:fontRef>
-        </p:style>
-      </p:cxnSp>
-      <p:cxnSp>
-        <p:nvCxnSpPr>
-          <p:cNvPr id="12" name="Elbow Connector 11"/>
-          <p:cNvCxnSpPr>
-            <a:endCxn id="28" idx="2"/>
-          </p:cNvCxnSpPr>
-          <p:nvPr/>
-        </p:nvCxnSpPr>
-        <p:spPr>
-          <a:xfrm rot="10800000">
-            <a:off x="1257300" y="2438400"/>
-            <a:ext cx="4457700" cy="533400"/>
-          </a:xfrm>
-          <a:prstGeom prst="bentConnector2">
-            <a:avLst/>
-          </a:prstGeom>
-          <a:ln w="12700">
-            <a:tailEnd type="arrow"/>
-          </a:ln>
-        </p:spPr>
-        <p:style>
-          <a:lnRef idx="2">
-            <a:schemeClr val="dk1"/>
-          </a:lnRef>
-          <a:fillRef idx="0">
-            <a:schemeClr val="dk1"/>
-          </a:fillRef>
-          <a:effectRef idx="1">
-            <a:schemeClr val="dk1"/>
-          </a:effectRef>
-          <a:fontRef idx="minor">
-            <a:schemeClr val="tx1"/>
-          </a:fontRef>
-        </p:style>
-      </p:cxnSp>
+        </p:spPr>
+      </p:pic>
     </p:spTree>
     <p:extLst>
       <p:ext uri="{BB962C8B-B14F-4D97-AF65-F5344CB8AC3E}">
-        <p14:creationId xmlns:p14="http://schemas.microsoft.com/office/powerpoint/2010/main" val="3177194930"/>
+        <p14:creationId xmlns:p14="http://schemas.microsoft.com/office/powerpoint/2010/main" val="580582882"/>
       </p:ext>
     </p:extLst>
   </p:cSld>
@@ -4359,45 +3493,14 @@
       </p:grpSpPr>
       <p:sp>
         <p:nvSpPr>
-          <p:cNvPr id="38" name="TextBox 37"/>
-          <p:cNvSpPr txBox="1"/>
-          <p:nvPr/>
-        </p:nvSpPr>
-        <p:spPr>
-          <a:xfrm>
-            <a:off x="6934200" y="6400800"/>
-            <a:ext cx="2069797" cy="369332"/>
-          </a:xfrm>
-          <a:prstGeom prst="rect">
-            <a:avLst/>
-          </a:prstGeom>
-          <a:noFill/>
-        </p:spPr>
-        <p:txBody>
-          <a:bodyPr wrap="none" rtlCol="0">
-            <a:spAutoFit/>
-          </a:bodyPr>
-          <a:lstStyle/>
-          <a:p>
-            <a:r>
-              <a:rPr lang="en-US" smtClean="0">
-                <a:latin typeface="Helvetica" panose="020B0604020202030204" pitchFamily="34" charset="0"/>
-              </a:rPr>
-              <a:t>managing-clusters</a:t>
-            </a:r>
-          </a:p>
-        </p:txBody>
-      </p:sp>
-      <p:sp>
-        <p:nvSpPr>
           <p:cNvPr id="4" name="Flowchart: Process 3"/>
           <p:cNvSpPr/>
           <p:nvPr/>
         </p:nvSpPr>
         <p:spPr>
           <a:xfrm>
-            <a:off x="2971800" y="533401"/>
-            <a:ext cx="2971800" cy="1295400"/>
+            <a:off x="3124200" y="838200"/>
+            <a:ext cx="5486400" cy="2590800"/>
           </a:xfrm>
           <a:prstGeom prst="flowChartProcess">
             <a:avLst/>
@@ -4422,6 +3525,995 @@
           <a:lstStyle/>
           <a:p>
             <a:pPr algn="ctr"/>
+            <a:r>
+              <a:rPr lang="en-US" smtClean="0">
+                <a:latin typeface="Helvetica" panose="020B0604020202030204" pitchFamily="34" charset="0"/>
+              </a:rPr>
+              <a:t>Spark Cluster</a:t>
+            </a:r>
+            <a:endParaRPr lang="en-US">
+              <a:latin typeface="Helvetica" panose="020B0604020202030204" pitchFamily="34" charset="0"/>
+            </a:endParaRPr>
+          </a:p>
+        </p:txBody>
+      </p:sp>
+      <p:sp>
+        <p:nvSpPr>
+          <p:cNvPr id="7" name="Flowchart: Process 6"/>
+          <p:cNvSpPr/>
+          <p:nvPr/>
+        </p:nvSpPr>
+        <p:spPr>
+          <a:xfrm>
+            <a:off x="3124200" y="1676400"/>
+            <a:ext cx="1295400" cy="762000"/>
+          </a:xfrm>
+          <a:prstGeom prst="flowChartProcess">
+            <a:avLst/>
+          </a:prstGeom>
+        </p:spPr>
+        <p:style>
+          <a:lnRef idx="1">
+            <a:schemeClr val="dk1"/>
+          </a:lnRef>
+          <a:fillRef idx="2">
+            <a:schemeClr val="dk1"/>
+          </a:fillRef>
+          <a:effectRef idx="1">
+            <a:schemeClr val="dk1"/>
+          </a:effectRef>
+          <a:fontRef idx="minor">
+            <a:schemeClr val="dk1"/>
+          </a:fontRef>
+        </p:style>
+        <p:txBody>
+          <a:bodyPr rot="0" spcFirstLastPara="0" vertOverflow="overflow" horzOverflow="overflow" vert="horz" wrap="square" lIns="91440" tIns="45720" rIns="91440" bIns="45720" numCol="1" spcCol="0" rtlCol="0" fromWordArt="0" anchor="ctr" anchorCtr="0" forceAA="0" compatLnSpc="1">
+            <a:prstTxWarp prst="textNoShape">
+              <a:avLst/>
+            </a:prstTxWarp>
+            <a:noAutofit/>
+          </a:bodyPr>
+          <a:lstStyle/>
+          <a:p>
+            <a:pPr algn="ctr"/>
+            <a:r>
+              <a:rPr lang="en-US" smtClean="0">
+                <a:latin typeface="Helvetica" panose="020B0604020202030204" pitchFamily="34" charset="0"/>
+              </a:rPr>
+              <a:t>Cluster Manager</a:t>
+            </a:r>
+          </a:p>
+        </p:txBody>
+      </p:sp>
+      <p:sp>
+        <p:nvSpPr>
+          <p:cNvPr id="8" name="Flowchart: Process 7"/>
+          <p:cNvSpPr/>
+          <p:nvPr/>
+        </p:nvSpPr>
+        <p:spPr>
+          <a:xfrm>
+            <a:off x="5715000" y="1066800"/>
+            <a:ext cx="2743200" cy="762000"/>
+          </a:xfrm>
+          <a:prstGeom prst="flowChartProcess">
+            <a:avLst/>
+          </a:prstGeom>
+        </p:spPr>
+        <p:style>
+          <a:lnRef idx="1">
+            <a:schemeClr val="dk1"/>
+          </a:lnRef>
+          <a:fillRef idx="2">
+            <a:schemeClr val="dk1"/>
+          </a:fillRef>
+          <a:effectRef idx="1">
+            <a:schemeClr val="dk1"/>
+          </a:effectRef>
+          <a:fontRef idx="minor">
+            <a:schemeClr val="dk1"/>
+          </a:fontRef>
+        </p:style>
+        <p:txBody>
+          <a:bodyPr rot="0" spcFirstLastPara="0" vertOverflow="overflow" horzOverflow="overflow" vert="horz" wrap="square" lIns="91440" tIns="45720" rIns="91440" bIns="45720" numCol="1" spcCol="0" rtlCol="0" fromWordArt="0" anchor="ctr" anchorCtr="0" forceAA="0" compatLnSpc="1">
+            <a:prstTxWarp prst="textNoShape">
+              <a:avLst/>
+            </a:prstTxWarp>
+            <a:noAutofit/>
+          </a:bodyPr>
+          <a:lstStyle/>
+          <a:p>
+            <a:pPr algn="r"/>
+            <a:r>
+              <a:rPr lang="en-US" smtClean="0">
+                <a:latin typeface="Helvetica" panose="020B0604020202030204" pitchFamily="34" charset="0"/>
+              </a:rPr>
+              <a:t>Worker 1</a:t>
+            </a:r>
+          </a:p>
+        </p:txBody>
+      </p:sp>
+      <p:sp>
+        <p:nvSpPr>
+          <p:cNvPr id="9" name="Flowchart: Process 8"/>
+          <p:cNvSpPr/>
+          <p:nvPr/>
+        </p:nvSpPr>
+        <p:spPr>
+          <a:xfrm>
+            <a:off x="5715000" y="2286000"/>
+            <a:ext cx="2743200" cy="762000"/>
+          </a:xfrm>
+          <a:prstGeom prst="flowChartProcess">
+            <a:avLst/>
+          </a:prstGeom>
+        </p:spPr>
+        <p:style>
+          <a:lnRef idx="1">
+            <a:schemeClr val="dk1"/>
+          </a:lnRef>
+          <a:fillRef idx="2">
+            <a:schemeClr val="dk1"/>
+          </a:fillRef>
+          <a:effectRef idx="1">
+            <a:schemeClr val="dk1"/>
+          </a:effectRef>
+          <a:fontRef idx="minor">
+            <a:schemeClr val="dk1"/>
+          </a:fontRef>
+        </p:style>
+        <p:txBody>
+          <a:bodyPr rot="0" spcFirstLastPara="0" vertOverflow="overflow" horzOverflow="overflow" vert="horz" wrap="square" lIns="91440" tIns="45720" rIns="91440" bIns="45720" numCol="1" spcCol="0" rtlCol="0" fromWordArt="0" anchor="ctr" anchorCtr="0" forceAA="0" compatLnSpc="1">
+            <a:prstTxWarp prst="textNoShape">
+              <a:avLst/>
+            </a:prstTxWarp>
+            <a:noAutofit/>
+          </a:bodyPr>
+          <a:lstStyle/>
+          <a:p>
+            <a:pPr algn="r"/>
+            <a:r>
+              <a:rPr lang="en-US" smtClean="0">
+                <a:latin typeface="Helvetica" panose="020B0604020202030204" pitchFamily="34" charset="0"/>
+              </a:rPr>
+              <a:t>Worker n</a:t>
+            </a:r>
+          </a:p>
+        </p:txBody>
+      </p:sp>
+      <p:sp>
+        <p:nvSpPr>
+          <p:cNvPr id="10" name="Flowchart: Process 9"/>
+          <p:cNvSpPr/>
+          <p:nvPr/>
+        </p:nvSpPr>
+        <p:spPr>
+          <a:xfrm>
+            <a:off x="5791200" y="1295400"/>
+            <a:ext cx="1295400" cy="457200"/>
+          </a:xfrm>
+          <a:prstGeom prst="flowChartProcess">
+            <a:avLst/>
+          </a:prstGeom>
+          <a:ln w="9525"/>
+        </p:spPr>
+        <p:style>
+          <a:lnRef idx="2">
+            <a:schemeClr val="dk1"/>
+          </a:lnRef>
+          <a:fillRef idx="1">
+            <a:schemeClr val="lt1"/>
+          </a:fillRef>
+          <a:effectRef idx="0">
+            <a:schemeClr val="dk1"/>
+          </a:effectRef>
+          <a:fontRef idx="minor">
+            <a:schemeClr val="dk1"/>
+          </a:fontRef>
+        </p:style>
+        <p:txBody>
+          <a:bodyPr rot="0" spcFirstLastPara="0" vertOverflow="overflow" horzOverflow="overflow" vert="horz" wrap="square" lIns="91440" tIns="45720" rIns="91440" bIns="45720" numCol="1" spcCol="0" rtlCol="0" fromWordArt="0" anchor="ctr" anchorCtr="0" forceAA="0" compatLnSpc="1">
+            <a:prstTxWarp prst="textNoShape">
+              <a:avLst/>
+            </a:prstTxWarp>
+            <a:noAutofit/>
+          </a:bodyPr>
+          <a:lstStyle/>
+          <a:p>
+            <a:pPr algn="ctr"/>
+            <a:r>
+              <a:rPr lang="en-US" sz="1400" smtClean="0">
+                <a:latin typeface="Helvetica" panose="020B0604020202030204" pitchFamily="34" charset="0"/>
+              </a:rPr>
+              <a:t>Executor</a:t>
+            </a:r>
+          </a:p>
+        </p:txBody>
+      </p:sp>
+      <p:sp>
+        <p:nvSpPr>
+          <p:cNvPr id="11" name="Flowchart: Process 10"/>
+          <p:cNvSpPr/>
+          <p:nvPr/>
+        </p:nvSpPr>
+        <p:spPr>
+          <a:xfrm>
+            <a:off x="5791200" y="2362200"/>
+            <a:ext cx="1295400" cy="457200"/>
+          </a:xfrm>
+          <a:prstGeom prst="flowChartProcess">
+            <a:avLst/>
+          </a:prstGeom>
+          <a:ln w="9525"/>
+        </p:spPr>
+        <p:style>
+          <a:lnRef idx="2">
+            <a:schemeClr val="dk1"/>
+          </a:lnRef>
+          <a:fillRef idx="1">
+            <a:schemeClr val="lt1"/>
+          </a:fillRef>
+          <a:effectRef idx="0">
+            <a:schemeClr val="dk1"/>
+          </a:effectRef>
+          <a:fontRef idx="minor">
+            <a:schemeClr val="dk1"/>
+          </a:fontRef>
+        </p:style>
+        <p:txBody>
+          <a:bodyPr rot="0" spcFirstLastPara="0" vertOverflow="overflow" horzOverflow="overflow" vert="horz" wrap="square" lIns="91440" tIns="45720" rIns="91440" bIns="45720" numCol="1" spcCol="0" rtlCol="0" fromWordArt="0" anchor="ctr" anchorCtr="0" forceAA="0" compatLnSpc="1">
+            <a:prstTxWarp prst="textNoShape">
+              <a:avLst/>
+            </a:prstTxWarp>
+            <a:noAutofit/>
+          </a:bodyPr>
+          <a:lstStyle/>
+          <a:p>
+            <a:pPr algn="ctr"/>
+            <a:r>
+              <a:rPr lang="en-US" sz="1400" smtClean="0">
+                <a:latin typeface="Helvetica" panose="020B0604020202030204" pitchFamily="34" charset="0"/>
+              </a:rPr>
+              <a:t>Executor</a:t>
+            </a:r>
+          </a:p>
+        </p:txBody>
+      </p:sp>
+      <p:cxnSp>
+        <p:nvCxnSpPr>
+          <p:cNvPr id="13" name="Straight Arrow Connector 12"/>
+          <p:cNvCxnSpPr/>
+          <p:nvPr/>
+        </p:nvCxnSpPr>
+        <p:spPr>
+          <a:xfrm>
+            <a:off x="4419600" y="1752600"/>
+            <a:ext cx="1295400" cy="0"/>
+          </a:xfrm>
+          <a:prstGeom prst="straightConnector1">
+            <a:avLst/>
+          </a:prstGeom>
+          <a:ln w="12700">
+            <a:tailEnd type="arrow"/>
+          </a:ln>
+        </p:spPr>
+        <p:style>
+          <a:lnRef idx="2">
+            <a:schemeClr val="dk1"/>
+          </a:lnRef>
+          <a:fillRef idx="0">
+            <a:schemeClr val="dk1"/>
+          </a:fillRef>
+          <a:effectRef idx="1">
+            <a:schemeClr val="dk1"/>
+          </a:effectRef>
+          <a:fontRef idx="minor">
+            <a:schemeClr val="tx1"/>
+          </a:fontRef>
+        </p:style>
+      </p:cxnSp>
+      <p:cxnSp>
+        <p:nvCxnSpPr>
+          <p:cNvPr id="15" name="Straight Arrow Connector 14"/>
+          <p:cNvCxnSpPr/>
+          <p:nvPr/>
+        </p:nvCxnSpPr>
+        <p:spPr>
+          <a:xfrm>
+            <a:off x="4419600" y="2362200"/>
+            <a:ext cx="1295400" cy="0"/>
+          </a:xfrm>
+          <a:prstGeom prst="straightConnector1">
+            <a:avLst/>
+          </a:prstGeom>
+          <a:ln w="12700">
+            <a:tailEnd type="arrow"/>
+          </a:ln>
+        </p:spPr>
+        <p:style>
+          <a:lnRef idx="2">
+            <a:schemeClr val="dk1"/>
+          </a:lnRef>
+          <a:fillRef idx="0">
+            <a:schemeClr val="dk1"/>
+          </a:fillRef>
+          <a:effectRef idx="1">
+            <a:schemeClr val="dk1"/>
+          </a:effectRef>
+          <a:fontRef idx="minor">
+            <a:schemeClr val="tx1"/>
+          </a:fontRef>
+        </p:style>
+      </p:cxnSp>
+      <p:cxnSp>
+        <p:nvCxnSpPr>
+          <p:cNvPr id="17" name="Straight Arrow Connector 16"/>
+          <p:cNvCxnSpPr>
+            <a:stCxn id="28" idx="3"/>
+            <a:endCxn id="7" idx="1"/>
+          </p:cNvCxnSpPr>
+          <p:nvPr/>
+        </p:nvCxnSpPr>
+        <p:spPr>
+          <a:xfrm>
+            <a:off x="2438400" y="2057400"/>
+            <a:ext cx="685800" cy="0"/>
+          </a:xfrm>
+          <a:prstGeom prst="straightConnector1">
+            <a:avLst/>
+          </a:prstGeom>
+          <a:ln w="12700">
+            <a:tailEnd type="arrow"/>
+          </a:ln>
+        </p:spPr>
+        <p:style>
+          <a:lnRef idx="2">
+            <a:schemeClr val="dk1"/>
+          </a:lnRef>
+          <a:fillRef idx="0">
+            <a:schemeClr val="dk1"/>
+          </a:fillRef>
+          <a:effectRef idx="1">
+            <a:schemeClr val="dk1"/>
+          </a:effectRef>
+          <a:fontRef idx="minor">
+            <a:schemeClr val="tx1"/>
+          </a:fontRef>
+        </p:style>
+      </p:cxnSp>
+      <p:sp>
+        <p:nvSpPr>
+          <p:cNvPr id="23" name="TextBox 22"/>
+          <p:cNvSpPr txBox="1"/>
+          <p:nvPr/>
+        </p:nvSpPr>
+        <p:spPr>
+          <a:xfrm>
+            <a:off x="2362200" y="1828800"/>
+            <a:ext cx="431528" cy="276999"/>
+          </a:xfrm>
+          <a:prstGeom prst="rect">
+            <a:avLst/>
+          </a:prstGeom>
+          <a:noFill/>
+        </p:spPr>
+        <p:txBody>
+          <a:bodyPr wrap="none" rtlCol="0">
+            <a:spAutoFit/>
+          </a:bodyPr>
+          <a:lstStyle/>
+          <a:p>
+            <a:r>
+              <a:rPr lang="en-US" sz="1200" smtClean="0">
+                <a:latin typeface="Helvetica" panose="020B0604020202030204" pitchFamily="34" charset="0"/>
+              </a:rPr>
+              <a:t>Job</a:t>
+            </a:r>
+            <a:endParaRPr lang="en-US" sz="1200">
+              <a:latin typeface="Helvetica" panose="020B0604020202030204" pitchFamily="34" charset="0"/>
+            </a:endParaRPr>
+          </a:p>
+        </p:txBody>
+      </p:sp>
+      <p:sp>
+        <p:nvSpPr>
+          <p:cNvPr id="24" name="TextBox 23"/>
+          <p:cNvSpPr txBox="1"/>
+          <p:nvPr/>
+        </p:nvSpPr>
+        <p:spPr>
+          <a:xfrm>
+            <a:off x="4343400" y="1524000"/>
+            <a:ext cx="595035" cy="276999"/>
+          </a:xfrm>
+          <a:prstGeom prst="rect">
+            <a:avLst/>
+          </a:prstGeom>
+          <a:noFill/>
+        </p:spPr>
+        <p:txBody>
+          <a:bodyPr wrap="none" rtlCol="0">
+            <a:spAutoFit/>
+          </a:bodyPr>
+          <a:lstStyle/>
+          <a:p>
+            <a:r>
+              <a:rPr lang="en-US" sz="1200" smtClean="0">
+                <a:latin typeface="Helvetica" panose="020B0604020202030204" pitchFamily="34" charset="0"/>
+              </a:rPr>
+              <a:t>Tasks</a:t>
+            </a:r>
+            <a:endParaRPr lang="en-US" sz="1200">
+              <a:latin typeface="Helvetica" panose="020B0604020202030204" pitchFamily="34" charset="0"/>
+            </a:endParaRPr>
+          </a:p>
+        </p:txBody>
+      </p:sp>
+      <p:sp>
+        <p:nvSpPr>
+          <p:cNvPr id="25" name="TextBox 24"/>
+          <p:cNvSpPr txBox="1"/>
+          <p:nvPr/>
+        </p:nvSpPr>
+        <p:spPr>
+          <a:xfrm>
+            <a:off x="4343400" y="2085201"/>
+            <a:ext cx="595035" cy="276999"/>
+          </a:xfrm>
+          <a:prstGeom prst="rect">
+            <a:avLst/>
+          </a:prstGeom>
+          <a:noFill/>
+        </p:spPr>
+        <p:txBody>
+          <a:bodyPr wrap="none" rtlCol="0">
+            <a:spAutoFit/>
+          </a:bodyPr>
+          <a:lstStyle/>
+          <a:p>
+            <a:r>
+              <a:rPr lang="en-US" sz="1200" smtClean="0">
+                <a:latin typeface="Helvetica" panose="020B0604020202030204" pitchFamily="34" charset="0"/>
+              </a:rPr>
+              <a:t>Tasks</a:t>
+            </a:r>
+            <a:endParaRPr lang="en-US" sz="1200">
+              <a:latin typeface="Helvetica" panose="020B0604020202030204" pitchFamily="34" charset="0"/>
+            </a:endParaRPr>
+          </a:p>
+        </p:txBody>
+      </p:sp>
+      <p:cxnSp>
+        <p:nvCxnSpPr>
+          <p:cNvPr id="27" name="Elbow Connector 26"/>
+          <p:cNvCxnSpPr>
+            <a:stCxn id="8" idx="1"/>
+            <a:endCxn id="7" idx="0"/>
+          </p:cNvCxnSpPr>
+          <p:nvPr/>
+        </p:nvCxnSpPr>
+        <p:spPr>
+          <a:xfrm rot="10800000" flipV="1">
+            <a:off x="3771900" y="1447800"/>
+            <a:ext cx="1943100" cy="228600"/>
+          </a:xfrm>
+          <a:prstGeom prst="bentConnector2">
+            <a:avLst/>
+          </a:prstGeom>
+          <a:ln w="12700">
+            <a:tailEnd type="arrow"/>
+          </a:ln>
+        </p:spPr>
+        <p:style>
+          <a:lnRef idx="2">
+            <a:schemeClr val="dk1"/>
+          </a:lnRef>
+          <a:fillRef idx="0">
+            <a:schemeClr val="dk1"/>
+          </a:fillRef>
+          <a:effectRef idx="1">
+            <a:schemeClr val="dk1"/>
+          </a:effectRef>
+          <a:fontRef idx="minor">
+            <a:schemeClr val="tx1"/>
+          </a:fontRef>
+        </p:style>
+      </p:cxnSp>
+      <p:cxnSp>
+        <p:nvCxnSpPr>
+          <p:cNvPr id="29" name="Elbow Connector 28"/>
+          <p:cNvCxnSpPr>
+            <a:stCxn id="9" idx="1"/>
+            <a:endCxn id="7" idx="2"/>
+          </p:cNvCxnSpPr>
+          <p:nvPr/>
+        </p:nvCxnSpPr>
+        <p:spPr>
+          <a:xfrm rot="10800000">
+            <a:off x="3771900" y="2438400"/>
+            <a:ext cx="1943100" cy="228600"/>
+          </a:xfrm>
+          <a:prstGeom prst="bentConnector2">
+            <a:avLst/>
+          </a:prstGeom>
+          <a:ln w="12700">
+            <a:tailEnd type="arrow"/>
+          </a:ln>
+        </p:spPr>
+        <p:style>
+          <a:lnRef idx="2">
+            <a:schemeClr val="dk1"/>
+          </a:lnRef>
+          <a:fillRef idx="0">
+            <a:schemeClr val="dk1"/>
+          </a:fillRef>
+          <a:effectRef idx="1">
+            <a:schemeClr val="dk1"/>
+          </a:effectRef>
+          <a:fontRef idx="minor">
+            <a:schemeClr val="tx1"/>
+          </a:fontRef>
+        </p:style>
+      </p:cxnSp>
+      <p:sp>
+        <p:nvSpPr>
+          <p:cNvPr id="31" name="TextBox 30"/>
+          <p:cNvSpPr txBox="1"/>
+          <p:nvPr/>
+        </p:nvSpPr>
+        <p:spPr>
+          <a:xfrm>
+            <a:off x="5105400" y="1219200"/>
+            <a:ext cx="620683" cy="276999"/>
+          </a:xfrm>
+          <a:prstGeom prst="rect">
+            <a:avLst/>
+          </a:prstGeom>
+          <a:noFill/>
+        </p:spPr>
+        <p:txBody>
+          <a:bodyPr wrap="none" rtlCol="0">
+            <a:spAutoFit/>
+          </a:bodyPr>
+          <a:lstStyle/>
+          <a:p>
+            <a:r>
+              <a:rPr lang="en-US" sz="1200" smtClean="0">
+                <a:latin typeface="Helvetica" panose="020B0604020202030204" pitchFamily="34" charset="0"/>
+              </a:rPr>
+              <a:t>Status</a:t>
+            </a:r>
+            <a:endParaRPr lang="en-US" sz="1200">
+              <a:latin typeface="Helvetica" panose="020B0604020202030204" pitchFamily="34" charset="0"/>
+            </a:endParaRPr>
+          </a:p>
+        </p:txBody>
+      </p:sp>
+      <p:sp>
+        <p:nvSpPr>
+          <p:cNvPr id="32" name="TextBox 31"/>
+          <p:cNvSpPr txBox="1"/>
+          <p:nvPr/>
+        </p:nvSpPr>
+        <p:spPr>
+          <a:xfrm>
+            <a:off x="5105400" y="2438400"/>
+            <a:ext cx="620683" cy="276999"/>
+          </a:xfrm>
+          <a:prstGeom prst="rect">
+            <a:avLst/>
+          </a:prstGeom>
+          <a:noFill/>
+        </p:spPr>
+        <p:txBody>
+          <a:bodyPr wrap="none" rtlCol="0">
+            <a:spAutoFit/>
+          </a:bodyPr>
+          <a:lstStyle/>
+          <a:p>
+            <a:r>
+              <a:rPr lang="en-US" sz="1200" smtClean="0">
+                <a:latin typeface="Helvetica" panose="020B0604020202030204" pitchFamily="34" charset="0"/>
+              </a:rPr>
+              <a:t>Status</a:t>
+            </a:r>
+            <a:endParaRPr lang="en-US" sz="1200">
+              <a:latin typeface="Helvetica" panose="020B0604020202030204" pitchFamily="34" charset="0"/>
+            </a:endParaRPr>
+          </a:p>
+        </p:txBody>
+      </p:sp>
+      <p:sp>
+        <p:nvSpPr>
+          <p:cNvPr id="36" name="TextBox 35"/>
+          <p:cNvSpPr txBox="1"/>
+          <p:nvPr/>
+        </p:nvSpPr>
+        <p:spPr>
+          <a:xfrm>
+            <a:off x="5095920" y="2743200"/>
+            <a:ext cx="619080" cy="276999"/>
+          </a:xfrm>
+          <a:prstGeom prst="rect">
+            <a:avLst/>
+          </a:prstGeom>
+          <a:noFill/>
+        </p:spPr>
+        <p:txBody>
+          <a:bodyPr wrap="none" rtlCol="0">
+            <a:spAutoFit/>
+          </a:bodyPr>
+          <a:lstStyle/>
+          <a:p>
+            <a:r>
+              <a:rPr lang="en-US" sz="1200" smtClean="0">
+                <a:latin typeface="Helvetica" panose="020B0604020202030204" pitchFamily="34" charset="0"/>
+              </a:rPr>
+              <a:t>Result</a:t>
+            </a:r>
+            <a:endParaRPr lang="en-US" sz="1200">
+              <a:latin typeface="Helvetica" panose="020B0604020202030204" pitchFamily="34" charset="0"/>
+            </a:endParaRPr>
+          </a:p>
+        </p:txBody>
+      </p:sp>
+      <p:sp>
+        <p:nvSpPr>
+          <p:cNvPr id="37" name="TextBox 36"/>
+          <p:cNvSpPr txBox="1"/>
+          <p:nvPr/>
+        </p:nvSpPr>
+        <p:spPr>
+          <a:xfrm>
+            <a:off x="5095920" y="914400"/>
+            <a:ext cx="619080" cy="276999"/>
+          </a:xfrm>
+          <a:prstGeom prst="rect">
+            <a:avLst/>
+          </a:prstGeom>
+          <a:noFill/>
+        </p:spPr>
+        <p:txBody>
+          <a:bodyPr wrap="none" rtlCol="0">
+            <a:spAutoFit/>
+          </a:bodyPr>
+          <a:lstStyle/>
+          <a:p>
+            <a:r>
+              <a:rPr lang="en-US" sz="1200" smtClean="0">
+                <a:latin typeface="Helvetica" panose="020B0604020202030204" pitchFamily="34" charset="0"/>
+              </a:rPr>
+              <a:t>Result</a:t>
+            </a:r>
+            <a:endParaRPr lang="en-US" sz="1200">
+              <a:latin typeface="Helvetica" panose="020B0604020202030204" pitchFamily="34" charset="0"/>
+            </a:endParaRPr>
+          </a:p>
+        </p:txBody>
+      </p:sp>
+      <p:sp>
+        <p:nvSpPr>
+          <p:cNvPr id="38" name="TextBox 37"/>
+          <p:cNvSpPr txBox="1"/>
+          <p:nvPr/>
+        </p:nvSpPr>
+        <p:spPr>
+          <a:xfrm>
+            <a:off x="6934200" y="6400800"/>
+            <a:ext cx="2069797" cy="369332"/>
+          </a:xfrm>
+          <a:prstGeom prst="rect">
+            <a:avLst/>
+          </a:prstGeom>
+          <a:noFill/>
+        </p:spPr>
+        <p:txBody>
+          <a:bodyPr wrap="none" rtlCol="0">
+            <a:spAutoFit/>
+          </a:bodyPr>
+          <a:lstStyle/>
+          <a:p>
+            <a:r>
+              <a:rPr lang="en-US" smtClean="0">
+                <a:latin typeface="Helvetica" panose="020B0604020202030204" pitchFamily="34" charset="0"/>
+              </a:rPr>
+              <a:t>managing-clusters</a:t>
+            </a:r>
+          </a:p>
+        </p:txBody>
+      </p:sp>
+      <p:sp>
+        <p:nvSpPr>
+          <p:cNvPr id="39" name="TextBox 38"/>
+          <p:cNvSpPr txBox="1"/>
+          <p:nvPr/>
+        </p:nvSpPr>
+        <p:spPr>
+          <a:xfrm>
+            <a:off x="7844135" y="1925107"/>
+            <a:ext cx="461665" cy="284693"/>
+          </a:xfrm>
+          <a:prstGeom prst="rect">
+            <a:avLst/>
+          </a:prstGeom>
+          <a:noFill/>
+        </p:spPr>
+        <p:txBody>
+          <a:bodyPr vert="vert" wrap="none" rtlCol="0">
+            <a:spAutoFit/>
+          </a:bodyPr>
+          <a:lstStyle/>
+          <a:p>
+            <a:r>
+              <a:rPr lang="en-US" b="1" smtClean="0">
+                <a:latin typeface="Helvetica" panose="020B0604020202030204" pitchFamily="34" charset="0"/>
+              </a:rPr>
+              <a:t>...</a:t>
+            </a:r>
+          </a:p>
+        </p:txBody>
+      </p:sp>
+      <p:sp>
+        <p:nvSpPr>
+          <p:cNvPr id="28" name="Flowchart: Process 27"/>
+          <p:cNvSpPr/>
+          <p:nvPr/>
+        </p:nvSpPr>
+        <p:spPr>
+          <a:xfrm>
+            <a:off x="76200" y="1676400"/>
+            <a:ext cx="2362200" cy="762000"/>
+          </a:xfrm>
+          <a:prstGeom prst="flowChartProcess">
+            <a:avLst/>
+          </a:prstGeom>
+        </p:spPr>
+        <p:style>
+          <a:lnRef idx="1">
+            <a:schemeClr val="dk1"/>
+          </a:lnRef>
+          <a:fillRef idx="2">
+            <a:schemeClr val="dk1"/>
+          </a:fillRef>
+          <a:effectRef idx="1">
+            <a:schemeClr val="dk1"/>
+          </a:effectRef>
+          <a:fontRef idx="minor">
+            <a:schemeClr val="dk1"/>
+          </a:fontRef>
+        </p:style>
+        <p:txBody>
+          <a:bodyPr rot="0" spcFirstLastPara="0" vertOverflow="overflow" horzOverflow="overflow" vert="horz" wrap="square" lIns="91440" tIns="45720" rIns="91440" bIns="45720" numCol="1" spcCol="0" rtlCol="0" fromWordArt="0" anchor="ctr" anchorCtr="0" forceAA="0" compatLnSpc="1">
+            <a:prstTxWarp prst="textNoShape">
+              <a:avLst/>
+            </a:prstTxWarp>
+            <a:noAutofit/>
+          </a:bodyPr>
+          <a:lstStyle/>
+          <a:p>
+            <a:r>
+              <a:rPr lang="en-US" smtClean="0">
+                <a:latin typeface="Helvetica" panose="020B0604020202030204" pitchFamily="34" charset="0"/>
+              </a:rPr>
+              <a:t>Driver</a:t>
+            </a:r>
+          </a:p>
+        </p:txBody>
+      </p:sp>
+      <p:sp>
+        <p:nvSpPr>
+          <p:cNvPr id="30" name="Flowchart: Process 29"/>
+          <p:cNvSpPr/>
+          <p:nvPr/>
+        </p:nvSpPr>
+        <p:spPr>
+          <a:xfrm>
+            <a:off x="914400" y="1828800"/>
+            <a:ext cx="1371600" cy="457200"/>
+          </a:xfrm>
+          <a:prstGeom prst="flowChartProcess">
+            <a:avLst/>
+          </a:prstGeom>
+          <a:ln w="9525"/>
+        </p:spPr>
+        <p:style>
+          <a:lnRef idx="2">
+            <a:schemeClr val="dk1"/>
+          </a:lnRef>
+          <a:fillRef idx="1">
+            <a:schemeClr val="lt1"/>
+          </a:fillRef>
+          <a:effectRef idx="0">
+            <a:schemeClr val="dk1"/>
+          </a:effectRef>
+          <a:fontRef idx="minor">
+            <a:schemeClr val="dk1"/>
+          </a:fontRef>
+        </p:style>
+        <p:txBody>
+          <a:bodyPr rot="0" spcFirstLastPara="0" vertOverflow="overflow" horzOverflow="overflow" vert="horz" wrap="square" lIns="91440" tIns="45720" rIns="91440" bIns="45720" numCol="1" spcCol="0" rtlCol="0" fromWordArt="0" anchor="ctr" anchorCtr="0" forceAA="0" compatLnSpc="1">
+            <a:prstTxWarp prst="textNoShape">
+              <a:avLst/>
+            </a:prstTxWarp>
+            <a:noAutofit/>
+          </a:bodyPr>
+          <a:lstStyle/>
+          <a:p>
+            <a:pPr algn="ctr"/>
+            <a:r>
+              <a:rPr lang="en-US" sz="1400" smtClean="0">
+                <a:latin typeface="Helvetica" panose="020B0604020202030204" pitchFamily="34" charset="0"/>
+              </a:rPr>
+              <a:t>Application</a:t>
+            </a:r>
+          </a:p>
+        </p:txBody>
+      </p:sp>
+      <p:cxnSp>
+        <p:nvCxnSpPr>
+          <p:cNvPr id="5" name="Elbow Connector 4"/>
+          <p:cNvCxnSpPr>
+            <a:endCxn id="28" idx="0"/>
+          </p:cNvCxnSpPr>
+          <p:nvPr/>
+        </p:nvCxnSpPr>
+        <p:spPr>
+          <a:xfrm rot="10800000" flipV="1">
+            <a:off x="1257300" y="1143000"/>
+            <a:ext cx="4457700" cy="533400"/>
+          </a:xfrm>
+          <a:prstGeom prst="bentConnector2">
+            <a:avLst/>
+          </a:prstGeom>
+          <a:ln w="12700">
+            <a:tailEnd type="arrow"/>
+          </a:ln>
+        </p:spPr>
+        <p:style>
+          <a:lnRef idx="2">
+            <a:schemeClr val="dk1"/>
+          </a:lnRef>
+          <a:fillRef idx="0">
+            <a:schemeClr val="dk1"/>
+          </a:fillRef>
+          <a:effectRef idx="1">
+            <a:schemeClr val="dk1"/>
+          </a:effectRef>
+          <a:fontRef idx="minor">
+            <a:schemeClr val="tx1"/>
+          </a:fontRef>
+        </p:style>
+      </p:cxnSp>
+      <p:cxnSp>
+        <p:nvCxnSpPr>
+          <p:cNvPr id="12" name="Elbow Connector 11"/>
+          <p:cNvCxnSpPr>
+            <a:endCxn id="28" idx="2"/>
+          </p:cNvCxnSpPr>
+          <p:nvPr/>
+        </p:nvCxnSpPr>
+        <p:spPr>
+          <a:xfrm rot="10800000">
+            <a:off x="1257300" y="2438400"/>
+            <a:ext cx="4457700" cy="533400"/>
+          </a:xfrm>
+          <a:prstGeom prst="bentConnector2">
+            <a:avLst/>
+          </a:prstGeom>
+          <a:ln w="12700">
+            <a:tailEnd type="arrow"/>
+          </a:ln>
+        </p:spPr>
+        <p:style>
+          <a:lnRef idx="2">
+            <a:schemeClr val="dk1"/>
+          </a:lnRef>
+          <a:fillRef idx="0">
+            <a:schemeClr val="dk1"/>
+          </a:fillRef>
+          <a:effectRef idx="1">
+            <a:schemeClr val="dk1"/>
+          </a:effectRef>
+          <a:fontRef idx="minor">
+            <a:schemeClr val="tx1"/>
+          </a:fontRef>
+        </p:style>
+      </p:cxnSp>
+    </p:spTree>
+    <p:extLst>
+      <p:ext uri="{BB962C8B-B14F-4D97-AF65-F5344CB8AC3E}">
+        <p14:creationId xmlns:p14="http://schemas.microsoft.com/office/powerpoint/2010/main" val="3177194930"/>
+      </p:ext>
+    </p:extLst>
+  </p:cSld>
+  <p:clrMapOvr>
+    <a:masterClrMapping/>
+  </p:clrMapOvr>
+</p:sld>
+</file>
+
+<file path=ppt/slides/slide4.xml><?xml version="1.0" encoding="utf-8"?>
+<p:sld xmlns:a="http://schemas.openxmlformats.org/drawingml/2006/main" xmlns:r="http://schemas.openxmlformats.org/officeDocument/2006/relationships" xmlns:p="http://schemas.openxmlformats.org/presentationml/2006/main">
+  <p:cSld>
+    <p:spTree>
+      <p:nvGrpSpPr>
+        <p:cNvPr id="1" name=""/>
+        <p:cNvGrpSpPr/>
+        <p:nvPr/>
+      </p:nvGrpSpPr>
+      <p:grpSpPr>
+        <a:xfrm>
+          <a:off x="0" y="0"/>
+          <a:ext cx="0" cy="0"/>
+          <a:chOff x="0" y="0"/>
+          <a:chExt cx="0" cy="0"/>
+        </a:xfrm>
+      </p:grpSpPr>
+      <p:sp>
+        <p:nvSpPr>
+          <p:cNvPr id="38" name="TextBox 37"/>
+          <p:cNvSpPr txBox="1"/>
+          <p:nvPr/>
+        </p:nvSpPr>
+        <p:spPr>
+          <a:xfrm>
+            <a:off x="6934200" y="6400800"/>
+            <a:ext cx="2069797" cy="369332"/>
+          </a:xfrm>
+          <a:prstGeom prst="rect">
+            <a:avLst/>
+          </a:prstGeom>
+          <a:noFill/>
+        </p:spPr>
+        <p:txBody>
+          <a:bodyPr wrap="none" rtlCol="0">
+            <a:spAutoFit/>
+          </a:bodyPr>
+          <a:lstStyle/>
+          <a:p>
+            <a:r>
+              <a:rPr lang="en-US" smtClean="0">
+                <a:latin typeface="Helvetica" panose="020B0604020202030204" pitchFamily="34" charset="0"/>
+              </a:rPr>
+              <a:t>managing-clusters</a:t>
+            </a:r>
+          </a:p>
+        </p:txBody>
+      </p:sp>
+      <p:sp>
+        <p:nvSpPr>
+          <p:cNvPr id="4" name="Flowchart: Process 3"/>
+          <p:cNvSpPr/>
+          <p:nvPr/>
+        </p:nvSpPr>
+        <p:spPr>
+          <a:xfrm>
+            <a:off x="2971800" y="533401"/>
+            <a:ext cx="2971800" cy="1295400"/>
+          </a:xfrm>
+          <a:prstGeom prst="flowChartProcess">
+            <a:avLst/>
+          </a:prstGeom>
+        </p:spPr>
+        <p:style>
+          <a:lnRef idx="1">
+            <a:schemeClr val="accent1"/>
+          </a:lnRef>
+          <a:fillRef idx="2">
+            <a:schemeClr val="accent1"/>
+          </a:fillRef>
+          <a:effectRef idx="1">
+            <a:schemeClr val="accent1"/>
+          </a:effectRef>
+          <a:fontRef idx="minor">
+            <a:schemeClr val="dk1"/>
+          </a:fontRef>
+        </p:style>
+        <p:txBody>
+          <a:bodyPr rtlCol="0" anchor="b"/>
+          <a:lstStyle/>
+          <a:p>
+            <a:pPr algn="ctr"/>
             <a:endParaRPr lang="en-US">
               <a:latin typeface="Helvetica" panose="020B0604020202030204" pitchFamily="34" charset="0"/>
             </a:endParaRPr>
@@ -4473,9 +4565,6 @@
               </a:rPr>
               <a:t>sparkour-master</a:t>
             </a:r>
-            <a:endParaRPr lang="en-US" sz="1200" i="1" smtClean="0">
-              <a:latin typeface="Helvetica" panose="020B0604020202030204" pitchFamily="34" charset="0"/>
-            </a:endParaRPr>
           </a:p>
         </p:txBody>
       </p:sp>
@@ -4524,9 +4613,6 @@
               </a:rPr>
               <a:t>sparkour-slave</a:t>
             </a:r>
-            <a:endParaRPr lang="en-US" sz="1200" i="1" smtClean="0">
-              <a:latin typeface="Helvetica" panose="020B0604020202030204" pitchFamily="34" charset="0"/>
-            </a:endParaRPr>
           </a:p>
         </p:txBody>
       </p:sp>
@@ -4617,9 +4703,6 @@
               </a:rPr>
               <a:t>sparkour-dev</a:t>
             </a:r>
-            <a:endParaRPr lang="en-US" sz="1200" i="1" smtClean="0">
-              <a:latin typeface="Helvetica" panose="020B0604020202030204" pitchFamily="34" charset="0"/>
-            </a:endParaRPr>
           </a:p>
         </p:txBody>
       </p:sp>
@@ -4737,17 +4820,8 @@
               <a:rPr lang="en-US" sz="1100" smtClean="0">
                 <a:latin typeface="Helvetica" panose="020B0604020202030204" pitchFamily="34" charset="0"/>
               </a:rPr>
-              <a:t>de</a:t>
-            </a:r>
-            <a:r>
-              <a:rPr lang="en-US" sz="1100" smtClean="0">
-                <a:latin typeface="Helvetica" panose="020B0604020202030204" pitchFamily="34" charset="0"/>
-              </a:rPr>
-              <a:t>velopment environment</a:t>
-            </a:r>
-            <a:endParaRPr lang="en-US" sz="1100" smtClean="0">
-              <a:latin typeface="Helvetica" panose="020B0604020202030204" pitchFamily="34" charset="0"/>
-            </a:endParaRPr>
+              <a:t>development environment</a:t>
+            </a:r>
           </a:p>
         </p:txBody>
       </p:sp>
@@ -4797,9 +4871,6 @@
               </a:rPr>
               <a:t>master</a:t>
             </a:r>
-            <a:endParaRPr lang="en-US" sz="1100" smtClean="0">
-              <a:latin typeface="Helvetica" panose="020B0604020202030204" pitchFamily="34" charset="0"/>
-            </a:endParaRPr>
           </a:p>
         </p:txBody>
       </p:sp>
@@ -4849,9 +4920,6 @@
               </a:rPr>
               <a:t>worker</a:t>
             </a:r>
-            <a:endParaRPr lang="en-US" sz="1100" smtClean="0">
-              <a:latin typeface="Helvetica" panose="020B0604020202030204" pitchFamily="34" charset="0"/>
-            </a:endParaRPr>
           </a:p>
         </p:txBody>
       </p:sp>
@@ -4896,13 +4964,7 @@
                 <a:rPr lang="en-US" sz="1200" b="1" smtClean="0">
                   <a:latin typeface="Helvetica" panose="020B0604020202030204" pitchFamily="34" charset="0"/>
                 </a:rPr>
-                <a:t>Tutorial </a:t>
-              </a:r>
-              <a:r>
-                <a:rPr lang="en-US" sz="1200" b="1" smtClean="0">
-                  <a:latin typeface="Helvetica" panose="020B0604020202030204" pitchFamily="34" charset="0"/>
-                </a:rPr>
-                <a:t>Spark Cluster</a:t>
+                <a:t>Tutorial Spark Cluster</a:t>
               </a:r>
             </a:p>
             <a:p>
@@ -4963,9 +5025,6 @@
                 </a:rPr>
                 <a:t>sparkour-app</a:t>
               </a:r>
-              <a:endParaRPr lang="en-US" sz="1200" i="1" smtClean="0">
-                <a:latin typeface="Helvetica" panose="020B0604020202030204" pitchFamily="34" charset="0"/>
-              </a:endParaRPr>
             </a:p>
           </p:txBody>
         </p:sp>
@@ -5122,17 +5181,8 @@
                 <a:rPr lang="en-US" sz="1100" smtClean="0">
                   <a:latin typeface="Helvetica" panose="020B0604020202030204" pitchFamily="34" charset="0"/>
                 </a:rPr>
-                <a:t>de</a:t>
+                <a:t>development environment</a:t>
               </a:r>
-              <a:r>
-                <a:rPr lang="en-US" sz="1100" smtClean="0">
-                  <a:latin typeface="Helvetica" panose="020B0604020202030204" pitchFamily="34" charset="0"/>
-                </a:rPr>
-                <a:t>velopment environment</a:t>
-              </a:r>
-              <a:endParaRPr lang="en-US" sz="1100" smtClean="0">
-                <a:latin typeface="Helvetica" panose="020B0604020202030204" pitchFamily="34" charset="0"/>
-              </a:endParaRPr>
             </a:p>
           </p:txBody>
         </p:sp>
@@ -5182,9 +5232,6 @@
                 </a:rPr>
                 <a:t>master</a:t>
               </a:r>
-              <a:endParaRPr lang="en-US" sz="1100" smtClean="0">
-                <a:latin typeface="Helvetica" panose="020B0604020202030204" pitchFamily="34" charset="0"/>
-              </a:endParaRPr>
             </a:p>
           </p:txBody>
         </p:sp>
@@ -5234,9 +5281,6 @@
                 </a:rPr>
                 <a:t>worker</a:t>
               </a:r>
-              <a:endParaRPr lang="en-US" sz="1100" smtClean="0">
-                <a:latin typeface="Helvetica" panose="020B0604020202030204" pitchFamily="34" charset="0"/>
-              </a:endParaRPr>
             </a:p>
           </p:txBody>
         </p:sp>
@@ -5354,9 +5398,6 @@
                   </a:rPr>
                   <a:t>instance</a:t>
                 </a:r>
-                <a:endParaRPr lang="en-US" sz="800" i="1" smtClean="0">
-                  <a:latin typeface="Helvetica" panose="020B0604020202030204" pitchFamily="34" charset="0"/>
-                </a:endParaRPr>
               </a:p>
             </p:txBody>
           </p:sp>
@@ -5406,9 +5447,6 @@
                   </a:rPr>
                   <a:t>role</a:t>
                 </a:r>
-                <a:endParaRPr lang="en-US" sz="800" smtClean="0">
-                  <a:latin typeface="Helvetica" panose="020B0604020202030204" pitchFamily="34" charset="0"/>
-                </a:endParaRPr>
               </a:p>
             </p:txBody>
           </p:sp>
@@ -5508,7 +5546,7 @@
 </p:sld>
 </file>
 
-<file path=ppt/slides/slide4.xml><?xml version="1.0" encoding="utf-8"?>
+<file path=ppt/slides/slide5.xml><?xml version="1.0" encoding="utf-8"?>
 <p:sld xmlns:a="http://schemas.openxmlformats.org/drawingml/2006/main" xmlns:r="http://schemas.openxmlformats.org/officeDocument/2006/relationships" xmlns:p="http://schemas.openxmlformats.org/presentationml/2006/main">
   <p:cSld>
     <p:spTree>
@@ -5553,9 +5591,6 @@
               </a:rPr>
               <a:t>submitting-applications</a:t>
             </a:r>
-            <a:endParaRPr lang="en-US" smtClean="0">
-              <a:latin typeface="Helvetica" panose="020B0604020202030204" pitchFamily="34" charset="0"/>
-            </a:endParaRPr>
           </a:p>
         </p:txBody>
       </p:sp>
@@ -5587,9 +5622,6 @@
               </a:rPr>
               <a:t>Client Deploy Mode</a:t>
             </a:r>
-            <a:endParaRPr lang="en-US" sz="1200" b="1" smtClean="0">
-              <a:latin typeface="Helvetica" panose="020B0604020202030204" pitchFamily="34" charset="0"/>
-            </a:endParaRPr>
           </a:p>
           <a:p>
             <a:r>
@@ -5645,17 +5677,8 @@
               <a:rPr lang="en-US" sz="1100" smtClean="0">
                 <a:latin typeface="Helvetica" panose="020B0604020202030204" pitchFamily="34" charset="0"/>
               </a:rPr>
-              <a:t>de</a:t>
-            </a:r>
-            <a:r>
-              <a:rPr lang="en-US" sz="1100" smtClean="0">
-                <a:latin typeface="Helvetica" panose="020B0604020202030204" pitchFamily="34" charset="0"/>
-              </a:rPr>
-              <a:t>velopment environment</a:t>
-            </a:r>
-            <a:endParaRPr lang="en-US" sz="1100" smtClean="0">
-              <a:latin typeface="Helvetica" panose="020B0604020202030204" pitchFamily="34" charset="0"/>
-            </a:endParaRPr>
+              <a:t>development environment</a:t>
+            </a:r>
           </a:p>
         </p:txBody>
       </p:sp>
@@ -5743,17 +5766,8 @@
               <a:rPr lang="en-US" sz="1100" smtClean="0">
                 <a:latin typeface="Helvetica" panose="020B0604020202030204" pitchFamily="34" charset="0"/>
               </a:rPr>
-              <a:t>de</a:t>
-            </a:r>
-            <a:r>
-              <a:rPr lang="en-US" sz="1100" smtClean="0">
-                <a:latin typeface="Helvetica" panose="020B0604020202030204" pitchFamily="34" charset="0"/>
-              </a:rPr>
-              <a:t>velopment environment</a:t>
-            </a:r>
-            <a:endParaRPr lang="en-US" sz="1100" smtClean="0">
-              <a:latin typeface="Helvetica" panose="020B0604020202030204" pitchFamily="34" charset="0"/>
-            </a:endParaRPr>
+              <a:t>development environment</a:t>
+            </a:r>
           </a:p>
         </p:txBody>
       </p:sp>
@@ -5883,9 +5897,6 @@
               </a:rPr>
               <a:t>master</a:t>
             </a:r>
-            <a:endParaRPr lang="en-US" sz="1100" smtClean="0">
-              <a:latin typeface="Helvetica" panose="020B0604020202030204" pitchFamily="34" charset="0"/>
-            </a:endParaRPr>
           </a:p>
         </p:txBody>
       </p:sp>
@@ -5935,9 +5946,6 @@
               </a:rPr>
               <a:t>worker</a:t>
             </a:r>
-            <a:endParaRPr lang="en-US" sz="1100" smtClean="0">
-              <a:latin typeface="Helvetica" panose="020B0604020202030204" pitchFamily="34" charset="0"/>
-            </a:endParaRPr>
           </a:p>
         </p:txBody>
       </p:sp>
@@ -5987,9 +5995,6 @@
               </a:rPr>
               <a:t>driver</a:t>
             </a:r>
-            <a:endParaRPr lang="en-US" sz="1100" smtClean="0">
-              <a:latin typeface="Helvetica" panose="020B0604020202030204" pitchFamily="34" charset="0"/>
-            </a:endParaRPr>
           </a:p>
         </p:txBody>
       </p:sp>
@@ -6085,9 +6090,6 @@
               </a:rPr>
               <a:t>master</a:t>
             </a:r>
-            <a:endParaRPr lang="en-US" sz="1100" smtClean="0">
-              <a:latin typeface="Helvetica" panose="020B0604020202030204" pitchFamily="34" charset="0"/>
-            </a:endParaRPr>
           </a:p>
         </p:txBody>
       </p:sp>
@@ -6137,9 +6139,6 @@
               </a:rPr>
               <a:t>worker</a:t>
             </a:r>
-            <a:endParaRPr lang="en-US" sz="1100" smtClean="0">
-              <a:latin typeface="Helvetica" panose="020B0604020202030204" pitchFamily="34" charset="0"/>
-            </a:endParaRPr>
           </a:p>
         </p:txBody>
       </p:sp>
@@ -6189,9 +6188,6 @@
               </a:rPr>
               <a:t>driver</a:t>
             </a:r>
-            <a:endParaRPr lang="en-US" sz="1100" smtClean="0">
-              <a:latin typeface="Helvetica" panose="020B0604020202030204" pitchFamily="34" charset="0"/>
-            </a:endParaRPr>
           </a:p>
         </p:txBody>
       </p:sp>
@@ -6280,7 +6276,7 @@
 </p:sld>
 </file>
 
-<file path=ppt/slides/slide5.xml><?xml version="1.0" encoding="utf-8"?>
+<file path=ppt/slides/slide6.xml><?xml version="1.0" encoding="utf-8"?>
 <p:sld xmlns:a="http://schemas.openxmlformats.org/drawingml/2006/main" xmlns:r="http://schemas.openxmlformats.org/officeDocument/2006/relationships" xmlns:p="http://schemas.openxmlformats.org/presentationml/2006/main">
   <p:cSld>
     <p:spTree>
@@ -6875,7 +6871,7 @@
 </p:sld>
 </file>
 
-<file path=ppt/slides/slide6.xml><?xml version="1.0" encoding="utf-8"?>
+<file path=ppt/slides/slide7.xml><?xml version="1.0" encoding="utf-8"?>
 <p:sld xmlns:a="http://schemas.openxmlformats.org/drawingml/2006/main" xmlns:r="http://schemas.openxmlformats.org/officeDocument/2006/relationships" xmlns:p="http://schemas.openxmlformats.org/presentationml/2006/main">
   <p:cSld>
     <p:spTree>

</xml_diff>

<commit_message>
Fixed typo in Nutshell diagram.
</commit_message>
<xml_diff>
--- a/data/work/diagrams.pptx
+++ b/data/work/diagrams.pptx
@@ -294,7 +294,7 @@
           <a:p>
             <a:fld id="{8136B1A2-BD48-40D0-8ACE-0BC0EB70CE80}" type="datetimeFigureOut">
               <a:rPr lang="en-US" smtClean="0"/>
-              <a:t>3/29/2016</a:t>
+              <a:t>9/22/2016</a:t>
             </a:fld>
             <a:endParaRPr lang="en-US"/>
           </a:p>
@@ -464,7 +464,7 @@
           <a:p>
             <a:fld id="{8136B1A2-BD48-40D0-8ACE-0BC0EB70CE80}" type="datetimeFigureOut">
               <a:rPr lang="en-US" smtClean="0"/>
-              <a:t>3/29/2016</a:t>
+              <a:t>9/22/2016</a:t>
             </a:fld>
             <a:endParaRPr lang="en-US"/>
           </a:p>
@@ -644,7 +644,7 @@
           <a:p>
             <a:fld id="{8136B1A2-BD48-40D0-8ACE-0BC0EB70CE80}" type="datetimeFigureOut">
               <a:rPr lang="en-US" smtClean="0"/>
-              <a:t>3/29/2016</a:t>
+              <a:t>9/22/2016</a:t>
             </a:fld>
             <a:endParaRPr lang="en-US"/>
           </a:p>
@@ -814,7 +814,7 @@
           <a:p>
             <a:fld id="{8136B1A2-BD48-40D0-8ACE-0BC0EB70CE80}" type="datetimeFigureOut">
               <a:rPr lang="en-US" smtClean="0"/>
-              <a:t>3/29/2016</a:t>
+              <a:t>9/22/2016</a:t>
             </a:fld>
             <a:endParaRPr lang="en-US"/>
           </a:p>
@@ -1060,7 +1060,7 @@
           <a:p>
             <a:fld id="{8136B1A2-BD48-40D0-8ACE-0BC0EB70CE80}" type="datetimeFigureOut">
               <a:rPr lang="en-US" smtClean="0"/>
-              <a:t>3/29/2016</a:t>
+              <a:t>9/22/2016</a:t>
             </a:fld>
             <a:endParaRPr lang="en-US"/>
           </a:p>
@@ -1348,7 +1348,7 @@
           <a:p>
             <a:fld id="{8136B1A2-BD48-40D0-8ACE-0BC0EB70CE80}" type="datetimeFigureOut">
               <a:rPr lang="en-US" smtClean="0"/>
-              <a:t>3/29/2016</a:t>
+              <a:t>9/22/2016</a:t>
             </a:fld>
             <a:endParaRPr lang="en-US"/>
           </a:p>
@@ -1770,7 +1770,7 @@
           <a:p>
             <a:fld id="{8136B1A2-BD48-40D0-8ACE-0BC0EB70CE80}" type="datetimeFigureOut">
               <a:rPr lang="en-US" smtClean="0"/>
-              <a:t>3/29/2016</a:t>
+              <a:t>9/22/2016</a:t>
             </a:fld>
             <a:endParaRPr lang="en-US"/>
           </a:p>
@@ -1888,7 +1888,7 @@
           <a:p>
             <a:fld id="{8136B1A2-BD48-40D0-8ACE-0BC0EB70CE80}" type="datetimeFigureOut">
               <a:rPr lang="en-US" smtClean="0"/>
-              <a:t>3/29/2016</a:t>
+              <a:t>9/22/2016</a:t>
             </a:fld>
             <a:endParaRPr lang="en-US"/>
           </a:p>
@@ -1983,7 +1983,7 @@
           <a:p>
             <a:fld id="{8136B1A2-BD48-40D0-8ACE-0BC0EB70CE80}" type="datetimeFigureOut">
               <a:rPr lang="en-US" smtClean="0"/>
-              <a:t>3/29/2016</a:t>
+              <a:t>9/22/2016</a:t>
             </a:fld>
             <a:endParaRPr lang="en-US"/>
           </a:p>
@@ -2260,7 +2260,7 @@
           <a:p>
             <a:fld id="{8136B1A2-BD48-40D0-8ACE-0BC0EB70CE80}" type="datetimeFigureOut">
               <a:rPr lang="en-US" smtClean="0"/>
-              <a:t>3/29/2016</a:t>
+              <a:t>9/22/2016</a:t>
             </a:fld>
             <a:endParaRPr lang="en-US"/>
           </a:p>
@@ -2513,7 +2513,7 @@
           <a:p>
             <a:fld id="{8136B1A2-BD48-40D0-8ACE-0BC0EB70CE80}" type="datetimeFigureOut">
               <a:rPr lang="en-US" smtClean="0"/>
-              <a:t>3/29/2016</a:t>
+              <a:t>9/22/2016</a:t>
             </a:fld>
             <a:endParaRPr lang="en-US"/>
           </a:p>
@@ -2726,7 +2726,7 @@
           <a:p>
             <a:fld id="{8136B1A2-BD48-40D0-8ACE-0BC0EB70CE80}" type="datetimeFigureOut">
               <a:rPr lang="en-US" smtClean="0"/>
-              <a:t>3/29/2016</a:t>
+              <a:t>9/22/2016</a:t>
             </a:fld>
             <a:endParaRPr lang="en-US"/>
           </a:p>
@@ -3314,11 +3314,20 @@
           <a:p>
             <a:pPr algn="ctr"/>
             <a:r>
-              <a:rPr lang="en-US" smtClean="0">
+              <a:rPr lang="en-US" dirty="0" smtClean="0">
                 <a:latin typeface="Helvetica" panose="020B0604020202030204" pitchFamily="34" charset="0"/>
               </a:rPr>
-              <a:t>MLib</a:t>
-            </a:r>
+              <a:t>ML/</a:t>
+            </a:r>
+            <a:r>
+              <a:rPr lang="en-US" dirty="0" err="1" smtClean="0">
+                <a:latin typeface="Helvetica" panose="020B0604020202030204" pitchFamily="34" charset="0"/>
+              </a:rPr>
+              <a:t>MLLib</a:t>
+            </a:r>
+            <a:endParaRPr lang="en-US" dirty="0" smtClean="0">
+              <a:latin typeface="Helvetica" panose="020B0604020202030204" pitchFamily="34" charset="0"/>
+            </a:endParaRPr>
           </a:p>
         </p:txBody>
       </p:sp>

</xml_diff>

<commit_message>
SPARKOUR-28: Updated for Spark 2.3.0.
</commit_message>
<xml_diff>
--- a/data/work/diagrams.pptx
+++ b/data/work/diagrams.pptx
@@ -294,7 +294,7 @@
           <a:p>
             <a:fld id="{8136B1A2-BD48-40D0-8ACE-0BC0EB70CE80}" type="datetimeFigureOut">
               <a:rPr lang="en-US" smtClean="0"/>
-              <a:t>9/22/2016</a:t>
+              <a:t>5/27/2018</a:t>
             </a:fld>
             <a:endParaRPr lang="en-US"/>
           </a:p>
@@ -464,7 +464,7 @@
           <a:p>
             <a:fld id="{8136B1A2-BD48-40D0-8ACE-0BC0EB70CE80}" type="datetimeFigureOut">
               <a:rPr lang="en-US" smtClean="0"/>
-              <a:t>9/22/2016</a:t>
+              <a:t>5/27/2018</a:t>
             </a:fld>
             <a:endParaRPr lang="en-US"/>
           </a:p>
@@ -644,7 +644,7 @@
           <a:p>
             <a:fld id="{8136B1A2-BD48-40D0-8ACE-0BC0EB70CE80}" type="datetimeFigureOut">
               <a:rPr lang="en-US" smtClean="0"/>
-              <a:t>9/22/2016</a:t>
+              <a:t>5/27/2018</a:t>
             </a:fld>
             <a:endParaRPr lang="en-US"/>
           </a:p>
@@ -814,7 +814,7 @@
           <a:p>
             <a:fld id="{8136B1A2-BD48-40D0-8ACE-0BC0EB70CE80}" type="datetimeFigureOut">
               <a:rPr lang="en-US" smtClean="0"/>
-              <a:t>9/22/2016</a:t>
+              <a:t>5/27/2018</a:t>
             </a:fld>
             <a:endParaRPr lang="en-US"/>
           </a:p>
@@ -1060,7 +1060,7 @@
           <a:p>
             <a:fld id="{8136B1A2-BD48-40D0-8ACE-0BC0EB70CE80}" type="datetimeFigureOut">
               <a:rPr lang="en-US" smtClean="0"/>
-              <a:t>9/22/2016</a:t>
+              <a:t>5/27/2018</a:t>
             </a:fld>
             <a:endParaRPr lang="en-US"/>
           </a:p>
@@ -1348,7 +1348,7 @@
           <a:p>
             <a:fld id="{8136B1A2-BD48-40D0-8ACE-0BC0EB70CE80}" type="datetimeFigureOut">
               <a:rPr lang="en-US" smtClean="0"/>
-              <a:t>9/22/2016</a:t>
+              <a:t>5/27/2018</a:t>
             </a:fld>
             <a:endParaRPr lang="en-US"/>
           </a:p>
@@ -1770,7 +1770,7 @@
           <a:p>
             <a:fld id="{8136B1A2-BD48-40D0-8ACE-0BC0EB70CE80}" type="datetimeFigureOut">
               <a:rPr lang="en-US" smtClean="0"/>
-              <a:t>9/22/2016</a:t>
+              <a:t>5/27/2018</a:t>
             </a:fld>
             <a:endParaRPr lang="en-US"/>
           </a:p>
@@ -1888,7 +1888,7 @@
           <a:p>
             <a:fld id="{8136B1A2-BD48-40D0-8ACE-0BC0EB70CE80}" type="datetimeFigureOut">
               <a:rPr lang="en-US" smtClean="0"/>
-              <a:t>9/22/2016</a:t>
+              <a:t>5/27/2018</a:t>
             </a:fld>
             <a:endParaRPr lang="en-US"/>
           </a:p>
@@ -1983,7 +1983,7 @@
           <a:p>
             <a:fld id="{8136B1A2-BD48-40D0-8ACE-0BC0EB70CE80}" type="datetimeFigureOut">
               <a:rPr lang="en-US" smtClean="0"/>
-              <a:t>9/22/2016</a:t>
+              <a:t>5/27/2018</a:t>
             </a:fld>
             <a:endParaRPr lang="en-US"/>
           </a:p>
@@ -2260,7 +2260,7 @@
           <a:p>
             <a:fld id="{8136B1A2-BD48-40D0-8ACE-0BC0EB70CE80}" type="datetimeFigureOut">
               <a:rPr lang="en-US" smtClean="0"/>
-              <a:t>9/22/2016</a:t>
+              <a:t>5/27/2018</a:t>
             </a:fld>
             <a:endParaRPr lang="en-US"/>
           </a:p>
@@ -2513,7 +2513,7 @@
           <a:p>
             <a:fld id="{8136B1A2-BD48-40D0-8ACE-0BC0EB70CE80}" type="datetimeFigureOut">
               <a:rPr lang="en-US" smtClean="0"/>
-              <a:t>9/22/2016</a:t>
+              <a:t>5/27/2018</a:t>
             </a:fld>
             <a:endParaRPr lang="en-US"/>
           </a:p>
@@ -2726,7 +2726,7 @@
           <a:p>
             <a:fld id="{8136B1A2-BD48-40D0-8ACE-0BC0EB70CE80}" type="datetimeFigureOut">
               <a:rPr lang="en-US" smtClean="0"/>
-              <a:t>9/22/2016</a:t>
+              <a:t>5/27/2018</a:t>
             </a:fld>
             <a:endParaRPr lang="en-US"/>
           </a:p>
@@ -3314,16 +3314,10 @@
           <a:p>
             <a:pPr algn="ctr"/>
             <a:r>
-              <a:rPr lang="en-US" dirty="0" smtClean="0">
+              <a:rPr lang="en-US" smtClean="0">
                 <a:latin typeface="Helvetica" panose="020B0604020202030204" pitchFamily="34" charset="0"/>
               </a:rPr>
-              <a:t>ML/</a:t>
-            </a:r>
-            <a:r>
-              <a:rPr lang="en-US" dirty="0" err="1" smtClean="0">
-                <a:latin typeface="Helvetica" panose="020B0604020202030204" pitchFamily="34" charset="0"/>
-              </a:rPr>
-              <a:t>MLLib</a:t>
+              <a:t>MLlib</a:t>
             </a:r>
             <a:endParaRPr lang="en-US" dirty="0" smtClean="0">
               <a:latin typeface="Helvetica" panose="020B0604020202030204" pitchFamily="34" charset="0"/>
@@ -3442,9 +3436,9 @@
       </p:sp>
       <p:pic>
         <p:nvPicPr>
-          <p:cNvPr id="2" name="Picture 1"/>
+          <p:cNvPr id="1026" name="Picture 2"/>
           <p:cNvPicPr>
-            <a:picLocks noChangeAspect="1"/>
+            <a:picLocks noChangeAspect="1" noChangeArrowheads="1"/>
           </p:cNvPicPr>
           <p:nvPr/>
         </p:nvPicPr>
@@ -3456,18 +3450,42 @@
               </a:ext>
             </a:extLst>
           </a:blip>
+          <a:srcRect/>
           <a:stretch>
             <a:fillRect/>
           </a:stretch>
         </p:blipFill>
-        <p:spPr>
-          <a:xfrm>
-            <a:off x="914400" y="457200"/>
+        <p:spPr bwMode="auto">
+          <a:xfrm>
+            <a:off x="1000125" y="1828800"/>
             <a:ext cx="7143750" cy="3200400"/>
           </a:xfrm>
           <a:prstGeom prst="rect">
             <a:avLst/>
           </a:prstGeom>
+          <a:noFill/>
+          <a:ln>
+            <a:noFill/>
+          </a:ln>
+          <a:extLst>
+            <a:ext uri="{909E8E84-426E-40DD-AFC4-6F175D3DCCD1}">
+              <a14:hiddenFill xmlns:a14="http://schemas.microsoft.com/office/drawing/2010/main">
+                <a:solidFill>
+                  <a:schemeClr val="accent1"/>
+                </a:solidFill>
+              </a14:hiddenFill>
+            </a:ext>
+            <a:ext uri="{91240B29-F687-4F45-9708-019B960494DF}">
+              <a14:hiddenLine xmlns:a14="http://schemas.microsoft.com/office/drawing/2010/main" w="9525">
+                <a:solidFill>
+                  <a:schemeClr val="tx1"/>
+                </a:solidFill>
+                <a:miter lim="800000"/>
+                <a:headEnd/>
+                <a:tailEnd/>
+              </a14:hiddenLine>
+            </a:ext>
+          </a:extLst>
         </p:spPr>
       </p:pic>
     </p:spTree>

</xml_diff>